<commit_message>
finished drafting C cycle diagram and mapping
The first drafts of these documents are now complete.
</commit_message>
<xml_diff>
--- a/figures/C_cycle_diagrams/rough_draft_C_cycle_diagram.pptx
+++ b/figures/C_cycle_diagrams/rough_draft_C_cycle_diagram.pptx
@@ -3411,7 +3411,7 @@
         </p:nvGrpSpPr>
         <p:grpSpPr>
           <a:xfrm>
-            <a:off x="1461441" y="866382"/>
+            <a:off x="1461441" y="498082"/>
             <a:ext cx="4359361" cy="6858000"/>
             <a:chOff x="954104" y="843197"/>
             <a:chExt cx="4359361" cy="6858000"/>
@@ -3473,7 +3473,7 @@
         </p:nvSpPr>
         <p:spPr>
           <a:xfrm>
-            <a:off x="581634" y="783383"/>
+            <a:off x="581634" y="415083"/>
             <a:ext cx="1444751" cy="1002632"/>
           </a:xfrm>
           <a:prstGeom prst="downArrow">
@@ -3519,7 +3519,7 @@
         </p:nvSpPr>
         <p:spPr>
           <a:xfrm rot="20728107">
-            <a:off x="1629684" y="2651441"/>
+            <a:off x="1629684" y="2283141"/>
             <a:ext cx="146304" cy="4458147"/>
           </a:xfrm>
           <a:prstGeom prst="downArrow">
@@ -3565,7 +3565,7 @@
         </p:nvSpPr>
         <p:spPr>
           <a:xfrm rot="10800000">
-            <a:off x="5141126" y="783384"/>
+            <a:off x="5141126" y="415084"/>
             <a:ext cx="1298448" cy="1005840"/>
           </a:xfrm>
           <a:prstGeom prst="downArrow">
@@ -3616,7 +3616,7 @@
         </p:nvSpPr>
         <p:spPr>
           <a:xfrm rot="11704169">
-            <a:off x="4922017" y="1760026"/>
+            <a:off x="4922017" y="1391726"/>
             <a:ext cx="338569" cy="4708089"/>
           </a:xfrm>
           <a:prstGeom prst="downArrow">
@@ -3629,7 +3629,7 @@
           </a:solidFill>
           <a:ln>
             <a:solidFill>
-              <a:srgbClr val="FF0000"/>
+              <a:schemeClr val="tx1"/>
             </a:solidFill>
           </a:ln>
         </p:spPr>
@@ -3664,7 +3664,7 @@
         </p:nvSpPr>
         <p:spPr>
           <a:xfrm>
-            <a:off x="7119924" y="6981097"/>
+            <a:off x="7015619" y="6136982"/>
             <a:ext cx="1179765" cy="506002"/>
           </a:xfrm>
           <a:prstGeom prst="rect">
@@ -3745,7 +3745,7 @@
         </p:nvSpPr>
         <p:spPr>
           <a:xfrm>
-            <a:off x="7135607" y="5300180"/>
+            <a:off x="7136420" y="3806899"/>
             <a:ext cx="1058964" cy="507805"/>
           </a:xfrm>
           <a:prstGeom prst="rect">
@@ -3813,7 +3813,7 @@
         </p:nvSpPr>
         <p:spPr>
           <a:xfrm>
-            <a:off x="644392" y="3595712"/>
+            <a:off x="644392" y="3227412"/>
             <a:ext cx="760115" cy="553998"/>
           </a:xfrm>
           <a:prstGeom prst="rect">
@@ -3855,7 +3855,7 @@
         </p:nvSpPr>
         <p:spPr>
           <a:xfrm>
-            <a:off x="475456" y="1847417"/>
+            <a:off x="475456" y="1479117"/>
             <a:ext cx="789394" cy="553998"/>
           </a:xfrm>
           <a:prstGeom prst="rect">
@@ -3897,7 +3897,7 @@
         </p:nvSpPr>
         <p:spPr>
           <a:xfrm>
-            <a:off x="1741546" y="4383681"/>
+            <a:off x="1741546" y="4015381"/>
             <a:ext cx="748123" cy="461665"/>
           </a:xfrm>
           <a:prstGeom prst="rect">
@@ -3955,7 +3955,7 @@
         </p:nvSpPr>
         <p:spPr>
           <a:xfrm>
-            <a:off x="3273080" y="3510851"/>
+            <a:off x="3273080" y="3142551"/>
             <a:ext cx="725652" cy="461665"/>
           </a:xfrm>
           <a:prstGeom prst="rect">
@@ -4013,7 +4013,7 @@
         </p:nvSpPr>
         <p:spPr>
           <a:xfrm>
-            <a:off x="5396746" y="930172"/>
+            <a:off x="5396746" y="561872"/>
             <a:ext cx="804394" cy="553998"/>
           </a:xfrm>
           <a:prstGeom prst="rect">
@@ -4062,7 +4062,7 @@
         </p:nvSpPr>
         <p:spPr>
           <a:xfrm>
-            <a:off x="1450068" y="2213276"/>
+            <a:off x="1450068" y="1844976"/>
             <a:ext cx="821016" cy="553998"/>
           </a:xfrm>
           <a:prstGeom prst="rect">
@@ -4109,7 +4109,7 @@
         </p:nvSpPr>
         <p:spPr>
           <a:xfrm>
-            <a:off x="3175791" y="2719675"/>
+            <a:off x="3175791" y="2351375"/>
             <a:ext cx="994116" cy="307777"/>
           </a:xfrm>
           <a:prstGeom prst="rect">
@@ -4167,7 +4167,7 @@
         </p:nvSpPr>
         <p:spPr>
           <a:xfrm>
-            <a:off x="1015786" y="5776163"/>
+            <a:off x="1015786" y="5407863"/>
             <a:ext cx="1038827" cy="553998"/>
           </a:xfrm>
           <a:prstGeom prst="rect">
@@ -4220,7 +4220,7 @@
         </p:nvSpPr>
         <p:spPr>
           <a:xfrm>
-            <a:off x="857143" y="5081087"/>
+            <a:off x="857143" y="4712787"/>
             <a:ext cx="1038827" cy="553998"/>
           </a:xfrm>
           <a:prstGeom prst="rect">
@@ -4273,7 +4273,7 @@
         </p:nvSpPr>
         <p:spPr>
           <a:xfrm rot="16200000">
-            <a:off x="2500734" y="2429903"/>
+            <a:off x="2500734" y="2061603"/>
             <a:ext cx="45719" cy="1067763"/>
           </a:xfrm>
           <a:prstGeom prst="downArrow">
@@ -4319,7 +4319,7 @@
         </p:nvSpPr>
         <p:spPr>
           <a:xfrm rot="18431627">
-            <a:off x="1558659" y="2542405"/>
+            <a:off x="1558659" y="2174105"/>
             <a:ext cx="228600" cy="668151"/>
           </a:xfrm>
           <a:prstGeom prst="downArrow">
@@ -4365,8 +4365,8 @@
         </p:nvSpPr>
         <p:spPr>
           <a:xfrm flipH="1">
-            <a:off x="2453648" y="5309523"/>
-            <a:ext cx="285934" cy="1469959"/>
+            <a:off x="2431355" y="4956262"/>
+            <a:ext cx="220900" cy="1469959"/>
           </a:xfrm>
           <a:prstGeom prst="downArrow">
             <a:avLst/>
@@ -4411,7 +4411,7 @@
         </p:nvSpPr>
         <p:spPr>
           <a:xfrm rot="16920000">
-            <a:off x="2227531" y="2827933"/>
+            <a:off x="2227531" y="2459633"/>
             <a:ext cx="137160" cy="566928"/>
           </a:xfrm>
           <a:prstGeom prst="downArrow">
@@ -4457,7 +4457,7 @@
         </p:nvSpPr>
         <p:spPr>
           <a:xfrm>
-            <a:off x="2869831" y="730117"/>
+            <a:off x="2869831" y="361817"/>
             <a:ext cx="1404919" cy="400110"/>
           </a:xfrm>
           <a:prstGeom prst="rect">
@@ -4507,7 +4507,7 @@
         </p:nvSpPr>
         <p:spPr>
           <a:xfrm>
-            <a:off x="6007756" y="2254090"/>
+            <a:off x="6352500" y="850313"/>
             <a:ext cx="1146965" cy="520658"/>
           </a:xfrm>
           <a:prstGeom prst="rect">
@@ -4588,7 +4588,7 @@
         </p:nvSpPr>
         <p:spPr>
           <a:xfrm>
-            <a:off x="7175597" y="2608421"/>
+            <a:off x="6999162" y="1640621"/>
             <a:ext cx="1104899" cy="682164"/>
           </a:xfrm>
           <a:prstGeom prst="rect">
@@ -4669,7 +4669,7 @@
         </p:nvSpPr>
         <p:spPr>
           <a:xfrm>
-            <a:off x="883850" y="775151"/>
+            <a:off x="883850" y="406851"/>
             <a:ext cx="825500" cy="553998"/>
           </a:xfrm>
           <a:prstGeom prst="rect">
@@ -4711,7 +4711,7 @@
         </p:nvSpPr>
         <p:spPr>
           <a:xfrm rot="18346085">
-            <a:off x="2244670" y="2868131"/>
+            <a:off x="2244670" y="2499831"/>
             <a:ext cx="333195" cy="1058309"/>
           </a:xfrm>
           <a:prstGeom prst="downArrow">
@@ -4757,7 +4757,7 @@
         </p:nvSpPr>
         <p:spPr>
           <a:xfrm>
-            <a:off x="2880116" y="822477"/>
+            <a:off x="2880116" y="454177"/>
             <a:ext cx="82296" cy="274320"/>
           </a:xfrm>
           <a:prstGeom prst="downArrow">
@@ -4806,7 +4806,7 @@
         </p:nvSpPr>
         <p:spPr>
           <a:xfrm>
-            <a:off x="4958284" y="4800804"/>
+            <a:off x="4958284" y="4432504"/>
             <a:ext cx="700226" cy="553998"/>
           </a:xfrm>
           <a:prstGeom prst="rect">
@@ -4862,7 +4862,7 @@
         </p:nvSpPr>
         <p:spPr>
           <a:xfrm rot="16200000">
-            <a:off x="4155562" y="956819"/>
+            <a:off x="4155562" y="588519"/>
             <a:ext cx="969264" cy="1086490"/>
           </a:xfrm>
           <a:prstGeom prst="downArrow">
@@ -4910,7 +4910,7 @@
         </p:nvSpPr>
         <p:spPr>
           <a:xfrm>
-            <a:off x="4015647" y="1307370"/>
+            <a:off x="4015647" y="939070"/>
             <a:ext cx="1240380" cy="553998"/>
           </a:xfrm>
           <a:prstGeom prst="rect">
@@ -4927,9 +4927,6 @@
             <a:pPr algn="ctr"/>
             <a:r>
               <a:rPr lang="en-US" sz="1000" b="1" dirty="0">
-                <a:solidFill>
-                  <a:srgbClr val="FF0000"/>
-                </a:solidFill>
                 <a:latin typeface="Helvetica"/>
                 <a:cs typeface="Helvetica"/>
               </a:rPr>
@@ -4937,9 +4934,6 @@
             </a:r>
             <a:r>
               <a:rPr lang="en-US" sz="1000" b="1" baseline="-25000" dirty="0">
-                <a:solidFill>
-                  <a:srgbClr val="FF0000"/>
-                </a:solidFill>
                 <a:latin typeface="Helvetica"/>
                 <a:cs typeface="Helvetica"/>
               </a:rPr>
@@ -4950,9 +4944,6 @@
             <a:pPr algn="ctr"/>
             <a:r>
               <a:rPr lang="en-US" sz="1000" dirty="0">
-                <a:solidFill>
-                  <a:srgbClr val="FF0000"/>
-                </a:solidFill>
                 <a:latin typeface="Helvetica"/>
                 <a:cs typeface="Helvetica"/>
               </a:rPr>
@@ -4962,9 +4953,6 @@
           <a:p>
             <a:pPr algn="ctr"/>
             <a:endParaRPr lang="en-US" sz="1000" dirty="0">
-              <a:solidFill>
-                <a:srgbClr val="FF0000"/>
-              </a:solidFill>
               <a:latin typeface="Helvetica"/>
               <a:cs typeface="Helvetica"/>
             </a:endParaRPr>
@@ -4979,7 +4967,7 @@
         </p:nvSpPr>
         <p:spPr>
           <a:xfrm>
-            <a:off x="2679586" y="6044502"/>
+            <a:off x="2628474" y="5401189"/>
             <a:ext cx="732742" cy="461665"/>
           </a:xfrm>
           <a:prstGeom prst="rect">
@@ -5037,7 +5025,7 @@
         </p:nvSpPr>
         <p:spPr>
           <a:xfrm>
-            <a:off x="6038513" y="6313511"/>
+            <a:off x="7153752" y="5015297"/>
             <a:ext cx="1024300" cy="437855"/>
           </a:xfrm>
           <a:prstGeom prst="rect">
@@ -5105,7 +5093,7 @@
         </p:nvSpPr>
         <p:spPr>
           <a:xfrm>
-            <a:off x="1112417" y="1872882"/>
+            <a:off x="1112417" y="1504582"/>
             <a:ext cx="393192" cy="756242"/>
           </a:xfrm>
           <a:prstGeom prst="downArrow">
@@ -5151,7 +5139,7 @@
         </p:nvSpPr>
         <p:spPr>
           <a:xfrm>
-            <a:off x="504955" y="731954"/>
+            <a:off x="594223" y="373584"/>
             <a:ext cx="6080760" cy="6858001"/>
           </a:xfrm>
           <a:prstGeom prst="rect">
@@ -5193,7 +5181,7 @@
         </p:nvCxnSpPr>
         <p:spPr>
           <a:xfrm flipV="1">
-            <a:off x="4197301" y="1913708"/>
+            <a:off x="4197301" y="1545408"/>
             <a:ext cx="1250057" cy="1027216"/>
           </a:xfrm>
           <a:prstGeom prst="straightConnector1">
@@ -5234,7 +5222,7 @@
         </p:nvCxnSpPr>
         <p:spPr>
           <a:xfrm flipV="1">
-            <a:off x="5418164" y="1900373"/>
+            <a:off x="5405996" y="1567712"/>
             <a:ext cx="529844" cy="4654178"/>
           </a:xfrm>
           <a:prstGeom prst="straightConnector1">
@@ -5275,7 +5263,7 @@
         </p:nvSpPr>
         <p:spPr>
           <a:xfrm>
-            <a:off x="3480186" y="5100125"/>
+            <a:off x="3480186" y="4731825"/>
             <a:ext cx="833414" cy="400110"/>
           </a:xfrm>
           <a:prstGeom prst="rect">
@@ -5311,7 +5299,7 @@
         </p:nvSpPr>
         <p:spPr>
           <a:xfrm>
-            <a:off x="5689417" y="6891807"/>
+            <a:off x="6108214" y="5607674"/>
             <a:ext cx="1394700" cy="455201"/>
           </a:xfrm>
           <a:prstGeom prst="rect">
@@ -5379,7 +5367,7 @@
         </p:nvSpPr>
         <p:spPr>
           <a:xfrm>
-            <a:off x="7897711" y="4011450"/>
+            <a:off x="7786763" y="2684302"/>
             <a:ext cx="1016000" cy="567864"/>
           </a:xfrm>
           <a:prstGeom prst="rect">
@@ -5460,7 +5448,7 @@
         </p:nvSpPr>
         <p:spPr>
           <a:xfrm>
-            <a:off x="2463219" y="3060617"/>
+            <a:off x="2463219" y="2692317"/>
             <a:ext cx="137160" cy="2194560"/>
           </a:xfrm>
           <a:prstGeom prst="downArrow">
@@ -5506,7 +5494,7 @@
         </p:nvSpPr>
         <p:spPr>
           <a:xfrm>
-            <a:off x="7157940" y="787980"/>
+            <a:off x="7847367" y="562456"/>
             <a:ext cx="1111154" cy="707886"/>
           </a:xfrm>
           <a:prstGeom prst="rect">
@@ -5578,7 +5566,7 @@
         </p:nvSpPr>
         <p:spPr>
           <a:xfrm rot="10971162">
-            <a:off x="4268711" y="1683351"/>
+            <a:off x="4268711" y="1315051"/>
             <a:ext cx="329599" cy="4772404"/>
           </a:xfrm>
           <a:prstGeom prst="downArrow">
@@ -5591,7 +5579,7 @@
           </a:solidFill>
           <a:ln>
             <a:solidFill>
-              <a:srgbClr val="FF0000"/>
+              <a:schemeClr val="tx1"/>
             </a:solidFill>
           </a:ln>
         </p:spPr>
@@ -5626,7 +5614,7 @@
         </p:nvSpPr>
         <p:spPr>
           <a:xfrm rot="10800000">
-            <a:off x="3764084" y="6228457"/>
+            <a:off x="3778698" y="5862854"/>
             <a:ext cx="1167749" cy="851540"/>
           </a:xfrm>
           <a:prstGeom prst="downArrow">
@@ -5639,7 +5627,7 @@
           </a:solidFill>
           <a:ln>
             <a:solidFill>
-              <a:srgbClr val="FF0000"/>
+              <a:schemeClr val="tx1"/>
             </a:solidFill>
           </a:ln>
         </p:spPr>
@@ -5674,7 +5662,7 @@
         </p:nvSpPr>
         <p:spPr>
           <a:xfrm>
-            <a:off x="3162705" y="3052331"/>
+            <a:off x="3162705" y="2684031"/>
             <a:ext cx="994116" cy="153888"/>
           </a:xfrm>
           <a:prstGeom prst="rect">
@@ -5695,9 +5683,6 @@
             <a:pPr algn="ctr"/>
             <a:r>
               <a:rPr lang="en-US" sz="1000" b="1" dirty="0" err="1">
-                <a:solidFill>
-                  <a:srgbClr val="FF0000"/>
-                </a:solidFill>
                 <a:latin typeface="Helvetica"/>
                 <a:cs typeface="Helvetica"/>
               </a:rPr>
@@ -5705,18 +5690,12 @@
             </a:r>
             <a:r>
               <a:rPr lang="en-US" sz="1000" b="1" baseline="-25000" dirty="0" err="1">
-                <a:solidFill>
-                  <a:srgbClr val="FF0000"/>
-                </a:solidFill>
                 <a:latin typeface="Helvetica"/>
                 <a:cs typeface="Helvetica"/>
               </a:rPr>
               <a:t>repro</a:t>
             </a:r>
             <a:endParaRPr lang="en-US" sz="1000" b="1" baseline="-25000" dirty="0">
-              <a:solidFill>
-                <a:srgbClr val="FF0000"/>
-              </a:solidFill>
               <a:latin typeface="Helvetica"/>
               <a:cs typeface="Helvetica"/>
             </a:endParaRPr>
@@ -5731,7 +5710,7 @@
         </p:nvSpPr>
         <p:spPr>
           <a:xfrm>
-            <a:off x="4440193" y="3822900"/>
+            <a:off x="4440193" y="3454600"/>
             <a:ext cx="666274" cy="153888"/>
           </a:xfrm>
           <a:prstGeom prst="rect">
@@ -5752,18 +5731,12 @@
             <a:pPr algn="ctr"/>
             <a:r>
               <a:rPr lang="en-US" sz="1000" b="1" dirty="0" err="1">
-                <a:solidFill>
-                  <a:srgbClr val="FF0000"/>
-                </a:solidFill>
                 <a:latin typeface="Helvetica"/>
                 <a:cs typeface="Helvetica"/>
               </a:rPr>
               <a:t>Rroot</a:t>
             </a:r>
             <a:endParaRPr lang="en-US" sz="1000" b="1" baseline="-25000" dirty="0">
-              <a:solidFill>
-                <a:srgbClr val="FF0000"/>
-              </a:solidFill>
               <a:latin typeface="Helvetica"/>
               <a:cs typeface="Helvetica"/>
             </a:endParaRPr>
@@ -5778,7 +5751,7 @@
         </p:nvSpPr>
         <p:spPr>
           <a:xfrm rot="16200000">
-            <a:off x="2695499" y="384319"/>
+            <a:off x="2695499" y="16019"/>
             <a:ext cx="664732" cy="2056869"/>
           </a:xfrm>
           <a:prstGeom prst="downArrow">
@@ -5791,7 +5764,7 @@
           </a:solidFill>
           <a:ln>
             <a:solidFill>
-              <a:srgbClr val="FF0000"/>
+              <a:schemeClr val="tx1"/>
             </a:solidFill>
           </a:ln>
         </p:spPr>
@@ -5826,7 +5799,7 @@
         </p:nvSpPr>
         <p:spPr>
           <a:xfrm>
-            <a:off x="2338611" y="1270761"/>
+            <a:off x="2338611" y="902461"/>
             <a:ext cx="1240380" cy="400110"/>
           </a:xfrm>
           <a:prstGeom prst="rect">
@@ -5843,9 +5816,6 @@
             <a:pPr algn="ctr"/>
             <a:r>
               <a:rPr lang="en-US" sz="1000" b="1" dirty="0" err="1">
-                <a:solidFill>
-                  <a:srgbClr val="FF0000"/>
-                </a:solidFill>
                 <a:latin typeface="Helvetica"/>
                 <a:cs typeface="Helvetica"/>
               </a:rPr>
@@ -5853,18 +5823,12 @@
             </a:r>
             <a:r>
               <a:rPr lang="en-US" sz="1000" b="1" baseline="-25000" dirty="0" err="1">
-                <a:solidFill>
-                  <a:srgbClr val="FF0000"/>
-                </a:solidFill>
                 <a:latin typeface="Helvetica"/>
                 <a:cs typeface="Helvetica"/>
               </a:rPr>
               <a:t>auto_ag</a:t>
             </a:r>
             <a:endParaRPr lang="en-US" sz="1000" b="1" baseline="-25000" dirty="0">
-              <a:solidFill>
-                <a:srgbClr val="FF0000"/>
-              </a:solidFill>
               <a:latin typeface="Helvetica"/>
               <a:cs typeface="Helvetica"/>
             </a:endParaRPr>
@@ -5872,9 +5836,6 @@
           <a:p>
             <a:pPr algn="ctr"/>
             <a:endParaRPr lang="en-US" sz="1000" dirty="0">
-              <a:solidFill>
-                <a:srgbClr val="FF0000"/>
-              </a:solidFill>
               <a:latin typeface="Helvetica"/>
               <a:cs typeface="Helvetica"/>
             </a:endParaRPr>
@@ -5889,7 +5850,7 @@
         </p:nvSpPr>
         <p:spPr>
           <a:xfrm>
-            <a:off x="3965120" y="6460980"/>
+            <a:off x="3965120" y="6092680"/>
             <a:ext cx="801096" cy="553998"/>
           </a:xfrm>
           <a:prstGeom prst="rect">
@@ -5908,9 +5869,6 @@
             <a:pPr algn="ctr"/>
             <a:r>
               <a:rPr lang="en-US" sz="1000" b="1" dirty="0">
-                <a:solidFill>
-                  <a:srgbClr val="FF0000"/>
-                </a:solidFill>
                 <a:latin typeface="Helvetica"/>
                 <a:cs typeface="Helvetica"/>
               </a:rPr>
@@ -5918,9 +5876,6 @@
             </a:r>
             <a:r>
               <a:rPr lang="en-US" sz="1000" b="1" baseline="-25000" dirty="0">
-                <a:solidFill>
-                  <a:srgbClr val="FF0000"/>
-                </a:solidFill>
                 <a:latin typeface="Helvetica"/>
                 <a:cs typeface="Helvetica"/>
               </a:rPr>
@@ -5931,9 +5886,6 @@
             <a:pPr algn="ctr"/>
             <a:r>
               <a:rPr lang="en-US" sz="1000" dirty="0">
-                <a:solidFill>
-                  <a:srgbClr val="FF0000"/>
-                </a:solidFill>
                 <a:latin typeface="Helvetica"/>
                 <a:cs typeface="Helvetica"/>
               </a:rPr>
@@ -5950,7 +5902,7 @@
         </p:nvSpPr>
         <p:spPr>
           <a:xfrm>
-            <a:off x="2681531" y="4576734"/>
+            <a:off x="2845671" y="4246174"/>
             <a:ext cx="748123" cy="153888"/>
           </a:xfrm>
           <a:prstGeom prst="rect">
@@ -5970,35 +5922,23 @@
           <a:p>
             <a:pPr algn="ctr"/>
             <a:r>
-              <a:rPr lang="en-US" sz="1000" b="1" dirty="0" err="1">
-                <a:solidFill>
-                  <a:srgbClr val="FF0000"/>
-                </a:solidFill>
+              <a:rPr lang="en-US" sz="1000" b="1" dirty="0" err="1" smtClean="0">
                 <a:latin typeface="Helvetica"/>
                 <a:cs typeface="Helvetica"/>
               </a:rPr>
               <a:t>ANPP</a:t>
             </a:r>
             <a:r>
-              <a:rPr lang="en-US" sz="1000" b="1" baseline="-25000" dirty="0" err="1">
-                <a:solidFill>
-                  <a:srgbClr val="FF0000"/>
-                </a:solidFill>
+              <a:rPr lang="en-US" sz="1000" b="1" baseline="-25000" dirty="0" err="1" smtClean="0">
                 <a:latin typeface="Helvetica"/>
                 <a:cs typeface="Helvetica"/>
               </a:rPr>
               <a:t>branch</a:t>
             </a:r>
-            <a:r>
-              <a:rPr lang="en-US" sz="1000" dirty="0">
-                <a:solidFill>
-                  <a:srgbClr val="FF0000"/>
-                </a:solidFill>
-                <a:latin typeface="Helvetica"/>
-                <a:cs typeface="Helvetica"/>
-              </a:rPr>
-              <a:t>)</a:t>
-            </a:r>
+            <a:endParaRPr lang="en-US" sz="1000" dirty="0">
+              <a:latin typeface="Helvetica"/>
+              <a:cs typeface="Helvetica"/>
+            </a:endParaRPr>
           </a:p>
         </p:txBody>
       </p:sp>
@@ -6010,8 +5950,8 @@
         </p:nvSpPr>
         <p:spPr>
           <a:xfrm>
-            <a:off x="2615774" y="3737348"/>
-            <a:ext cx="123808" cy="1536233"/>
+            <a:off x="2767213" y="3404499"/>
+            <a:ext cx="126462" cy="1727436"/>
           </a:xfrm>
           <a:prstGeom prst="downArrow">
             <a:avLst/>
@@ -6021,7 +5961,7 @@
           </a:solidFill>
           <a:ln>
             <a:solidFill>
-              <a:srgbClr val="FF0000"/>
+              <a:schemeClr val="tx1"/>
             </a:solidFill>
           </a:ln>
         </p:spPr>
@@ -6056,7 +5996,7 @@
         </p:nvSpPr>
         <p:spPr>
           <a:xfrm>
-            <a:off x="5689417" y="7362355"/>
+            <a:off x="6128828" y="6696237"/>
             <a:ext cx="1432846" cy="455201"/>
           </a:xfrm>
           <a:prstGeom prst="rect">
@@ -6067,7 +6007,7 @@
           </a:solidFill>
           <a:ln>
             <a:solidFill>
-              <a:srgbClr val="FF0000"/>
+              <a:schemeClr val="tx1"/>
             </a:solidFill>
           </a:ln>
         </p:spPr>
@@ -6128,8 +6068,8 @@
         </p:nvSpPr>
         <p:spPr>
           <a:xfrm>
-            <a:off x="6025153" y="5584026"/>
-            <a:ext cx="1058964" cy="507805"/>
+            <a:off x="6248392" y="4418482"/>
+            <a:ext cx="1242695" cy="507805"/>
           </a:xfrm>
           <a:prstGeom prst="rect">
             <a:avLst/>
@@ -6139,7 +6079,7 @@
           </a:solidFill>
           <a:ln>
             <a:solidFill>
-              <a:srgbClr val="FF0000"/>
+              <a:schemeClr val="tx1"/>
             </a:solidFill>
           </a:ln>
         </p:spPr>
@@ -6190,8 +6130,8 @@
         </p:nvSpPr>
         <p:spPr>
           <a:xfrm>
-            <a:off x="6017146" y="5037552"/>
-            <a:ext cx="1058964" cy="507805"/>
+            <a:off x="6108214" y="3264949"/>
+            <a:ext cx="1338444" cy="507805"/>
           </a:xfrm>
           <a:prstGeom prst="rect">
             <a:avLst/>
@@ -6201,7 +6141,7 @@
           </a:solidFill>
           <a:ln>
             <a:solidFill>
-              <a:srgbClr val="FF0000"/>
+              <a:schemeClr val="tx1"/>
             </a:solidFill>
           </a:ln>
         </p:spPr>
@@ -6252,8 +6192,8 @@
         </p:nvSpPr>
         <p:spPr>
           <a:xfrm>
-            <a:off x="6019731" y="2867942"/>
-            <a:ext cx="1146965" cy="520658"/>
+            <a:off x="6145593" y="2543282"/>
+            <a:ext cx="1339280" cy="520658"/>
           </a:xfrm>
           <a:prstGeom prst="rect">
             <a:avLst/>
@@ -6287,14 +6227,24 @@
           <a:p>
             <a:pPr algn="ctr"/>
             <a:r>
-              <a:rPr lang="en-US" sz="1000" b="1" dirty="0" smtClean="0">
+              <a:rPr lang="en-US" sz="1000" b="1" smtClean="0">
                 <a:solidFill>
                   <a:schemeClr val="tx1"/>
                 </a:solidFill>
                 <a:latin typeface="Helvetica"/>
                 <a:cs typeface="Helvetica"/>
               </a:rPr>
-              <a:t>woody biomass</a:t>
+              <a:t>woody </a:t>
+            </a:r>
+            <a:r>
+              <a:rPr lang="en-US" sz="1000" b="1" smtClean="0">
+                <a:solidFill>
+                  <a:schemeClr val="tx1"/>
+                </a:solidFill>
+                <a:latin typeface="Helvetica"/>
+                <a:cs typeface="Helvetica"/>
+              </a:rPr>
+              <a:t>ag biomass</a:t>
             </a:r>
             <a:endParaRPr lang="en-US" sz="1000" b="1" dirty="0">
               <a:solidFill>
@@ -6340,8 +6290,8 @@
         </p:nvSpPr>
         <p:spPr>
           <a:xfrm rot="18346085">
-            <a:off x="3020434" y="3469942"/>
-            <a:ext cx="199836" cy="931227"/>
+            <a:off x="3131414" y="3195024"/>
+            <a:ext cx="193397" cy="796985"/>
           </a:xfrm>
           <a:prstGeom prst="downArrow">
             <a:avLst/>
@@ -6386,7 +6336,7 @@
         </p:nvSpPr>
         <p:spPr>
           <a:xfrm>
-            <a:off x="2608512" y="3307263"/>
+            <a:off x="1554054" y="2940452"/>
             <a:ext cx="748123" cy="153888"/>
           </a:xfrm>
           <a:prstGeom prst="rect">
@@ -6407,9 +6357,6 @@
             <a:pPr algn="ctr"/>
             <a:r>
               <a:rPr lang="en-US" sz="1000" b="1" dirty="0" err="1" smtClean="0">
-                <a:solidFill>
-                  <a:srgbClr val="FF0000"/>
-                </a:solidFill>
                 <a:latin typeface="Helvetica"/>
                 <a:cs typeface="Helvetica"/>
               </a:rPr>
@@ -6417,18 +6364,12 @@
             </a:r>
             <a:r>
               <a:rPr lang="en-US" sz="1000" b="1" baseline="-25000" dirty="0" err="1" smtClean="0">
-                <a:solidFill>
-                  <a:srgbClr val="FF0000"/>
-                </a:solidFill>
                 <a:latin typeface="Helvetica"/>
                 <a:cs typeface="Helvetica"/>
               </a:rPr>
               <a:t>woody</a:t>
             </a:r>
             <a:endParaRPr lang="en-US" sz="1000" dirty="0">
-              <a:solidFill>
-                <a:srgbClr val="FF0000"/>
-              </a:solidFill>
               <a:latin typeface="Helvetica"/>
               <a:cs typeface="Helvetica"/>
             </a:endParaRPr>
@@ -6446,15 +6387,15 @@
         </p:nvCxnSpPr>
         <p:spPr>
           <a:xfrm>
-            <a:off x="8280496" y="2949503"/>
-            <a:ext cx="125215" cy="1061947"/>
+            <a:off x="8104061" y="1981703"/>
+            <a:ext cx="190702" cy="702599"/>
           </a:xfrm>
           <a:prstGeom prst="bentConnector2">
             <a:avLst/>
           </a:prstGeom>
           <a:ln>
             <a:solidFill>
-              <a:srgbClr val="FF0000"/>
+              <a:schemeClr val="tx1"/>
             </a:solidFill>
           </a:ln>
         </p:spPr>
@@ -6484,15 +6425,15 @@
         </p:nvCxnSpPr>
         <p:spPr>
           <a:xfrm rot="5400000">
-            <a:off x="7025308" y="5853695"/>
-            <a:ext cx="2654784" cy="106022"/>
+            <a:off x="6676166" y="4771385"/>
+            <a:ext cx="3137817" cy="99379"/>
           </a:xfrm>
           <a:prstGeom prst="bentConnector2">
             <a:avLst/>
           </a:prstGeom>
           <a:ln>
             <a:solidFill>
-              <a:srgbClr val="FF0000"/>
+              <a:schemeClr val="tx1"/>
             </a:solidFill>
           </a:ln>
         </p:spPr>
@@ -6519,7 +6460,7 @@
         </p:nvSpPr>
         <p:spPr>
           <a:xfrm rot="19529667" flipH="1">
-            <a:off x="4279423" y="4015155"/>
+            <a:off x="4317407" y="3621358"/>
             <a:ext cx="233537" cy="3076729"/>
           </a:xfrm>
           <a:prstGeom prst="downArrow">
@@ -6530,7 +6471,276 @@
           </a:solidFill>
           <a:ln>
             <a:solidFill>
-              <a:srgbClr val="FF0000"/>
+              <a:schemeClr val="tx1"/>
+            </a:solidFill>
+          </a:ln>
+        </p:spPr>
+        <p:style>
+          <a:lnRef idx="1">
+            <a:schemeClr val="accent1"/>
+          </a:lnRef>
+          <a:fillRef idx="3">
+            <a:schemeClr val="accent1"/>
+          </a:fillRef>
+          <a:effectRef idx="2">
+            <a:schemeClr val="accent1"/>
+          </a:effectRef>
+          <a:fontRef idx="minor">
+            <a:schemeClr val="lt1"/>
+          </a:fontRef>
+        </p:style>
+        <p:txBody>
+          <a:bodyPr rtlCol="0" anchor="ctr"/>
+          <a:lstStyle/>
+          <a:p>
+            <a:pPr algn="ctr"/>
+            <a:endParaRPr lang="en-US"/>
+          </a:p>
+        </p:txBody>
+      </p:sp>
+      <p:cxnSp>
+        <p:nvCxnSpPr>
+          <p:cNvPr id="4" name="Elbow Connector 3"/>
+          <p:cNvCxnSpPr>
+            <a:stCxn id="30" idx="3"/>
+            <a:endCxn id="31" idx="0"/>
+          </p:cNvCxnSpPr>
+          <p:nvPr/>
+        </p:nvCxnSpPr>
+        <p:spPr>
+          <a:xfrm>
+            <a:off x="7499465" y="1110642"/>
+            <a:ext cx="52147" cy="529979"/>
+          </a:xfrm>
+          <a:prstGeom prst="bentConnector2">
+            <a:avLst/>
+          </a:prstGeom>
+          <a:ln>
+            <a:solidFill>
+              <a:schemeClr val="tx1"/>
+            </a:solidFill>
+          </a:ln>
+        </p:spPr>
+        <p:style>
+          <a:lnRef idx="1">
+            <a:schemeClr val="accent1"/>
+          </a:lnRef>
+          <a:fillRef idx="0">
+            <a:schemeClr val="accent1"/>
+          </a:fillRef>
+          <a:effectRef idx="0">
+            <a:schemeClr val="accent1"/>
+          </a:effectRef>
+          <a:fontRef idx="minor">
+            <a:schemeClr val="tx1"/>
+          </a:fontRef>
+        </p:style>
+      </p:cxnSp>
+      <p:cxnSp>
+        <p:nvCxnSpPr>
+          <p:cNvPr id="9" name="Elbow Connector 8"/>
+          <p:cNvCxnSpPr>
+            <a:stCxn id="69" idx="3"/>
+            <a:endCxn id="31" idx="2"/>
+          </p:cNvCxnSpPr>
+          <p:nvPr/>
+        </p:nvCxnSpPr>
+        <p:spPr>
+          <a:xfrm flipV="1">
+            <a:off x="7484873" y="2322785"/>
+            <a:ext cx="66739" cy="480826"/>
+          </a:xfrm>
+          <a:prstGeom prst="bentConnector2">
+            <a:avLst/>
+          </a:prstGeom>
+          <a:ln>
+            <a:solidFill>
+              <a:schemeClr val="tx1"/>
+            </a:solidFill>
+          </a:ln>
+        </p:spPr>
+        <p:style>
+          <a:lnRef idx="1">
+            <a:schemeClr val="accent1"/>
+          </a:lnRef>
+          <a:fillRef idx="0">
+            <a:schemeClr val="accent1"/>
+          </a:fillRef>
+          <a:effectRef idx="0">
+            <a:schemeClr val="accent1"/>
+          </a:effectRef>
+          <a:fontRef idx="minor">
+            <a:schemeClr val="tx1"/>
+          </a:fontRef>
+        </p:style>
+      </p:cxnSp>
+      <p:cxnSp>
+        <p:nvCxnSpPr>
+          <p:cNvPr id="43" name="Elbow Connector 42"/>
+          <p:cNvCxnSpPr>
+            <a:stCxn id="68" idx="3"/>
+            <a:endCxn id="13" idx="0"/>
+          </p:cNvCxnSpPr>
+          <p:nvPr/>
+        </p:nvCxnSpPr>
+        <p:spPr>
+          <a:xfrm>
+            <a:off x="7446658" y="3518852"/>
+            <a:ext cx="219244" cy="288047"/>
+          </a:xfrm>
+          <a:prstGeom prst="bentConnector2">
+            <a:avLst/>
+          </a:prstGeom>
+          <a:ln>
+            <a:solidFill>
+              <a:schemeClr val="tx1"/>
+            </a:solidFill>
+          </a:ln>
+        </p:spPr>
+        <p:style>
+          <a:lnRef idx="1">
+            <a:schemeClr val="accent1"/>
+          </a:lnRef>
+          <a:fillRef idx="0">
+            <a:schemeClr val="accent1"/>
+          </a:fillRef>
+          <a:effectRef idx="0">
+            <a:schemeClr val="accent1"/>
+          </a:effectRef>
+          <a:fontRef idx="minor">
+            <a:schemeClr val="tx1"/>
+          </a:fontRef>
+        </p:style>
+      </p:cxnSp>
+      <p:cxnSp>
+        <p:nvCxnSpPr>
+          <p:cNvPr id="45" name="Elbow Connector 44"/>
+          <p:cNvCxnSpPr>
+            <a:stCxn id="67" idx="3"/>
+            <a:endCxn id="13" idx="2"/>
+          </p:cNvCxnSpPr>
+          <p:nvPr/>
+        </p:nvCxnSpPr>
+        <p:spPr>
+          <a:xfrm flipV="1">
+            <a:off x="7491087" y="4314704"/>
+            <a:ext cx="174815" cy="357681"/>
+          </a:xfrm>
+          <a:prstGeom prst="bentConnector2">
+            <a:avLst/>
+          </a:prstGeom>
+          <a:ln>
+            <a:solidFill>
+              <a:schemeClr val="tx1"/>
+            </a:solidFill>
+          </a:ln>
+        </p:spPr>
+        <p:style>
+          <a:lnRef idx="1">
+            <a:schemeClr val="accent1"/>
+          </a:lnRef>
+          <a:fillRef idx="0">
+            <a:schemeClr val="accent1"/>
+          </a:fillRef>
+          <a:effectRef idx="0">
+            <a:schemeClr val="accent1"/>
+          </a:effectRef>
+          <a:fontRef idx="minor">
+            <a:schemeClr val="tx1"/>
+          </a:fontRef>
+        </p:style>
+      </p:cxnSp>
+      <p:cxnSp>
+        <p:nvCxnSpPr>
+          <p:cNvPr id="83" name="Elbow Connector 82"/>
+          <p:cNvCxnSpPr>
+            <a:stCxn id="53" idx="3"/>
+            <a:endCxn id="12" idx="0"/>
+          </p:cNvCxnSpPr>
+          <p:nvPr/>
+        </p:nvCxnSpPr>
+        <p:spPr>
+          <a:xfrm>
+            <a:off x="7502914" y="5835275"/>
+            <a:ext cx="102588" cy="301707"/>
+          </a:xfrm>
+          <a:prstGeom prst="bentConnector2">
+            <a:avLst/>
+          </a:prstGeom>
+          <a:ln>
+            <a:solidFill>
+              <a:schemeClr val="tx1"/>
+            </a:solidFill>
+          </a:ln>
+        </p:spPr>
+        <p:style>
+          <a:lnRef idx="1">
+            <a:schemeClr val="accent1"/>
+          </a:lnRef>
+          <a:fillRef idx="0">
+            <a:schemeClr val="accent1"/>
+          </a:fillRef>
+          <a:effectRef idx="0">
+            <a:schemeClr val="accent1"/>
+          </a:effectRef>
+          <a:fontRef idx="minor">
+            <a:schemeClr val="tx1"/>
+          </a:fontRef>
+        </p:style>
+      </p:cxnSp>
+      <p:cxnSp>
+        <p:nvCxnSpPr>
+          <p:cNvPr id="85" name="Elbow Connector 84"/>
+          <p:cNvCxnSpPr>
+            <a:stCxn id="66" idx="3"/>
+            <a:endCxn id="12" idx="2"/>
+          </p:cNvCxnSpPr>
+          <p:nvPr/>
+        </p:nvCxnSpPr>
+        <p:spPr>
+          <a:xfrm flipV="1">
+            <a:off x="7561674" y="6642984"/>
+            <a:ext cx="43828" cy="280854"/>
+          </a:xfrm>
+          <a:prstGeom prst="bentConnector2">
+            <a:avLst/>
+          </a:prstGeom>
+        </p:spPr>
+        <p:style>
+          <a:lnRef idx="1">
+            <a:schemeClr val="accent1"/>
+          </a:lnRef>
+          <a:fillRef idx="0">
+            <a:schemeClr val="accent1"/>
+          </a:fillRef>
+          <a:effectRef idx="0">
+            <a:schemeClr val="accent1"/>
+          </a:effectRef>
+          <a:fontRef idx="minor">
+            <a:schemeClr val="tx1"/>
+          </a:fontRef>
+        </p:style>
+      </p:cxnSp>
+      <p:sp>
+        <p:nvSpPr>
+          <p:cNvPr id="143" name="Down Arrow 142"/>
+          <p:cNvSpPr/>
+          <p:nvPr/>
+        </p:nvSpPr>
+        <p:spPr>
+          <a:xfrm rot="1148444" flipH="1">
+            <a:off x="2869477" y="2845294"/>
+            <a:ext cx="69469" cy="2128586"/>
+          </a:xfrm>
+          <a:prstGeom prst="downArrow">
+            <a:avLst/>
+          </a:prstGeom>
+          <a:solidFill>
+            <a:schemeClr val="accent3"/>
+          </a:solidFill>
+          <a:ln>
+            <a:solidFill>
+              <a:srgbClr val="4A452A"/>
             </a:solidFill>
           </a:ln>
         </p:spPr>

</xml_diff>

<commit_message>
added ∆AGB to C cycle diagram
</commit_message>
<xml_diff>
--- a/figures/C_cycle_diagrams/rough_draft_C_cycle_diagram.pptx
+++ b/figures/C_cycle_diagrams/rough_draft_C_cycle_diagram.pptx
@@ -214,7 +214,7 @@
           <a:p>
             <a:fld id="{D26A1CBE-BB6E-4336-B9D2-0DBF25804396}" type="datetimeFigureOut">
               <a:rPr lang="en-US" smtClean="0"/>
-              <a:t>3/13/18</a:t>
+              <a:t>3/15/18</a:t>
             </a:fld>
             <a:endParaRPr lang="en-US"/>
           </a:p>
@@ -730,7 +730,7 @@
           <a:p>
             <a:fld id="{3D51230C-6699-44FE-8AB2-9F66E2F4BD1B}" type="datetimeFigureOut">
               <a:rPr lang="en-US" smtClean="0"/>
-              <a:t>3/13/18</a:t>
+              <a:t>3/15/18</a:t>
             </a:fld>
             <a:endParaRPr lang="en-US"/>
           </a:p>
@@ -895,7 +895,7 @@
           <a:p>
             <a:fld id="{3D51230C-6699-44FE-8AB2-9F66E2F4BD1B}" type="datetimeFigureOut">
               <a:rPr lang="en-US" smtClean="0"/>
-              <a:t>3/13/18</a:t>
+              <a:t>3/15/18</a:t>
             </a:fld>
             <a:endParaRPr lang="en-US"/>
           </a:p>
@@ -1070,7 +1070,7 @@
           <a:p>
             <a:fld id="{3D51230C-6699-44FE-8AB2-9F66E2F4BD1B}" type="datetimeFigureOut">
               <a:rPr lang="en-US" smtClean="0"/>
-              <a:t>3/13/18</a:t>
+              <a:t>3/15/18</a:t>
             </a:fld>
             <a:endParaRPr lang="en-US"/>
           </a:p>
@@ -1235,7 +1235,7 @@
           <a:p>
             <a:fld id="{3D51230C-6699-44FE-8AB2-9F66E2F4BD1B}" type="datetimeFigureOut">
               <a:rPr lang="en-US" smtClean="0"/>
-              <a:t>3/13/18</a:t>
+              <a:t>3/15/18</a:t>
             </a:fld>
             <a:endParaRPr lang="en-US"/>
           </a:p>
@@ -1474,7 +1474,7 @@
           <a:p>
             <a:fld id="{3D51230C-6699-44FE-8AB2-9F66E2F4BD1B}" type="datetimeFigureOut">
               <a:rPr lang="en-US" smtClean="0"/>
-              <a:t>3/13/18</a:t>
+              <a:t>3/15/18</a:t>
             </a:fld>
             <a:endParaRPr lang="en-US"/>
           </a:p>
@@ -1701,7 +1701,7 @@
           <a:p>
             <a:fld id="{3D51230C-6699-44FE-8AB2-9F66E2F4BD1B}" type="datetimeFigureOut">
               <a:rPr lang="en-US" smtClean="0"/>
-              <a:t>3/13/18</a:t>
+              <a:t>3/15/18</a:t>
             </a:fld>
             <a:endParaRPr lang="en-US"/>
           </a:p>
@@ -2063,7 +2063,7 @@
           <a:p>
             <a:fld id="{3D51230C-6699-44FE-8AB2-9F66E2F4BD1B}" type="datetimeFigureOut">
               <a:rPr lang="en-US" smtClean="0"/>
-              <a:t>3/13/18</a:t>
+              <a:t>3/15/18</a:t>
             </a:fld>
             <a:endParaRPr lang="en-US"/>
           </a:p>
@@ -2176,7 +2176,7 @@
           <a:p>
             <a:fld id="{3D51230C-6699-44FE-8AB2-9F66E2F4BD1B}" type="datetimeFigureOut">
               <a:rPr lang="en-US" smtClean="0"/>
-              <a:t>3/13/18</a:t>
+              <a:t>3/15/18</a:t>
             </a:fld>
             <a:endParaRPr lang="en-US"/>
           </a:p>
@@ -2266,7 +2266,7 @@
           <a:p>
             <a:fld id="{3D51230C-6699-44FE-8AB2-9F66E2F4BD1B}" type="datetimeFigureOut">
               <a:rPr lang="en-US" smtClean="0"/>
-              <a:t>3/13/18</a:t>
+              <a:t>3/15/18</a:t>
             </a:fld>
             <a:endParaRPr lang="en-US"/>
           </a:p>
@@ -2538,7 +2538,7 @@
           <a:p>
             <a:fld id="{3D51230C-6699-44FE-8AB2-9F66E2F4BD1B}" type="datetimeFigureOut">
               <a:rPr lang="en-US" smtClean="0"/>
-              <a:t>3/13/18</a:t>
+              <a:t>3/15/18</a:t>
             </a:fld>
             <a:endParaRPr lang="en-US"/>
           </a:p>
@@ -2790,7 +2790,7 @@
           <a:p>
             <a:fld id="{3D51230C-6699-44FE-8AB2-9F66E2F4BD1B}" type="datetimeFigureOut">
               <a:rPr lang="en-US" smtClean="0"/>
-              <a:t>3/13/18</a:t>
+              <a:t>3/15/18</a:t>
             </a:fld>
             <a:endParaRPr lang="en-US"/>
           </a:p>
@@ -2998,7 +2998,7 @@
           <a:p>
             <a:fld id="{3D51230C-6699-44FE-8AB2-9F66E2F4BD1B}" type="datetimeFigureOut">
               <a:rPr lang="en-US" smtClean="0"/>
-              <a:t>3/13/18</a:t>
+              <a:t>3/15/18</a:t>
             </a:fld>
             <a:endParaRPr lang="en-US"/>
           </a:p>
@@ -6234,17 +6234,7 @@
                 <a:latin typeface="Helvetica"/>
                 <a:cs typeface="Helvetica"/>
               </a:rPr>
-              <a:t>woody </a:t>
-            </a:r>
-            <a:r>
-              <a:rPr lang="en-US" sz="1000" b="1" smtClean="0">
-                <a:solidFill>
-                  <a:schemeClr val="tx1"/>
-                </a:solidFill>
-                <a:latin typeface="Helvetica"/>
-                <a:cs typeface="Helvetica"/>
-              </a:rPr>
-              <a:t>ag biomass</a:t>
+              <a:t>woody ag biomass</a:t>
             </a:r>
             <a:endParaRPr lang="en-US" sz="1000" b="1" dirty="0">
               <a:solidFill>
@@ -6764,6 +6754,50 @@
           <a:p>
             <a:pPr algn="ctr"/>
             <a:endParaRPr lang="en-US"/>
+          </a:p>
+        </p:txBody>
+      </p:sp>
+      <p:sp>
+        <p:nvSpPr>
+          <p:cNvPr id="72" name="Rectangle 71"/>
+          <p:cNvSpPr/>
+          <p:nvPr/>
+        </p:nvSpPr>
+        <p:spPr>
+          <a:xfrm>
+            <a:off x="2488769" y="1607000"/>
+            <a:ext cx="1404919" cy="246221"/>
+          </a:xfrm>
+          <a:prstGeom prst="rect">
+            <a:avLst/>
+          </a:prstGeom>
+          <a:solidFill>
+            <a:srgbClr val="FFFFFF">
+              <a:alpha val="64000"/>
+            </a:srgbClr>
+          </a:solidFill>
+          <a:ln>
+            <a:noFill/>
+          </a:ln>
+        </p:spPr>
+        <p:txBody>
+          <a:bodyPr wrap="square">
+            <a:spAutoFit/>
+          </a:bodyPr>
+          <a:lstStyle/>
+          <a:p>
+            <a:pPr algn="ctr"/>
+            <a:r>
+              <a:rPr lang="en-US" sz="1000" b="1" smtClean="0">
+                <a:latin typeface="Helvetica"/>
+                <a:cs typeface="Helvetica"/>
+              </a:rPr>
+              <a:t>∆AGB</a:t>
+            </a:r>
+            <a:endParaRPr lang="en-US" sz="1000" b="1" dirty="0">
+              <a:latin typeface="Helvetica"/>
+              <a:cs typeface="Helvetica"/>
+            </a:endParaRPr>
           </a:p>
         </p:txBody>
       </p:sp>

</xml_diff>

<commit_message>
updated draft C cycle diagram
</commit_message>
<xml_diff>
--- a/figures/C_cycle_diagrams/rough_draft_C_cycle_diagram.pptx
+++ b/figures/C_cycle_diagrams/rough_draft_C_cycle_diagram.pptx
@@ -5,10 +5,11 @@
     <p:sldMasterId id="2147483732" r:id="rId1"/>
   </p:sldMasterIdLst>
   <p:notesMasterIdLst>
-    <p:notesMasterId r:id="rId3"/>
+    <p:notesMasterId r:id="rId4"/>
   </p:notesMasterIdLst>
   <p:sldIdLst>
     <p:sldId id="260" r:id="rId2"/>
+    <p:sldId id="261" r:id="rId3"/>
   </p:sldIdLst>
   <p:sldSz cx="10058400" cy="7875588"/>
   <p:notesSz cx="6858000" cy="9144000"/>
@@ -214,7 +215,7 @@
           <a:p>
             <a:fld id="{D26A1CBE-BB6E-4336-B9D2-0DBF25804396}" type="datetimeFigureOut">
               <a:rPr lang="en-US" smtClean="0"/>
-              <a:t>3/15/18</a:t>
+              <a:t>4/11/18</a:t>
             </a:fld>
             <a:endParaRPr lang="en-US"/>
           </a:p>
@@ -531,34 +532,6 @@
           <a:bodyPr/>
           <a:lstStyle/>
           <a:p>
-            <a:pPr marL="0" marR="0" indent="0" algn="l" defTabSz="914400" rtl="0" eaLnBrk="1" fontAlgn="auto" latinLnBrk="0" hangingPunct="1">
-              <a:lnSpc>
-                <a:spcPct val="100000"/>
-              </a:lnSpc>
-              <a:spcBef>
-                <a:spcPts val="0"/>
-              </a:spcBef>
-              <a:spcAft>
-                <a:spcPts val="0"/>
-              </a:spcAft>
-              <a:buClrTx/>
-              <a:buSzTx/>
-              <a:buFontTx/>
-              <a:buNone/>
-              <a:tabLst/>
-              <a:defRPr/>
-            </a:pPr>
-            <a:r>
-              <a:rPr lang="en-US" dirty="0" smtClean="0"/>
-              <a:t>Red </a:t>
-            </a:r>
-            <a:r>
-              <a:rPr lang="en-US" smtClean="0"/>
-              <a:t>indicates changes</a:t>
-            </a:r>
-            <a:endParaRPr lang="en-US" dirty="0" smtClean="0"/>
-          </a:p>
-          <a:p>
             <a:endParaRPr lang="en-US" dirty="0"/>
           </a:p>
         </p:txBody>
@@ -590,6 +563,95 @@
     <p:extLst>
       <p:ext uri="{BB962C8B-B14F-4D97-AF65-F5344CB8AC3E}">
         <p14:creationId xmlns:p14="http://schemas.microsoft.com/office/powerpoint/2010/main" val="3215559286"/>
+      </p:ext>
+    </p:extLst>
+  </p:cSld>
+  <p:clrMapOvr>
+    <a:masterClrMapping/>
+  </p:clrMapOvr>
+</p:notes>
+</file>
+
+<file path=ppt/notesSlides/notesSlide2.xml><?xml version="1.0" encoding="utf-8"?>
+<p:notes xmlns:a="http://schemas.openxmlformats.org/drawingml/2006/main" xmlns:r="http://schemas.openxmlformats.org/officeDocument/2006/relationships" xmlns:p="http://schemas.openxmlformats.org/presentationml/2006/main">
+  <p:cSld>
+    <p:spTree>
+      <p:nvGrpSpPr>
+        <p:cNvPr id="1" name=""/>
+        <p:cNvGrpSpPr/>
+        <p:nvPr/>
+      </p:nvGrpSpPr>
+      <p:grpSpPr>
+        <a:xfrm>
+          <a:off x="0" y="0"/>
+          <a:ext cx="0" cy="0"/>
+          <a:chOff x="0" y="0"/>
+          <a:chExt cx="0" cy="0"/>
+        </a:xfrm>
+      </p:grpSpPr>
+      <p:sp>
+        <p:nvSpPr>
+          <p:cNvPr id="2" name="Slide Image Placeholder 1"/>
+          <p:cNvSpPr>
+            <a:spLocks noGrp="1" noRot="1" noChangeAspect="1"/>
+          </p:cNvSpPr>
+          <p:nvPr>
+            <p:ph type="sldImg"/>
+          </p:nvPr>
+        </p:nvSpPr>
+        <p:spPr>
+          <a:xfrm>
+            <a:off x="1458913" y="1143000"/>
+            <a:ext cx="3940175" cy="3086100"/>
+          </a:xfrm>
+        </p:spPr>
+      </p:sp>
+      <p:sp>
+        <p:nvSpPr>
+          <p:cNvPr id="3" name="Notes Placeholder 2"/>
+          <p:cNvSpPr>
+            <a:spLocks noGrp="1"/>
+          </p:cNvSpPr>
+          <p:nvPr>
+            <p:ph type="body" idx="1"/>
+          </p:nvPr>
+        </p:nvSpPr>
+        <p:spPr/>
+        <p:txBody>
+          <a:bodyPr/>
+          <a:lstStyle/>
+          <a:p>
+            <a:endParaRPr lang="en-US" dirty="0"/>
+          </a:p>
+        </p:txBody>
+      </p:sp>
+      <p:sp>
+        <p:nvSpPr>
+          <p:cNvPr id="4" name="Slide Number Placeholder 3"/>
+          <p:cNvSpPr>
+            <a:spLocks noGrp="1"/>
+          </p:cNvSpPr>
+          <p:nvPr>
+            <p:ph type="sldNum" sz="quarter" idx="10"/>
+          </p:nvPr>
+        </p:nvSpPr>
+        <p:spPr/>
+        <p:txBody>
+          <a:bodyPr/>
+          <a:lstStyle/>
+          <a:p>
+            <a:fld id="{B8EBD99C-08D7-4F61-AA50-EFB7CB305AFE}" type="slidenum">
+              <a:rPr lang="en-US" smtClean="0"/>
+              <a:t>2</a:t>
+            </a:fld>
+            <a:endParaRPr lang="en-US"/>
+          </a:p>
+        </p:txBody>
+      </p:sp>
+    </p:spTree>
+    <p:extLst>
+      <p:ext uri="{BB962C8B-B14F-4D97-AF65-F5344CB8AC3E}">
+        <p14:creationId xmlns:p14="http://schemas.microsoft.com/office/powerpoint/2010/main" val="592671858"/>
       </p:ext>
     </p:extLst>
   </p:cSld>
@@ -730,7 +792,7 @@
           <a:p>
             <a:fld id="{3D51230C-6699-44FE-8AB2-9F66E2F4BD1B}" type="datetimeFigureOut">
               <a:rPr lang="en-US" smtClean="0"/>
-              <a:t>3/15/18</a:t>
+              <a:t>4/11/18</a:t>
             </a:fld>
             <a:endParaRPr lang="en-US"/>
           </a:p>
@@ -895,7 +957,7 @@
           <a:p>
             <a:fld id="{3D51230C-6699-44FE-8AB2-9F66E2F4BD1B}" type="datetimeFigureOut">
               <a:rPr lang="en-US" smtClean="0"/>
-              <a:t>3/15/18</a:t>
+              <a:t>4/11/18</a:t>
             </a:fld>
             <a:endParaRPr lang="en-US"/>
           </a:p>
@@ -1070,7 +1132,7 @@
           <a:p>
             <a:fld id="{3D51230C-6699-44FE-8AB2-9F66E2F4BD1B}" type="datetimeFigureOut">
               <a:rPr lang="en-US" smtClean="0"/>
-              <a:t>3/15/18</a:t>
+              <a:t>4/11/18</a:t>
             </a:fld>
             <a:endParaRPr lang="en-US"/>
           </a:p>
@@ -1235,7 +1297,7 @@
           <a:p>
             <a:fld id="{3D51230C-6699-44FE-8AB2-9F66E2F4BD1B}" type="datetimeFigureOut">
               <a:rPr lang="en-US" smtClean="0"/>
-              <a:t>3/15/18</a:t>
+              <a:t>4/11/18</a:t>
             </a:fld>
             <a:endParaRPr lang="en-US"/>
           </a:p>
@@ -1474,7 +1536,7 @@
           <a:p>
             <a:fld id="{3D51230C-6699-44FE-8AB2-9F66E2F4BD1B}" type="datetimeFigureOut">
               <a:rPr lang="en-US" smtClean="0"/>
-              <a:t>3/15/18</a:t>
+              <a:t>4/11/18</a:t>
             </a:fld>
             <a:endParaRPr lang="en-US"/>
           </a:p>
@@ -1701,7 +1763,7 @@
           <a:p>
             <a:fld id="{3D51230C-6699-44FE-8AB2-9F66E2F4BD1B}" type="datetimeFigureOut">
               <a:rPr lang="en-US" smtClean="0"/>
-              <a:t>3/15/18</a:t>
+              <a:t>4/11/18</a:t>
             </a:fld>
             <a:endParaRPr lang="en-US"/>
           </a:p>
@@ -2063,7 +2125,7 @@
           <a:p>
             <a:fld id="{3D51230C-6699-44FE-8AB2-9F66E2F4BD1B}" type="datetimeFigureOut">
               <a:rPr lang="en-US" smtClean="0"/>
-              <a:t>3/15/18</a:t>
+              <a:t>4/11/18</a:t>
             </a:fld>
             <a:endParaRPr lang="en-US"/>
           </a:p>
@@ -2176,7 +2238,7 @@
           <a:p>
             <a:fld id="{3D51230C-6699-44FE-8AB2-9F66E2F4BD1B}" type="datetimeFigureOut">
               <a:rPr lang="en-US" smtClean="0"/>
-              <a:t>3/15/18</a:t>
+              <a:t>4/11/18</a:t>
             </a:fld>
             <a:endParaRPr lang="en-US"/>
           </a:p>
@@ -2266,7 +2328,7 @@
           <a:p>
             <a:fld id="{3D51230C-6699-44FE-8AB2-9F66E2F4BD1B}" type="datetimeFigureOut">
               <a:rPr lang="en-US" smtClean="0"/>
-              <a:t>3/15/18</a:t>
+              <a:t>4/11/18</a:t>
             </a:fld>
             <a:endParaRPr lang="en-US"/>
           </a:p>
@@ -2538,7 +2600,7 @@
           <a:p>
             <a:fld id="{3D51230C-6699-44FE-8AB2-9F66E2F4BD1B}" type="datetimeFigureOut">
               <a:rPr lang="en-US" smtClean="0"/>
-              <a:t>3/15/18</a:t>
+              <a:t>4/11/18</a:t>
             </a:fld>
             <a:endParaRPr lang="en-US"/>
           </a:p>
@@ -2790,7 +2852,7 @@
           <a:p>
             <a:fld id="{3D51230C-6699-44FE-8AB2-9F66E2F4BD1B}" type="datetimeFigureOut">
               <a:rPr lang="en-US" smtClean="0"/>
-              <a:t>3/15/18</a:t>
+              <a:t>4/11/18</a:t>
             </a:fld>
             <a:endParaRPr lang="en-US"/>
           </a:p>
@@ -2998,7 +3060,7 @@
           <a:p>
             <a:fld id="{3D51230C-6699-44FE-8AB2-9F66E2F4BD1B}" type="datetimeFigureOut">
               <a:rPr lang="en-US" smtClean="0"/>
-              <a:t>3/15/18</a:t>
+              <a:t>4/11/18</a:t>
             </a:fld>
             <a:endParaRPr lang="en-US"/>
           </a:p>
@@ -3405,13 +3467,75 @@
       </p:grpSpPr>
       <p:grpSp>
         <p:nvGrpSpPr>
+          <p:cNvPr id="86" name="Group 85"/>
+          <p:cNvGrpSpPr/>
+          <p:nvPr/>
+        </p:nvGrpSpPr>
+        <p:grpSpPr>
+          <a:xfrm flipH="1">
+            <a:off x="5543103" y="513147"/>
+            <a:ext cx="4064955" cy="6858000"/>
+            <a:chOff x="814404" y="843197"/>
+            <a:chExt cx="4359361" cy="6858000"/>
+          </a:xfrm>
+        </p:grpSpPr>
+        <p:pic>
+          <p:nvPicPr>
+            <p:cNvPr id="87" name="Picture 86"/>
+            <p:cNvPicPr>
+              <a:picLocks noChangeAspect="1"/>
+            </p:cNvPicPr>
+            <p:nvPr/>
+          </p:nvPicPr>
+          <p:blipFill>
+            <a:blip r:embed="rId3"/>
+            <a:stretch>
+              <a:fillRect/>
+            </a:stretch>
+          </p:blipFill>
+          <p:spPr>
+            <a:xfrm>
+              <a:off x="814404" y="843197"/>
+              <a:ext cx="4359361" cy="6858000"/>
+            </a:xfrm>
+            <a:prstGeom prst="rect">
+              <a:avLst/>
+            </a:prstGeom>
+          </p:spPr>
+        </p:pic>
+        <p:pic>
+          <p:nvPicPr>
+            <p:cNvPr id="88" name="Picture 87"/>
+            <p:cNvPicPr>
+              <a:picLocks noChangeAspect="1"/>
+            </p:cNvPicPr>
+            <p:nvPr/>
+          </p:nvPicPr>
+          <p:blipFill rotWithShape="1">
+            <a:blip r:embed="rId4"/>
+            <a:srcRect l="11630"/>
+            <a:stretch/>
+          </p:blipFill>
+          <p:spPr>
+            <a:xfrm>
+              <a:off x="3225398" y="3884124"/>
+              <a:ext cx="594189" cy="850900"/>
+            </a:xfrm>
+            <a:prstGeom prst="rect">
+              <a:avLst/>
+            </a:prstGeom>
+          </p:spPr>
+        </p:pic>
+      </p:grpSp>
+      <p:grpSp>
+        <p:nvGrpSpPr>
           <p:cNvPr id="2" name="Group 1"/>
           <p:cNvGrpSpPr/>
           <p:nvPr/>
         </p:nvGrpSpPr>
         <p:grpSpPr>
           <a:xfrm>
-            <a:off x="1461441" y="498082"/>
+            <a:off x="1296341" y="498082"/>
             <a:ext cx="4359361" cy="6858000"/>
             <a:chOff x="954104" y="843197"/>
             <a:chExt cx="4359361" cy="6858000"/>
@@ -3473,6 +3597,3516 @@
         </p:nvSpPr>
         <p:spPr>
           <a:xfrm>
+            <a:off x="416534" y="415083"/>
+            <a:ext cx="1444751" cy="1002632"/>
+          </a:xfrm>
+          <a:prstGeom prst="downArrow">
+            <a:avLst/>
+          </a:prstGeom>
+          <a:solidFill>
+            <a:schemeClr val="accent3"/>
+          </a:solidFill>
+          <a:ln>
+            <a:solidFill>
+              <a:srgbClr val="4A452A"/>
+            </a:solidFill>
+          </a:ln>
+        </p:spPr>
+        <p:style>
+          <a:lnRef idx="1">
+            <a:schemeClr val="accent1"/>
+          </a:lnRef>
+          <a:fillRef idx="3">
+            <a:schemeClr val="accent1"/>
+          </a:fillRef>
+          <a:effectRef idx="2">
+            <a:schemeClr val="accent1"/>
+          </a:effectRef>
+          <a:fontRef idx="minor">
+            <a:schemeClr val="lt1"/>
+          </a:fontRef>
+        </p:style>
+        <p:txBody>
+          <a:bodyPr rtlCol="0" anchor="ctr"/>
+          <a:lstStyle/>
+          <a:p>
+            <a:pPr algn="ctr"/>
+            <a:endParaRPr lang="en-US"/>
+          </a:p>
+        </p:txBody>
+      </p:sp>
+      <p:sp>
+        <p:nvSpPr>
+          <p:cNvPr id="8" name="Down Arrow 7"/>
+          <p:cNvSpPr/>
+          <p:nvPr/>
+        </p:nvSpPr>
+        <p:spPr>
+          <a:xfrm rot="20728107">
+            <a:off x="1464584" y="2283141"/>
+            <a:ext cx="146304" cy="4458147"/>
+          </a:xfrm>
+          <a:prstGeom prst="downArrow">
+            <a:avLst/>
+          </a:prstGeom>
+          <a:solidFill>
+            <a:schemeClr val="accent3"/>
+          </a:solidFill>
+          <a:ln>
+            <a:solidFill>
+              <a:srgbClr val="4A452A"/>
+            </a:solidFill>
+          </a:ln>
+        </p:spPr>
+        <p:style>
+          <a:lnRef idx="1">
+            <a:schemeClr val="accent1"/>
+          </a:lnRef>
+          <a:fillRef idx="3">
+            <a:schemeClr val="accent1"/>
+          </a:fillRef>
+          <a:effectRef idx="2">
+            <a:schemeClr val="accent1"/>
+          </a:effectRef>
+          <a:fontRef idx="minor">
+            <a:schemeClr val="lt1"/>
+          </a:fontRef>
+        </p:style>
+        <p:txBody>
+          <a:bodyPr rtlCol="0" anchor="ctr"/>
+          <a:lstStyle/>
+          <a:p>
+            <a:pPr algn="ctr"/>
+            <a:endParaRPr lang="en-US"/>
+          </a:p>
+        </p:txBody>
+      </p:sp>
+      <p:sp>
+        <p:nvSpPr>
+          <p:cNvPr id="10" name="Down Arrow 9"/>
+          <p:cNvSpPr/>
+          <p:nvPr/>
+        </p:nvSpPr>
+        <p:spPr>
+          <a:xfrm rot="10800000">
+            <a:off x="4976026" y="415084"/>
+            <a:ext cx="1298448" cy="1005840"/>
+          </a:xfrm>
+          <a:prstGeom prst="downArrow">
+            <a:avLst>
+              <a:gd name="adj1" fmla="val 50000"/>
+              <a:gd name="adj2" fmla="val 31420"/>
+            </a:avLst>
+          </a:prstGeom>
+          <a:solidFill>
+            <a:schemeClr val="bg1">
+              <a:lumMod val="65000"/>
+            </a:schemeClr>
+          </a:solidFill>
+          <a:ln>
+            <a:solidFill>
+              <a:srgbClr val="4A452A"/>
+            </a:solidFill>
+          </a:ln>
+        </p:spPr>
+        <p:style>
+          <a:lnRef idx="1">
+            <a:schemeClr val="accent1"/>
+          </a:lnRef>
+          <a:fillRef idx="3">
+            <a:schemeClr val="accent1"/>
+          </a:fillRef>
+          <a:effectRef idx="2">
+            <a:schemeClr val="accent1"/>
+          </a:effectRef>
+          <a:fontRef idx="minor">
+            <a:schemeClr val="lt1"/>
+          </a:fontRef>
+        </p:style>
+        <p:txBody>
+          <a:bodyPr rtlCol="0" anchor="ctr"/>
+          <a:lstStyle/>
+          <a:p>
+            <a:pPr algn="ctr"/>
+            <a:endParaRPr lang="en-US"/>
+          </a:p>
+        </p:txBody>
+      </p:sp>
+      <p:sp>
+        <p:nvSpPr>
+          <p:cNvPr id="11" name="Down Arrow 10"/>
+          <p:cNvSpPr/>
+          <p:nvPr/>
+        </p:nvSpPr>
+        <p:spPr>
+          <a:xfrm rot="11704169">
+            <a:off x="4691292" y="1887857"/>
+            <a:ext cx="338569" cy="4203277"/>
+          </a:xfrm>
+          <a:prstGeom prst="downArrow">
+            <a:avLst/>
+          </a:prstGeom>
+          <a:solidFill>
+            <a:schemeClr val="bg1">
+              <a:lumMod val="65000"/>
+            </a:schemeClr>
+          </a:solidFill>
+          <a:ln>
+            <a:solidFill>
+              <a:schemeClr val="tx1"/>
+            </a:solidFill>
+          </a:ln>
+        </p:spPr>
+        <p:style>
+          <a:lnRef idx="1">
+            <a:schemeClr val="accent1"/>
+          </a:lnRef>
+          <a:fillRef idx="3">
+            <a:schemeClr val="accent1"/>
+          </a:fillRef>
+          <a:effectRef idx="2">
+            <a:schemeClr val="accent1"/>
+          </a:effectRef>
+          <a:fontRef idx="minor">
+            <a:schemeClr val="lt1"/>
+          </a:fontRef>
+        </p:style>
+        <p:txBody>
+          <a:bodyPr rtlCol="0" anchor="ctr"/>
+          <a:lstStyle/>
+          <a:p>
+            <a:pPr algn="ctr"/>
+            <a:endParaRPr lang="en-US"/>
+          </a:p>
+        </p:txBody>
+      </p:sp>
+      <p:sp>
+        <p:nvSpPr>
+          <p:cNvPr id="12" name="Rectangle 11"/>
+          <p:cNvSpPr/>
+          <p:nvPr/>
+        </p:nvSpPr>
+        <p:spPr>
+          <a:xfrm>
+            <a:off x="7643418" y="6070045"/>
+            <a:ext cx="1179765" cy="506002"/>
+          </a:xfrm>
+          <a:prstGeom prst="rect">
+            <a:avLst/>
+          </a:prstGeom>
+          <a:solidFill>
+            <a:schemeClr val="bg2"/>
+          </a:solidFill>
+          <a:ln>
+            <a:solidFill>
+              <a:srgbClr val="4A452A"/>
+            </a:solidFill>
+          </a:ln>
+        </p:spPr>
+        <p:style>
+          <a:lnRef idx="1">
+            <a:schemeClr val="accent1"/>
+          </a:lnRef>
+          <a:fillRef idx="3">
+            <a:schemeClr val="accent1"/>
+          </a:fillRef>
+          <a:effectRef idx="2">
+            <a:schemeClr val="accent1"/>
+          </a:effectRef>
+          <a:fontRef idx="minor">
+            <a:schemeClr val="lt1"/>
+          </a:fontRef>
+        </p:style>
+        <p:txBody>
+          <a:bodyPr rtlCol="0" anchor="ctr"/>
+          <a:lstStyle/>
+          <a:p>
+            <a:pPr algn="ctr"/>
+            <a:r>
+              <a:rPr lang="en-US" sz="1000" b="1" dirty="0">
+                <a:solidFill>
+                  <a:schemeClr val="tx1"/>
+                </a:solidFill>
+                <a:latin typeface="Helvetica"/>
+                <a:cs typeface="Helvetica"/>
+              </a:rPr>
+              <a:t>root biomass</a:t>
+            </a:r>
+          </a:p>
+          <a:p>
+            <a:pPr algn="ctr"/>
+            <a:r>
+              <a:rPr lang="en-US" sz="1000" dirty="0">
+                <a:solidFill>
+                  <a:schemeClr val="tx1"/>
+                </a:solidFill>
+                <a:latin typeface="Helvetica"/>
+                <a:cs typeface="Helvetica"/>
+              </a:rPr>
+              <a:t>26.5 ± 15.6</a:t>
+            </a:r>
+          </a:p>
+          <a:p>
+            <a:pPr algn="ctr"/>
+            <a:r>
+              <a:rPr lang="en-US" sz="1000" dirty="0">
+                <a:solidFill>
+                  <a:schemeClr val="tx1"/>
+                </a:solidFill>
+                <a:latin typeface="Helvetica"/>
+                <a:cs typeface="Helvetica"/>
+              </a:rPr>
+              <a:t>(39/22/12)</a:t>
+            </a:r>
+          </a:p>
+        </p:txBody>
+      </p:sp>
+      <p:sp>
+        <p:nvSpPr>
+          <p:cNvPr id="13" name="Rectangle 12"/>
+          <p:cNvSpPr/>
+          <p:nvPr/>
+        </p:nvSpPr>
+        <p:spPr>
+          <a:xfrm>
+            <a:off x="6360623" y="5152992"/>
+            <a:ext cx="1058964" cy="507805"/>
+          </a:xfrm>
+          <a:prstGeom prst="rect">
+            <a:avLst/>
+          </a:prstGeom>
+          <a:solidFill>
+            <a:schemeClr val="bg2"/>
+          </a:solidFill>
+          <a:ln>
+            <a:solidFill>
+              <a:srgbClr val="4A452A"/>
+            </a:solidFill>
+          </a:ln>
+        </p:spPr>
+        <p:style>
+          <a:lnRef idx="1">
+            <a:schemeClr val="accent1"/>
+          </a:lnRef>
+          <a:fillRef idx="3">
+            <a:schemeClr val="accent1"/>
+          </a:fillRef>
+          <a:effectRef idx="2">
+            <a:schemeClr val="accent1"/>
+          </a:effectRef>
+          <a:fontRef idx="minor">
+            <a:schemeClr val="lt1"/>
+          </a:fontRef>
+        </p:style>
+        <p:txBody>
+          <a:bodyPr rtlCol="0" anchor="ctr"/>
+          <a:lstStyle/>
+          <a:p>
+            <a:pPr algn="ctr"/>
+            <a:r>
+              <a:rPr lang="en-US" sz="1000" b="1" dirty="0">
+                <a:solidFill>
+                  <a:schemeClr val="tx1"/>
+                </a:solidFill>
+                <a:latin typeface="Helvetica"/>
+                <a:cs typeface="Helvetica"/>
+              </a:rPr>
+              <a:t>dead wood</a:t>
+            </a:r>
+          </a:p>
+          <a:p>
+            <a:pPr algn="ctr"/>
+            <a:r>
+              <a:rPr lang="en-US" sz="1000" dirty="0">
+                <a:solidFill>
+                  <a:schemeClr val="tx1"/>
+                </a:solidFill>
+                <a:latin typeface="Helvetica"/>
+                <a:cs typeface="Helvetica"/>
+              </a:rPr>
+              <a:t>17.6 ± 12.7 (9/9/5)</a:t>
+            </a:r>
+          </a:p>
+        </p:txBody>
+      </p:sp>
+      <p:sp>
+        <p:nvSpPr>
+          <p:cNvPr id="14" name="Rectangle 13"/>
+          <p:cNvSpPr/>
+          <p:nvPr/>
+        </p:nvSpPr>
+        <p:spPr>
+          <a:xfrm>
+            <a:off x="479292" y="3227412"/>
+            <a:ext cx="760115" cy="553998"/>
+          </a:xfrm>
+          <a:prstGeom prst="rect">
+            <a:avLst/>
+          </a:prstGeom>
+        </p:spPr>
+        <p:txBody>
+          <a:bodyPr wrap="square">
+            <a:spAutoFit/>
+          </a:bodyPr>
+          <a:lstStyle/>
+          <a:p>
+            <a:pPr algn="ctr"/>
+            <a:r>
+              <a:rPr lang="en-US" sz="1000" b="1" dirty="0">
+                <a:latin typeface="Helvetica"/>
+                <a:cs typeface="Helvetica"/>
+              </a:rPr>
+              <a:t>BNPP</a:t>
+            </a:r>
+          </a:p>
+          <a:p>
+            <a:pPr algn="ctr"/>
+            <a:r>
+              <a:rPr lang="en-US" sz="1000" dirty="0">
+                <a:latin typeface="Helvetica"/>
+                <a:cs typeface="Helvetica"/>
+              </a:rPr>
+              <a:t>3.1 ± 1.9 (34/30/12)</a:t>
+            </a:r>
+          </a:p>
+        </p:txBody>
+      </p:sp>
+      <p:sp>
+        <p:nvSpPr>
+          <p:cNvPr id="15" name="Rectangle 14"/>
+          <p:cNvSpPr/>
+          <p:nvPr/>
+        </p:nvSpPr>
+        <p:spPr>
+          <a:xfrm>
+            <a:off x="310356" y="1479117"/>
+            <a:ext cx="789394" cy="553998"/>
+          </a:xfrm>
+          <a:prstGeom prst="rect">
+            <a:avLst/>
+          </a:prstGeom>
+        </p:spPr>
+        <p:txBody>
+          <a:bodyPr wrap="square">
+            <a:spAutoFit/>
+          </a:bodyPr>
+          <a:lstStyle/>
+          <a:p>
+            <a:pPr algn="ctr"/>
+            <a:r>
+              <a:rPr lang="en-US" sz="1000" b="1" dirty="0">
+                <a:latin typeface="Helvetica"/>
+                <a:cs typeface="Helvetica"/>
+              </a:rPr>
+              <a:t>NPP</a:t>
+            </a:r>
+          </a:p>
+          <a:p>
+            <a:pPr algn="ctr"/>
+            <a:r>
+              <a:rPr lang="en-US" sz="1000" dirty="0">
+                <a:latin typeface="Helvetica"/>
+                <a:cs typeface="Helvetica"/>
+              </a:rPr>
+              <a:t>8.7 ± 3.7 (50/32/13)</a:t>
+            </a:r>
+          </a:p>
+        </p:txBody>
+      </p:sp>
+      <p:sp>
+        <p:nvSpPr>
+          <p:cNvPr id="16" name="Rectangle 15"/>
+          <p:cNvSpPr/>
+          <p:nvPr/>
+        </p:nvSpPr>
+        <p:spPr>
+          <a:xfrm>
+            <a:off x="1576446" y="4015381"/>
+            <a:ext cx="748123" cy="461665"/>
+          </a:xfrm>
+          <a:prstGeom prst="rect">
+            <a:avLst/>
+          </a:prstGeom>
+          <a:solidFill>
+            <a:schemeClr val="bg1">
+              <a:alpha val="50000"/>
+            </a:schemeClr>
+          </a:solidFill>
+        </p:spPr>
+        <p:txBody>
+          <a:bodyPr wrap="square" lIns="0" tIns="0" rIns="0" bIns="0">
+            <a:spAutoFit/>
+          </a:bodyPr>
+          <a:lstStyle/>
+          <a:p>
+            <a:pPr algn="ctr"/>
+            <a:r>
+              <a:rPr lang="en-US" sz="1000" b="1" dirty="0" err="1">
+                <a:latin typeface="Helvetica"/>
+                <a:cs typeface="Helvetica"/>
+              </a:rPr>
+              <a:t>ANPP</a:t>
+            </a:r>
+            <a:r>
+              <a:rPr lang="en-US" sz="1000" b="1" baseline="-25000" dirty="0" err="1">
+                <a:latin typeface="Helvetica"/>
+                <a:cs typeface="Helvetica"/>
+              </a:rPr>
+              <a:t>foliage</a:t>
+            </a:r>
+            <a:endParaRPr lang="en-US" sz="1000" b="1" baseline="-25000" dirty="0">
+              <a:latin typeface="Helvetica"/>
+              <a:cs typeface="Helvetica"/>
+            </a:endParaRPr>
+          </a:p>
+          <a:p>
+            <a:pPr algn="ctr"/>
+            <a:r>
+              <a:rPr lang="en-US" sz="1000" dirty="0">
+                <a:latin typeface="Helvetica"/>
+                <a:cs typeface="Helvetica"/>
+              </a:rPr>
+              <a:t>3.0 ± 1.2 (43/38/18)</a:t>
+            </a:r>
+          </a:p>
+        </p:txBody>
+      </p:sp>
+      <p:sp>
+        <p:nvSpPr>
+          <p:cNvPr id="17" name="Rectangle 16"/>
+          <p:cNvSpPr/>
+          <p:nvPr/>
+        </p:nvSpPr>
+        <p:spPr>
+          <a:xfrm>
+            <a:off x="3107980" y="3142551"/>
+            <a:ext cx="725652" cy="461665"/>
+          </a:xfrm>
+          <a:prstGeom prst="rect">
+            <a:avLst/>
+          </a:prstGeom>
+          <a:solidFill>
+            <a:srgbClr val="FFFFFF">
+              <a:alpha val="61000"/>
+            </a:srgbClr>
+          </a:solidFill>
+        </p:spPr>
+        <p:txBody>
+          <a:bodyPr wrap="square" lIns="0" tIns="0" rIns="0" bIns="0">
+            <a:spAutoFit/>
+          </a:bodyPr>
+          <a:lstStyle/>
+          <a:p>
+            <a:pPr algn="ctr"/>
+            <a:r>
+              <a:rPr lang="en-US" sz="1000" b="1" dirty="0" err="1">
+                <a:latin typeface="Helvetica"/>
+                <a:cs typeface="Helvetica"/>
+              </a:rPr>
+              <a:t>ANPP</a:t>
+            </a:r>
+            <a:r>
+              <a:rPr lang="en-US" sz="1000" b="1" baseline="-25000" dirty="0" err="1">
+                <a:latin typeface="Helvetica"/>
+                <a:cs typeface="Helvetica"/>
+              </a:rPr>
+              <a:t>stem</a:t>
+            </a:r>
+            <a:endParaRPr lang="en-US" sz="1000" b="1" baseline="-25000" dirty="0">
+              <a:latin typeface="Helvetica"/>
+              <a:cs typeface="Helvetica"/>
+            </a:endParaRPr>
+          </a:p>
+          <a:p>
+            <a:pPr algn="ctr"/>
+            <a:r>
+              <a:rPr lang="en-US" sz="1000" dirty="0">
+                <a:latin typeface="Helvetica"/>
+                <a:cs typeface="Helvetica"/>
+              </a:rPr>
+              <a:t>2.8 ± 1.0 (141/137/40)</a:t>
+            </a:r>
+          </a:p>
+        </p:txBody>
+      </p:sp>
+      <p:sp>
+        <p:nvSpPr>
+          <p:cNvPr id="18" name="Rectangle 17"/>
+          <p:cNvSpPr/>
+          <p:nvPr/>
+        </p:nvSpPr>
+        <p:spPr>
+          <a:xfrm>
+            <a:off x="5231646" y="561872"/>
+            <a:ext cx="804394" cy="553998"/>
+          </a:xfrm>
+          <a:prstGeom prst="rect">
+            <a:avLst/>
+          </a:prstGeom>
+        </p:spPr>
+        <p:txBody>
+          <a:bodyPr wrap="square">
+            <a:spAutoFit/>
+          </a:bodyPr>
+          <a:lstStyle/>
+          <a:p>
+            <a:pPr algn="ctr"/>
+            <a:r>
+              <a:rPr lang="en-US" sz="1000" b="1" dirty="0">
+                <a:latin typeface="Helvetica"/>
+                <a:cs typeface="Helvetica"/>
+              </a:rPr>
+              <a:t>R</a:t>
+            </a:r>
+            <a:r>
+              <a:rPr lang="en-US" sz="1000" b="1" baseline="-25000" dirty="0">
+                <a:latin typeface="Helvetica"/>
+                <a:cs typeface="Helvetica"/>
+              </a:rPr>
+              <a:t>eco</a:t>
+            </a:r>
+          </a:p>
+          <a:p>
+            <a:pPr algn="ctr"/>
+            <a:r>
+              <a:rPr lang="en-US" sz="1000" dirty="0">
+                <a:latin typeface="Helvetica"/>
+                <a:cs typeface="Helvetica"/>
+              </a:rPr>
+              <a:t>28.3 ± 8.2 (29/11/10)</a:t>
+            </a:r>
+          </a:p>
+        </p:txBody>
+      </p:sp>
+      <p:sp>
+        <p:nvSpPr>
+          <p:cNvPr id="19" name="Rectangle 18"/>
+          <p:cNvSpPr/>
+          <p:nvPr/>
+        </p:nvSpPr>
+        <p:spPr>
+          <a:xfrm>
+            <a:off x="1284968" y="1844976"/>
+            <a:ext cx="821016" cy="553998"/>
+          </a:xfrm>
+          <a:prstGeom prst="rect">
+            <a:avLst/>
+          </a:prstGeom>
+          <a:solidFill>
+            <a:schemeClr val="bg1">
+              <a:alpha val="50000"/>
+            </a:schemeClr>
+          </a:solidFill>
+        </p:spPr>
+        <p:txBody>
+          <a:bodyPr wrap="square" lIns="0" rIns="0">
+            <a:spAutoFit/>
+          </a:bodyPr>
+          <a:lstStyle/>
+          <a:p>
+            <a:pPr algn="ctr"/>
+            <a:r>
+              <a:rPr lang="en-US" sz="1000" b="1" dirty="0">
+                <a:latin typeface="Helvetica"/>
+                <a:cs typeface="Helvetica"/>
+              </a:rPr>
+              <a:t>ANPP</a:t>
+            </a:r>
+          </a:p>
+          <a:p>
+            <a:pPr algn="ctr"/>
+            <a:r>
+              <a:rPr lang="en-US" sz="1000" dirty="0">
+                <a:latin typeface="Helvetica"/>
+                <a:cs typeface="Helvetica"/>
+              </a:rPr>
+              <a:t>5.0 ± 2.4  (57/31/13)</a:t>
+            </a:r>
+          </a:p>
+        </p:txBody>
+      </p:sp>
+      <p:sp>
+        <p:nvSpPr>
+          <p:cNvPr id="22" name="Rectangle 21"/>
+          <p:cNvSpPr/>
+          <p:nvPr/>
+        </p:nvSpPr>
+        <p:spPr>
+          <a:xfrm>
+            <a:off x="3010691" y="2351375"/>
+            <a:ext cx="994116" cy="307777"/>
+          </a:xfrm>
+          <a:prstGeom prst="rect">
+            <a:avLst/>
+          </a:prstGeom>
+          <a:solidFill>
+            <a:srgbClr val="FFFFFF">
+              <a:alpha val="60000"/>
+            </a:srgbClr>
+          </a:solidFill>
+        </p:spPr>
+        <p:txBody>
+          <a:bodyPr wrap="square" lIns="0" tIns="0" rIns="0" bIns="0">
+            <a:spAutoFit/>
+          </a:bodyPr>
+          <a:lstStyle/>
+          <a:p>
+            <a:pPr algn="ctr"/>
+            <a:r>
+              <a:rPr lang="en-US" sz="1000" b="1" dirty="0" err="1">
+                <a:latin typeface="Helvetica"/>
+                <a:cs typeface="Helvetica"/>
+              </a:rPr>
+              <a:t>ANPP</a:t>
+            </a:r>
+            <a:r>
+              <a:rPr lang="en-US" sz="1000" b="1" baseline="-25000" dirty="0" err="1">
+                <a:latin typeface="Helvetica"/>
+                <a:cs typeface="Helvetica"/>
+              </a:rPr>
+              <a:t>folivory</a:t>
+            </a:r>
+            <a:endParaRPr lang="en-US" sz="1000" b="1" baseline="-25000" dirty="0">
+              <a:latin typeface="Helvetica"/>
+              <a:cs typeface="Helvetica"/>
+            </a:endParaRPr>
+          </a:p>
+          <a:p>
+            <a:pPr algn="ctr"/>
+            <a:r>
+              <a:rPr lang="en-US" sz="1000" dirty="0">
+                <a:latin typeface="Helvetica"/>
+                <a:cs typeface="Helvetica"/>
+              </a:rPr>
+              <a:t>0.4 ± 0.3 (10/8/5)</a:t>
+            </a:r>
+          </a:p>
+        </p:txBody>
+      </p:sp>
+      <p:sp>
+        <p:nvSpPr>
+          <p:cNvPr id="23" name="Rectangle 22"/>
+          <p:cNvSpPr/>
+          <p:nvPr/>
+        </p:nvSpPr>
+        <p:spPr>
+          <a:xfrm>
+            <a:off x="850686" y="5407863"/>
+            <a:ext cx="1038827" cy="553998"/>
+          </a:xfrm>
+          <a:prstGeom prst="rect">
+            <a:avLst/>
+          </a:prstGeom>
+        </p:spPr>
+        <p:txBody>
+          <a:bodyPr wrap="square">
+            <a:spAutoFit/>
+          </a:bodyPr>
+          <a:lstStyle/>
+          <a:p>
+            <a:pPr algn="ctr"/>
+            <a:r>
+              <a:rPr lang="en-US" sz="1000" b="1" dirty="0" err="1">
+                <a:latin typeface="Helvetica"/>
+                <a:cs typeface="Helvetica"/>
+              </a:rPr>
+              <a:t>BNPP</a:t>
+            </a:r>
+            <a:r>
+              <a:rPr lang="en-US" sz="1000" b="1" baseline="-25000" dirty="0" err="1">
+                <a:latin typeface="Helvetica"/>
+                <a:cs typeface="Helvetica"/>
+              </a:rPr>
+              <a:t>fine</a:t>
+            </a:r>
+            <a:endParaRPr lang="en-US" sz="1000" b="1" baseline="-25000" dirty="0">
+              <a:latin typeface="Helvetica"/>
+              <a:cs typeface="Helvetica"/>
+            </a:endParaRPr>
+          </a:p>
+          <a:p>
+            <a:pPr algn="ctr"/>
+            <a:r>
+              <a:rPr lang="en-US" sz="1000" dirty="0">
+                <a:latin typeface="Helvetica"/>
+                <a:cs typeface="Helvetica"/>
+              </a:rPr>
+              <a:t>2.6 ± 1.7 (34/30/13)</a:t>
+            </a:r>
+          </a:p>
+        </p:txBody>
+      </p:sp>
+      <p:sp>
+        <p:nvSpPr>
+          <p:cNvPr id="24" name="Rectangle 23"/>
+          <p:cNvSpPr/>
+          <p:nvPr/>
+        </p:nvSpPr>
+        <p:spPr>
+          <a:xfrm>
+            <a:off x="692043" y="4712787"/>
+            <a:ext cx="1038827" cy="553998"/>
+          </a:xfrm>
+          <a:prstGeom prst="rect">
+            <a:avLst/>
+          </a:prstGeom>
+        </p:spPr>
+        <p:txBody>
+          <a:bodyPr wrap="square">
+            <a:spAutoFit/>
+          </a:bodyPr>
+          <a:lstStyle/>
+          <a:p>
+            <a:pPr algn="ctr"/>
+            <a:r>
+              <a:rPr lang="en-US" sz="1000" b="1" dirty="0" err="1">
+                <a:latin typeface="Helvetica"/>
+                <a:cs typeface="Helvetica"/>
+              </a:rPr>
+              <a:t>BNPP</a:t>
+            </a:r>
+            <a:r>
+              <a:rPr lang="en-US" sz="1000" b="1" baseline="-25000" dirty="0" err="1">
+                <a:latin typeface="Helvetica"/>
+                <a:cs typeface="Helvetica"/>
+              </a:rPr>
+              <a:t>coarse</a:t>
+            </a:r>
+            <a:endParaRPr lang="en-US" sz="1000" b="1" baseline="-25000" dirty="0">
+              <a:latin typeface="Helvetica"/>
+              <a:cs typeface="Helvetica"/>
+            </a:endParaRPr>
+          </a:p>
+          <a:p>
+            <a:pPr algn="ctr"/>
+            <a:r>
+              <a:rPr lang="en-US" sz="1000" dirty="0">
+                <a:latin typeface="Helvetica"/>
+                <a:cs typeface="Helvetica"/>
+              </a:rPr>
+              <a:t>0.4 ± 0.2 (29/27/10)</a:t>
+            </a:r>
+          </a:p>
+        </p:txBody>
+      </p:sp>
+      <p:sp>
+        <p:nvSpPr>
+          <p:cNvPr id="25" name="Down Arrow 24"/>
+          <p:cNvSpPr/>
+          <p:nvPr/>
+        </p:nvSpPr>
+        <p:spPr>
+          <a:xfrm rot="16200000">
+            <a:off x="2335634" y="2061603"/>
+            <a:ext cx="45719" cy="1067763"/>
+          </a:xfrm>
+          <a:prstGeom prst="downArrow">
+            <a:avLst/>
+          </a:prstGeom>
+          <a:solidFill>
+            <a:schemeClr val="accent3"/>
+          </a:solidFill>
+          <a:ln>
+            <a:solidFill>
+              <a:srgbClr val="4A452A"/>
+            </a:solidFill>
+          </a:ln>
+        </p:spPr>
+        <p:style>
+          <a:lnRef idx="1">
+            <a:schemeClr val="accent1"/>
+          </a:lnRef>
+          <a:fillRef idx="3">
+            <a:schemeClr val="accent1"/>
+          </a:fillRef>
+          <a:effectRef idx="2">
+            <a:schemeClr val="accent1"/>
+          </a:effectRef>
+          <a:fontRef idx="minor">
+            <a:schemeClr val="lt1"/>
+          </a:fontRef>
+        </p:style>
+        <p:txBody>
+          <a:bodyPr rtlCol="0" anchor="ctr"/>
+          <a:lstStyle/>
+          <a:p>
+            <a:pPr algn="ctr"/>
+            <a:endParaRPr lang="en-US"/>
+          </a:p>
+        </p:txBody>
+      </p:sp>
+      <p:sp>
+        <p:nvSpPr>
+          <p:cNvPr id="26" name="Down Arrow 25"/>
+          <p:cNvSpPr/>
+          <p:nvPr/>
+        </p:nvSpPr>
+        <p:spPr>
+          <a:xfrm rot="18431627">
+            <a:off x="1393559" y="2174105"/>
+            <a:ext cx="228600" cy="668151"/>
+          </a:xfrm>
+          <a:prstGeom prst="downArrow">
+            <a:avLst/>
+          </a:prstGeom>
+          <a:solidFill>
+            <a:schemeClr val="accent3"/>
+          </a:solidFill>
+          <a:ln>
+            <a:solidFill>
+              <a:srgbClr val="4A452A"/>
+            </a:solidFill>
+          </a:ln>
+        </p:spPr>
+        <p:style>
+          <a:lnRef idx="1">
+            <a:schemeClr val="accent1"/>
+          </a:lnRef>
+          <a:fillRef idx="3">
+            <a:schemeClr val="accent1"/>
+          </a:fillRef>
+          <a:effectRef idx="2">
+            <a:schemeClr val="accent1"/>
+          </a:effectRef>
+          <a:fontRef idx="minor">
+            <a:schemeClr val="lt1"/>
+          </a:fontRef>
+        </p:style>
+        <p:txBody>
+          <a:bodyPr rtlCol="0" anchor="ctr"/>
+          <a:lstStyle/>
+          <a:p>
+            <a:pPr algn="ctr"/>
+            <a:endParaRPr lang="en-US"/>
+          </a:p>
+        </p:txBody>
+      </p:sp>
+      <p:sp>
+        <p:nvSpPr>
+          <p:cNvPr id="27" name="Down Arrow 26"/>
+          <p:cNvSpPr/>
+          <p:nvPr/>
+        </p:nvSpPr>
+        <p:spPr>
+          <a:xfrm flipH="1">
+            <a:off x="2266255" y="4956262"/>
+            <a:ext cx="220900" cy="1469959"/>
+          </a:xfrm>
+          <a:prstGeom prst="downArrow">
+            <a:avLst/>
+          </a:prstGeom>
+          <a:solidFill>
+            <a:schemeClr val="accent3"/>
+          </a:solidFill>
+          <a:ln>
+            <a:solidFill>
+              <a:srgbClr val="4A452A"/>
+            </a:solidFill>
+          </a:ln>
+        </p:spPr>
+        <p:style>
+          <a:lnRef idx="1">
+            <a:schemeClr val="accent1"/>
+          </a:lnRef>
+          <a:fillRef idx="3">
+            <a:schemeClr val="accent1"/>
+          </a:fillRef>
+          <a:effectRef idx="2">
+            <a:schemeClr val="accent1"/>
+          </a:effectRef>
+          <a:fontRef idx="minor">
+            <a:schemeClr val="lt1"/>
+          </a:fontRef>
+        </p:style>
+        <p:txBody>
+          <a:bodyPr rtlCol="0" anchor="ctr"/>
+          <a:lstStyle/>
+          <a:p>
+            <a:pPr algn="ctr"/>
+            <a:endParaRPr lang="en-US"/>
+          </a:p>
+        </p:txBody>
+      </p:sp>
+      <p:sp>
+        <p:nvSpPr>
+          <p:cNvPr id="28" name="Down Arrow 27"/>
+          <p:cNvSpPr/>
+          <p:nvPr/>
+        </p:nvSpPr>
+        <p:spPr>
+          <a:xfrm rot="16920000">
+            <a:off x="2062431" y="2459633"/>
+            <a:ext cx="137160" cy="566928"/>
+          </a:xfrm>
+          <a:prstGeom prst="downArrow">
+            <a:avLst/>
+          </a:prstGeom>
+          <a:solidFill>
+            <a:schemeClr val="accent3"/>
+          </a:solidFill>
+          <a:ln>
+            <a:solidFill>
+              <a:srgbClr val="4A452A"/>
+            </a:solidFill>
+          </a:ln>
+        </p:spPr>
+        <p:style>
+          <a:lnRef idx="1">
+            <a:schemeClr val="accent1"/>
+          </a:lnRef>
+          <a:fillRef idx="3">
+            <a:schemeClr val="accent1"/>
+          </a:fillRef>
+          <a:effectRef idx="2">
+            <a:schemeClr val="accent1"/>
+          </a:effectRef>
+          <a:fontRef idx="minor">
+            <a:schemeClr val="lt1"/>
+          </a:fontRef>
+        </p:style>
+        <p:txBody>
+          <a:bodyPr rtlCol="0" anchor="ctr"/>
+          <a:lstStyle/>
+          <a:p>
+            <a:pPr algn="ctr"/>
+            <a:endParaRPr lang="en-US"/>
+          </a:p>
+        </p:txBody>
+      </p:sp>
+      <p:sp>
+        <p:nvSpPr>
+          <p:cNvPr id="29" name="Rectangle 28"/>
+          <p:cNvSpPr/>
+          <p:nvPr/>
+        </p:nvSpPr>
+        <p:spPr>
+          <a:xfrm>
+            <a:off x="2704731" y="361817"/>
+            <a:ext cx="1404919" cy="400110"/>
+          </a:xfrm>
+          <a:prstGeom prst="rect">
+            <a:avLst/>
+          </a:prstGeom>
+          <a:solidFill>
+            <a:srgbClr val="FFFFFF">
+              <a:alpha val="64000"/>
+            </a:srgbClr>
+          </a:solidFill>
+          <a:ln>
+            <a:noFill/>
+          </a:ln>
+        </p:spPr>
+        <p:txBody>
+          <a:bodyPr wrap="square">
+            <a:spAutoFit/>
+          </a:bodyPr>
+          <a:lstStyle/>
+          <a:p>
+            <a:pPr algn="ctr"/>
+            <a:r>
+              <a:rPr lang="en-US" sz="1000" b="1" dirty="0">
+                <a:latin typeface="Helvetica"/>
+                <a:cs typeface="Helvetica"/>
+              </a:rPr>
+              <a:t>NEE</a:t>
+            </a:r>
+          </a:p>
+          <a:p>
+            <a:pPr algn="ctr"/>
+            <a:r>
+              <a:rPr lang="en-US" sz="1000" dirty="0">
+                <a:latin typeface="Helvetica"/>
+                <a:cs typeface="Helvetica"/>
+              </a:rPr>
+              <a:t>-1.9 ± 2.3 (37/11/11)</a:t>
+            </a:r>
+          </a:p>
+        </p:txBody>
+      </p:sp>
+      <p:sp>
+        <p:nvSpPr>
+          <p:cNvPr id="30" name="Rectangle 29"/>
+          <p:cNvSpPr/>
+          <p:nvPr/>
+        </p:nvSpPr>
+        <p:spPr>
+          <a:xfrm>
+            <a:off x="7005459" y="1894527"/>
+            <a:ext cx="1146965" cy="520658"/>
+          </a:xfrm>
+          <a:prstGeom prst="rect">
+            <a:avLst/>
+          </a:prstGeom>
+          <a:solidFill>
+            <a:schemeClr val="bg2"/>
+          </a:solidFill>
+          <a:ln>
+            <a:solidFill>
+              <a:srgbClr val="4A452A"/>
+            </a:solidFill>
+          </a:ln>
+        </p:spPr>
+        <p:style>
+          <a:lnRef idx="1">
+            <a:schemeClr val="accent1"/>
+          </a:lnRef>
+          <a:fillRef idx="3">
+            <a:schemeClr val="accent1"/>
+          </a:fillRef>
+          <a:effectRef idx="2">
+            <a:schemeClr val="accent1"/>
+          </a:effectRef>
+          <a:fontRef idx="minor">
+            <a:schemeClr val="lt1"/>
+          </a:fontRef>
+        </p:style>
+        <p:txBody>
+          <a:bodyPr rtlCol="0" anchor="ctr"/>
+          <a:lstStyle/>
+          <a:p>
+            <a:pPr algn="ctr"/>
+            <a:r>
+              <a:rPr lang="en-US" sz="1000" b="1" dirty="0">
+                <a:solidFill>
+                  <a:schemeClr val="tx1"/>
+                </a:solidFill>
+                <a:latin typeface="Helvetica"/>
+                <a:cs typeface="Helvetica"/>
+              </a:rPr>
+              <a:t>foliage biomass</a:t>
+            </a:r>
+          </a:p>
+          <a:p>
+            <a:pPr algn="ctr"/>
+            <a:r>
+              <a:rPr lang="en-US" sz="1000" dirty="0">
+                <a:solidFill>
+                  <a:schemeClr val="tx1"/>
+                </a:solidFill>
+                <a:latin typeface="Helvetica"/>
+                <a:cs typeface="Helvetica"/>
+              </a:rPr>
+              <a:t>4.2 ± 1.3 </a:t>
+            </a:r>
+          </a:p>
+          <a:p>
+            <a:pPr algn="ctr"/>
+            <a:r>
+              <a:rPr lang="en-US" sz="1000" dirty="0">
+                <a:solidFill>
+                  <a:schemeClr val="tx1"/>
+                </a:solidFill>
+                <a:latin typeface="Helvetica"/>
+                <a:cs typeface="Helvetica"/>
+              </a:rPr>
+              <a:t>(18/14/5)</a:t>
+            </a:r>
+          </a:p>
+        </p:txBody>
+      </p:sp>
+      <p:sp>
+        <p:nvSpPr>
+          <p:cNvPr id="31" name="Rectangle 30"/>
+          <p:cNvSpPr/>
+          <p:nvPr/>
+        </p:nvSpPr>
+        <p:spPr>
+          <a:xfrm>
+            <a:off x="7836506" y="2542365"/>
+            <a:ext cx="1104899" cy="682164"/>
+          </a:xfrm>
+          <a:prstGeom prst="rect">
+            <a:avLst/>
+          </a:prstGeom>
+          <a:solidFill>
+            <a:schemeClr val="bg2"/>
+          </a:solidFill>
+          <a:ln>
+            <a:solidFill>
+              <a:srgbClr val="4A452A"/>
+            </a:solidFill>
+          </a:ln>
+        </p:spPr>
+        <p:style>
+          <a:lnRef idx="1">
+            <a:schemeClr val="accent1"/>
+          </a:lnRef>
+          <a:fillRef idx="3">
+            <a:schemeClr val="accent1"/>
+          </a:fillRef>
+          <a:effectRef idx="2">
+            <a:schemeClr val="accent1"/>
+          </a:effectRef>
+          <a:fontRef idx="minor">
+            <a:schemeClr val="lt1"/>
+          </a:fontRef>
+        </p:style>
+        <p:txBody>
+          <a:bodyPr rtlCol="0" anchor="ctr"/>
+          <a:lstStyle/>
+          <a:p>
+            <a:pPr algn="ctr"/>
+            <a:r>
+              <a:rPr lang="en-US" sz="1000" b="1" dirty="0">
+                <a:solidFill>
+                  <a:schemeClr val="tx1"/>
+                </a:solidFill>
+                <a:latin typeface="Helvetica"/>
+                <a:cs typeface="Helvetica"/>
+              </a:rPr>
+              <a:t>aboveground biomass</a:t>
+            </a:r>
+          </a:p>
+          <a:p>
+            <a:pPr algn="ctr"/>
+            <a:r>
+              <a:rPr lang="en-US" sz="1000" dirty="0">
+                <a:solidFill>
+                  <a:schemeClr val="tx1"/>
+                </a:solidFill>
+                <a:latin typeface="Helvetica"/>
+                <a:cs typeface="Helvetica"/>
+              </a:rPr>
+              <a:t>133.9 ± 50.8 </a:t>
+            </a:r>
+          </a:p>
+          <a:p>
+            <a:pPr algn="ctr"/>
+            <a:r>
+              <a:rPr lang="en-US" sz="1000" dirty="0">
+                <a:solidFill>
+                  <a:schemeClr val="tx1"/>
+                </a:solidFill>
+                <a:latin typeface="Helvetica"/>
+                <a:cs typeface="Helvetica"/>
+              </a:rPr>
+              <a:t>(203/118/42)</a:t>
+            </a:r>
+          </a:p>
+        </p:txBody>
+      </p:sp>
+      <p:sp>
+        <p:nvSpPr>
+          <p:cNvPr id="32" name="Rectangle 31"/>
+          <p:cNvSpPr/>
+          <p:nvPr/>
+        </p:nvSpPr>
+        <p:spPr>
+          <a:xfrm>
+            <a:off x="718750" y="406851"/>
+            <a:ext cx="825500" cy="553998"/>
+          </a:xfrm>
+          <a:prstGeom prst="rect">
+            <a:avLst/>
+          </a:prstGeom>
+        </p:spPr>
+        <p:txBody>
+          <a:bodyPr wrap="square">
+            <a:spAutoFit/>
+          </a:bodyPr>
+          <a:lstStyle/>
+          <a:p>
+            <a:pPr algn="ctr"/>
+            <a:r>
+              <a:rPr lang="en-US" sz="1000" b="1" dirty="0">
+                <a:latin typeface="Helvetica"/>
+                <a:cs typeface="Helvetica"/>
+              </a:rPr>
+              <a:t>GPP</a:t>
+            </a:r>
+          </a:p>
+          <a:p>
+            <a:pPr algn="ctr"/>
+            <a:r>
+              <a:rPr lang="en-US" sz="1000" dirty="0">
+                <a:latin typeface="Helvetica"/>
+                <a:cs typeface="Helvetica"/>
+              </a:rPr>
+              <a:t>31.6 ± 6.7 (38/18/13)</a:t>
+            </a:r>
+          </a:p>
+        </p:txBody>
+      </p:sp>
+      <p:sp>
+        <p:nvSpPr>
+          <p:cNvPr id="33" name="Down Arrow 32"/>
+          <p:cNvSpPr/>
+          <p:nvPr/>
+        </p:nvSpPr>
+        <p:spPr>
+          <a:xfrm rot="18346085">
+            <a:off x="2079570" y="2499831"/>
+            <a:ext cx="333195" cy="1058309"/>
+          </a:xfrm>
+          <a:prstGeom prst="downArrow">
+            <a:avLst/>
+          </a:prstGeom>
+          <a:solidFill>
+            <a:schemeClr val="accent3"/>
+          </a:solidFill>
+          <a:ln>
+            <a:solidFill>
+              <a:srgbClr val="4A452A"/>
+            </a:solidFill>
+          </a:ln>
+        </p:spPr>
+        <p:style>
+          <a:lnRef idx="1">
+            <a:schemeClr val="accent1"/>
+          </a:lnRef>
+          <a:fillRef idx="3">
+            <a:schemeClr val="accent1"/>
+          </a:fillRef>
+          <a:effectRef idx="2">
+            <a:schemeClr val="accent1"/>
+          </a:effectRef>
+          <a:fontRef idx="minor">
+            <a:schemeClr val="lt1"/>
+          </a:fontRef>
+        </p:style>
+        <p:txBody>
+          <a:bodyPr rtlCol="0" anchor="ctr"/>
+          <a:lstStyle/>
+          <a:p>
+            <a:pPr algn="ctr"/>
+            <a:endParaRPr lang="en-US"/>
+          </a:p>
+        </p:txBody>
+      </p:sp>
+      <p:sp>
+        <p:nvSpPr>
+          <p:cNvPr id="34" name="Down Arrow 33"/>
+          <p:cNvSpPr/>
+          <p:nvPr/>
+        </p:nvSpPr>
+        <p:spPr>
+          <a:xfrm>
+            <a:off x="2715016" y="454177"/>
+            <a:ext cx="82296" cy="274320"/>
+          </a:xfrm>
+          <a:prstGeom prst="downArrow">
+            <a:avLst/>
+          </a:prstGeom>
+          <a:solidFill>
+            <a:schemeClr val="accent3">
+              <a:lumMod val="40000"/>
+              <a:lumOff val="60000"/>
+            </a:schemeClr>
+          </a:solidFill>
+          <a:ln>
+            <a:solidFill>
+              <a:srgbClr val="4A452A"/>
+            </a:solidFill>
+          </a:ln>
+        </p:spPr>
+        <p:style>
+          <a:lnRef idx="1">
+            <a:schemeClr val="accent1"/>
+          </a:lnRef>
+          <a:fillRef idx="3">
+            <a:schemeClr val="accent1"/>
+          </a:fillRef>
+          <a:effectRef idx="2">
+            <a:schemeClr val="accent1"/>
+          </a:effectRef>
+          <a:fontRef idx="minor">
+            <a:schemeClr val="lt1"/>
+          </a:fontRef>
+        </p:style>
+        <p:txBody>
+          <a:bodyPr rtlCol="0" anchor="ctr"/>
+          <a:lstStyle/>
+          <a:p>
+            <a:pPr algn="ctr"/>
+            <a:endParaRPr lang="en-US"/>
+          </a:p>
+        </p:txBody>
+      </p:sp>
+      <p:sp>
+        <p:nvSpPr>
+          <p:cNvPr id="36" name="Rectangle 35"/>
+          <p:cNvSpPr/>
+          <p:nvPr/>
+        </p:nvSpPr>
+        <p:spPr>
+          <a:xfrm>
+            <a:off x="4729288" y="4435788"/>
+            <a:ext cx="700226" cy="553998"/>
+          </a:xfrm>
+          <a:prstGeom prst="rect">
+            <a:avLst/>
+          </a:prstGeom>
+        </p:spPr>
+        <p:txBody>
+          <a:bodyPr wrap="square">
+            <a:spAutoFit/>
+          </a:bodyPr>
+          <a:lstStyle/>
+          <a:p>
+            <a:pPr algn="ctr"/>
+            <a:r>
+              <a:rPr lang="en-US" sz="1000" b="1" dirty="0" err="1">
+                <a:latin typeface="Helvetica"/>
+                <a:cs typeface="Helvetica"/>
+              </a:rPr>
+              <a:t>R</a:t>
+            </a:r>
+            <a:r>
+              <a:rPr lang="en-US" sz="1000" b="1" baseline="-25000" dirty="0" err="1">
+                <a:latin typeface="Helvetica"/>
+                <a:cs typeface="Helvetica"/>
+              </a:rPr>
+              <a:t>soil</a:t>
+            </a:r>
+            <a:r>
+              <a:rPr lang="en-US" sz="1000" b="1" baseline="-25000" dirty="0">
+                <a:latin typeface="Helvetica"/>
+                <a:cs typeface="Helvetica"/>
+              </a:rPr>
+              <a:t>-het</a:t>
+            </a:r>
+          </a:p>
+          <a:p>
+            <a:pPr algn="ctr"/>
+            <a:r>
+              <a:rPr lang="en-US" sz="1000" dirty="0">
+                <a:latin typeface="Helvetica"/>
+                <a:cs typeface="Helvetica"/>
+              </a:rPr>
+              <a:t>7.5 ± 3.4 (18/16/9)</a:t>
+            </a:r>
+          </a:p>
+        </p:txBody>
+      </p:sp>
+      <p:sp>
+        <p:nvSpPr>
+          <p:cNvPr id="38" name="Down Arrow 37"/>
+          <p:cNvSpPr/>
+          <p:nvPr/>
+        </p:nvSpPr>
+        <p:spPr>
+          <a:xfrm rot="16200000">
+            <a:off x="3990462" y="588519"/>
+            <a:ext cx="969264" cy="1086490"/>
+          </a:xfrm>
+          <a:prstGeom prst="downArrow">
+            <a:avLst/>
+          </a:prstGeom>
+          <a:solidFill>
+            <a:schemeClr val="bg1">
+              <a:lumMod val="65000"/>
+            </a:schemeClr>
+          </a:solidFill>
+          <a:ln>
+            <a:solidFill>
+              <a:srgbClr val="4A452A"/>
+            </a:solidFill>
+          </a:ln>
+        </p:spPr>
+        <p:style>
+          <a:lnRef idx="1">
+            <a:schemeClr val="accent1"/>
+          </a:lnRef>
+          <a:fillRef idx="3">
+            <a:schemeClr val="accent1"/>
+          </a:fillRef>
+          <a:effectRef idx="2">
+            <a:schemeClr val="accent1"/>
+          </a:effectRef>
+          <a:fontRef idx="minor">
+            <a:schemeClr val="lt1"/>
+          </a:fontRef>
+        </p:style>
+        <p:txBody>
+          <a:bodyPr rtlCol="0" anchor="ctr"/>
+          <a:lstStyle/>
+          <a:p>
+            <a:pPr algn="ctr"/>
+            <a:endParaRPr lang="en-US"/>
+          </a:p>
+        </p:txBody>
+      </p:sp>
+      <p:sp>
+        <p:nvSpPr>
+          <p:cNvPr id="39" name="Rectangle 38"/>
+          <p:cNvSpPr/>
+          <p:nvPr/>
+        </p:nvSpPr>
+        <p:spPr>
+          <a:xfrm>
+            <a:off x="3850547" y="939070"/>
+            <a:ext cx="1240380" cy="553998"/>
+          </a:xfrm>
+          <a:prstGeom prst="rect">
+            <a:avLst/>
+          </a:prstGeom>
+          <a:noFill/>
+        </p:spPr>
+        <p:txBody>
+          <a:bodyPr wrap="square">
+            <a:spAutoFit/>
+          </a:bodyPr>
+          <a:lstStyle/>
+          <a:p>
+            <a:pPr algn="ctr"/>
+            <a:r>
+              <a:rPr lang="en-US" sz="1000" b="1" dirty="0">
+                <a:latin typeface="Helvetica"/>
+                <a:cs typeface="Helvetica"/>
+              </a:rPr>
+              <a:t>R</a:t>
+            </a:r>
+            <a:r>
+              <a:rPr lang="en-US" sz="1000" b="1" baseline="-25000" dirty="0">
+                <a:latin typeface="Helvetica"/>
+                <a:cs typeface="Helvetica"/>
+              </a:rPr>
+              <a:t>a</a:t>
+            </a:r>
+          </a:p>
+          <a:p>
+            <a:pPr algn="ctr"/>
+            <a:r>
+              <a:rPr lang="en-US" sz="1000" dirty="0">
+                <a:latin typeface="Helvetica"/>
+                <a:cs typeface="Helvetica"/>
+              </a:rPr>
+              <a:t>21.2 ± 4.1 (9/8/5)</a:t>
+            </a:r>
+          </a:p>
+          <a:p>
+            <a:pPr algn="ctr"/>
+            <a:endParaRPr lang="en-US" sz="1000" dirty="0">
+              <a:latin typeface="Helvetica"/>
+              <a:cs typeface="Helvetica"/>
+            </a:endParaRPr>
+          </a:p>
+        </p:txBody>
+      </p:sp>
+      <p:sp>
+        <p:nvSpPr>
+          <p:cNvPr id="41" name="Rectangle 40"/>
+          <p:cNvSpPr/>
+          <p:nvPr/>
+        </p:nvSpPr>
+        <p:spPr>
+          <a:xfrm>
+            <a:off x="2463374" y="5401189"/>
+            <a:ext cx="732742" cy="461665"/>
+          </a:xfrm>
+          <a:prstGeom prst="rect">
+            <a:avLst/>
+          </a:prstGeom>
+          <a:solidFill>
+            <a:schemeClr val="bg1">
+              <a:alpha val="50000"/>
+            </a:schemeClr>
+          </a:solidFill>
+        </p:spPr>
+        <p:txBody>
+          <a:bodyPr wrap="square" lIns="0" tIns="0" rIns="0" bIns="0">
+            <a:spAutoFit/>
+          </a:bodyPr>
+          <a:lstStyle/>
+          <a:p>
+            <a:pPr algn="ctr"/>
+            <a:r>
+              <a:rPr lang="en-US" sz="1000" b="1" dirty="0" err="1">
+                <a:latin typeface="Helvetica"/>
+                <a:cs typeface="Helvetica"/>
+              </a:rPr>
+              <a:t>ANPP</a:t>
+            </a:r>
+            <a:r>
+              <a:rPr lang="en-US" sz="1000" b="1" baseline="-25000" dirty="0" err="1">
+                <a:latin typeface="Helvetica"/>
+                <a:cs typeface="Helvetica"/>
+              </a:rPr>
+              <a:t>litterfall</a:t>
+            </a:r>
+            <a:endParaRPr lang="en-US" sz="1000" b="1" baseline="-25000" dirty="0">
+              <a:latin typeface="Helvetica"/>
+              <a:cs typeface="Helvetica"/>
+            </a:endParaRPr>
+          </a:p>
+          <a:p>
+            <a:pPr algn="ctr"/>
+            <a:r>
+              <a:rPr lang="en-US" sz="1000" dirty="0">
+                <a:latin typeface="Helvetica"/>
+                <a:cs typeface="Helvetica"/>
+              </a:rPr>
+              <a:t>3.6 ± 1.5 (17/16/10)</a:t>
+            </a:r>
+          </a:p>
+        </p:txBody>
+      </p:sp>
+      <p:sp>
+        <p:nvSpPr>
+          <p:cNvPr id="42" name="Rectangle 41"/>
+          <p:cNvSpPr/>
+          <p:nvPr/>
+        </p:nvSpPr>
+        <p:spPr>
+          <a:xfrm>
+            <a:off x="5467868" y="6730830"/>
+            <a:ext cx="1270008" cy="437855"/>
+          </a:xfrm>
+          <a:prstGeom prst="rect">
+            <a:avLst/>
+          </a:prstGeom>
+          <a:solidFill>
+            <a:schemeClr val="bg2"/>
+          </a:solidFill>
+          <a:ln>
+            <a:solidFill>
+              <a:srgbClr val="4A452A"/>
+            </a:solidFill>
+          </a:ln>
+        </p:spPr>
+        <p:style>
+          <a:lnRef idx="1">
+            <a:schemeClr val="accent1"/>
+          </a:lnRef>
+          <a:fillRef idx="3">
+            <a:schemeClr val="accent1"/>
+          </a:fillRef>
+          <a:effectRef idx="2">
+            <a:schemeClr val="accent1"/>
+          </a:effectRef>
+          <a:fontRef idx="minor">
+            <a:schemeClr val="lt1"/>
+          </a:fontRef>
+        </p:style>
+        <p:txBody>
+          <a:bodyPr rtlCol="0" anchor="ctr"/>
+          <a:lstStyle/>
+          <a:p>
+            <a:pPr algn="ctr"/>
+            <a:r>
+              <a:rPr lang="en-US" sz="1000" b="1" dirty="0">
+                <a:solidFill>
+                  <a:schemeClr val="tx1"/>
+                </a:solidFill>
+                <a:latin typeface="Helvetica"/>
+                <a:cs typeface="Helvetica"/>
+              </a:rPr>
+              <a:t>organic layer</a:t>
+            </a:r>
+          </a:p>
+          <a:p>
+            <a:pPr algn="ctr"/>
+            <a:r>
+              <a:rPr lang="en-US" sz="1000" dirty="0">
+                <a:solidFill>
+                  <a:schemeClr val="tx1"/>
+                </a:solidFill>
+                <a:latin typeface="Helvetica"/>
+                <a:cs typeface="Helvetica"/>
+              </a:rPr>
+              <a:t>6.8 ± 8.0 (3/3/3)</a:t>
+            </a:r>
+          </a:p>
+        </p:txBody>
+      </p:sp>
+      <p:sp>
+        <p:nvSpPr>
+          <p:cNvPr id="7" name="Down Arrow 6"/>
+          <p:cNvSpPr/>
+          <p:nvPr/>
+        </p:nvSpPr>
+        <p:spPr>
+          <a:xfrm>
+            <a:off x="947317" y="1504582"/>
+            <a:ext cx="393192" cy="756242"/>
+          </a:xfrm>
+          <a:prstGeom prst="downArrow">
+            <a:avLst/>
+          </a:prstGeom>
+          <a:solidFill>
+            <a:schemeClr val="accent3"/>
+          </a:solidFill>
+          <a:ln>
+            <a:solidFill>
+              <a:srgbClr val="4A452A"/>
+            </a:solidFill>
+          </a:ln>
+        </p:spPr>
+        <p:style>
+          <a:lnRef idx="1">
+            <a:schemeClr val="accent1"/>
+          </a:lnRef>
+          <a:fillRef idx="3">
+            <a:schemeClr val="accent1"/>
+          </a:fillRef>
+          <a:effectRef idx="2">
+            <a:schemeClr val="accent1"/>
+          </a:effectRef>
+          <a:fontRef idx="minor">
+            <a:schemeClr val="lt1"/>
+          </a:fontRef>
+        </p:style>
+        <p:txBody>
+          <a:bodyPr rtlCol="0" anchor="ctr"/>
+          <a:lstStyle/>
+          <a:p>
+            <a:pPr algn="ctr"/>
+            <a:endParaRPr lang="en-US"/>
+          </a:p>
+        </p:txBody>
+      </p:sp>
+      <p:sp>
+        <p:nvSpPr>
+          <p:cNvPr id="46" name="Rectangle 45"/>
+          <p:cNvSpPr/>
+          <p:nvPr/>
+        </p:nvSpPr>
+        <p:spPr>
+          <a:xfrm>
+            <a:off x="429123" y="373584"/>
+            <a:ext cx="6080760" cy="6858001"/>
+          </a:xfrm>
+          <a:prstGeom prst="rect">
+            <a:avLst/>
+          </a:prstGeom>
+          <a:noFill/>
+          <a:ln>
+            <a:noFill/>
+          </a:ln>
+        </p:spPr>
+        <p:style>
+          <a:lnRef idx="1">
+            <a:schemeClr val="accent1"/>
+          </a:lnRef>
+          <a:fillRef idx="3">
+            <a:schemeClr val="accent1"/>
+          </a:fillRef>
+          <a:effectRef idx="2">
+            <a:schemeClr val="accent1"/>
+          </a:effectRef>
+          <a:fontRef idx="minor">
+            <a:schemeClr val="lt1"/>
+          </a:fontRef>
+        </p:style>
+        <p:txBody>
+          <a:bodyPr rtlCol="0" anchor="ctr"/>
+          <a:lstStyle/>
+          <a:p>
+            <a:pPr algn="ctr"/>
+            <a:endParaRPr lang="en-US"/>
+          </a:p>
+        </p:txBody>
+      </p:sp>
+      <p:cxnSp>
+        <p:nvCxnSpPr>
+          <p:cNvPr id="51" name="Straight Arrow Connector 50"/>
+          <p:cNvCxnSpPr/>
+          <p:nvPr/>
+        </p:nvCxnSpPr>
+        <p:spPr>
+          <a:xfrm flipV="1">
+            <a:off x="5281863" y="2033115"/>
+            <a:ext cx="232052" cy="4319004"/>
+          </a:xfrm>
+          <a:prstGeom prst="straightConnector1">
+            <a:avLst/>
+          </a:prstGeom>
+          <a:ln w="19050" cmpd="sng">
+            <a:solidFill>
+              <a:schemeClr val="tx1">
+                <a:lumMod val="50000"/>
+                <a:lumOff val="50000"/>
+              </a:schemeClr>
+            </a:solidFill>
+            <a:prstDash val="dash"/>
+            <a:headEnd type="none"/>
+            <a:tailEnd type="triangle"/>
+          </a:ln>
+        </p:spPr>
+        <p:style>
+          <a:lnRef idx="2">
+            <a:schemeClr val="accent1"/>
+          </a:lnRef>
+          <a:fillRef idx="0">
+            <a:schemeClr val="accent1"/>
+          </a:fillRef>
+          <a:effectRef idx="1">
+            <a:schemeClr val="accent1"/>
+          </a:effectRef>
+          <a:fontRef idx="minor">
+            <a:schemeClr val="tx1"/>
+          </a:fontRef>
+        </p:style>
+      </p:cxnSp>
+      <p:sp>
+        <p:nvSpPr>
+          <p:cNvPr id="52" name="Rectangle 51"/>
+          <p:cNvSpPr/>
+          <p:nvPr/>
+        </p:nvSpPr>
+        <p:spPr>
+          <a:xfrm>
+            <a:off x="3315086" y="4731825"/>
+            <a:ext cx="833414" cy="400110"/>
+          </a:xfrm>
+          <a:prstGeom prst="rect">
+            <a:avLst/>
+          </a:prstGeom>
+        </p:spPr>
+        <p:txBody>
+          <a:bodyPr wrap="square">
+            <a:spAutoFit/>
+          </a:bodyPr>
+          <a:lstStyle/>
+          <a:p>
+            <a:pPr algn="ctr"/>
+            <a:r>
+              <a:rPr lang="en-US" sz="1000" b="1" dirty="0">
+                <a:latin typeface="Helvetica"/>
+                <a:cs typeface="Helvetica"/>
+              </a:rPr>
+              <a:t>woody mortality</a:t>
+            </a:r>
+            <a:endParaRPr lang="en-US" sz="1000" b="1" baseline="-25000" dirty="0">
+              <a:latin typeface="Helvetica"/>
+              <a:cs typeface="Helvetica"/>
+            </a:endParaRPr>
+          </a:p>
+        </p:txBody>
+      </p:sp>
+      <p:sp>
+        <p:nvSpPr>
+          <p:cNvPr id="53" name="Rectangle 52"/>
+          <p:cNvSpPr/>
+          <p:nvPr/>
+        </p:nvSpPr>
+        <p:spPr>
+          <a:xfrm>
+            <a:off x="8426461" y="6710152"/>
+            <a:ext cx="1394700" cy="455201"/>
+          </a:xfrm>
+          <a:prstGeom prst="rect">
+            <a:avLst/>
+          </a:prstGeom>
+          <a:solidFill>
+            <a:schemeClr val="bg2"/>
+          </a:solidFill>
+          <a:ln>
+            <a:solidFill>
+              <a:srgbClr val="4A452A"/>
+            </a:solidFill>
+          </a:ln>
+        </p:spPr>
+        <p:style>
+          <a:lnRef idx="1">
+            <a:schemeClr val="accent1"/>
+          </a:lnRef>
+          <a:fillRef idx="3">
+            <a:schemeClr val="accent1"/>
+          </a:fillRef>
+          <a:effectRef idx="2">
+            <a:schemeClr val="accent1"/>
+          </a:effectRef>
+          <a:fontRef idx="minor">
+            <a:schemeClr val="lt1"/>
+          </a:fontRef>
+        </p:style>
+        <p:txBody>
+          <a:bodyPr rtlCol="0" anchor="ctr"/>
+          <a:lstStyle/>
+          <a:p>
+            <a:pPr algn="ctr"/>
+            <a:r>
+              <a:rPr lang="en-US" sz="1000" b="1" dirty="0">
+                <a:solidFill>
+                  <a:schemeClr val="tx1"/>
+                </a:solidFill>
+                <a:latin typeface="Helvetica"/>
+                <a:cs typeface="Helvetica"/>
+              </a:rPr>
+              <a:t>fine root biomass</a:t>
+            </a:r>
+          </a:p>
+          <a:p>
+            <a:pPr algn="ctr"/>
+            <a:r>
+              <a:rPr lang="en-US" sz="1000" dirty="0">
+                <a:solidFill>
+                  <a:schemeClr val="tx1"/>
+                </a:solidFill>
+                <a:latin typeface="Helvetica"/>
+                <a:cs typeface="Helvetica"/>
+              </a:rPr>
+              <a:t>8.5 ± 12.2 (11/8/8)</a:t>
+            </a:r>
+          </a:p>
+        </p:txBody>
+      </p:sp>
+      <p:sp>
+        <p:nvSpPr>
+          <p:cNvPr id="54" name="Rectangle 53"/>
+          <p:cNvSpPr/>
+          <p:nvPr/>
+        </p:nvSpPr>
+        <p:spPr>
+          <a:xfrm>
+            <a:off x="8794283" y="3943307"/>
+            <a:ext cx="1016000" cy="567864"/>
+          </a:xfrm>
+          <a:prstGeom prst="rect">
+            <a:avLst/>
+          </a:prstGeom>
+          <a:solidFill>
+            <a:schemeClr val="bg2"/>
+          </a:solidFill>
+          <a:ln>
+            <a:solidFill>
+              <a:srgbClr val="4A452A"/>
+            </a:solidFill>
+          </a:ln>
+        </p:spPr>
+        <p:style>
+          <a:lnRef idx="1">
+            <a:schemeClr val="accent1"/>
+          </a:lnRef>
+          <a:fillRef idx="3">
+            <a:schemeClr val="accent1"/>
+          </a:fillRef>
+          <a:effectRef idx="2">
+            <a:schemeClr val="accent1"/>
+          </a:effectRef>
+          <a:fontRef idx="minor">
+            <a:schemeClr val="lt1"/>
+          </a:fontRef>
+        </p:style>
+        <p:txBody>
+          <a:bodyPr rtlCol="0" anchor="ctr"/>
+          <a:lstStyle/>
+          <a:p>
+            <a:pPr algn="ctr"/>
+            <a:r>
+              <a:rPr lang="en-US" sz="1000" b="1" dirty="0">
+                <a:solidFill>
+                  <a:schemeClr val="tx1"/>
+                </a:solidFill>
+                <a:latin typeface="Helvetica"/>
+                <a:cs typeface="Helvetica"/>
+              </a:rPr>
+              <a:t>total biomass</a:t>
+            </a:r>
+          </a:p>
+          <a:p>
+            <a:pPr algn="ctr"/>
+            <a:r>
+              <a:rPr lang="en-US" sz="1000" dirty="0">
+                <a:solidFill>
+                  <a:schemeClr val="tx1"/>
+                </a:solidFill>
+                <a:latin typeface="Helvetica"/>
+                <a:cs typeface="Helvetica"/>
+              </a:rPr>
+              <a:t>166 ± 14</a:t>
+            </a:r>
+          </a:p>
+          <a:p>
+            <a:pPr algn="ctr"/>
+            <a:r>
+              <a:rPr lang="en-US" sz="1000" dirty="0">
+                <a:solidFill>
+                  <a:schemeClr val="tx1"/>
+                </a:solidFill>
+                <a:latin typeface="Helvetica"/>
+                <a:cs typeface="Helvetica"/>
+              </a:rPr>
+              <a:t>(37/13/7)</a:t>
+            </a:r>
+          </a:p>
+        </p:txBody>
+      </p:sp>
+      <p:sp>
+        <p:nvSpPr>
+          <p:cNvPr id="56" name="Down Arrow 55"/>
+          <p:cNvSpPr/>
+          <p:nvPr/>
+        </p:nvSpPr>
+        <p:spPr>
+          <a:xfrm>
+            <a:off x="2298119" y="2692317"/>
+            <a:ext cx="137160" cy="2194560"/>
+          </a:xfrm>
+          <a:prstGeom prst="downArrow">
+            <a:avLst/>
+          </a:prstGeom>
+          <a:solidFill>
+            <a:schemeClr val="accent3"/>
+          </a:solidFill>
+          <a:ln>
+            <a:solidFill>
+              <a:srgbClr val="4A452A"/>
+            </a:solidFill>
+          </a:ln>
+        </p:spPr>
+        <p:style>
+          <a:lnRef idx="1">
+            <a:schemeClr val="accent1"/>
+          </a:lnRef>
+          <a:fillRef idx="3">
+            <a:schemeClr val="accent1"/>
+          </a:fillRef>
+          <a:effectRef idx="2">
+            <a:schemeClr val="accent1"/>
+          </a:effectRef>
+          <a:fontRef idx="minor">
+            <a:schemeClr val="lt1"/>
+          </a:fontRef>
+        </p:style>
+        <p:txBody>
+          <a:bodyPr rtlCol="0" anchor="ctr"/>
+          <a:lstStyle/>
+          <a:p>
+            <a:pPr algn="ctr"/>
+            <a:endParaRPr lang="en-US"/>
+          </a:p>
+        </p:txBody>
+      </p:sp>
+      <p:sp>
+        <p:nvSpPr>
+          <p:cNvPr id="57" name="Rectangle 56"/>
+          <p:cNvSpPr/>
+          <p:nvPr/>
+        </p:nvSpPr>
+        <p:spPr>
+          <a:xfrm>
+            <a:off x="8719874" y="454177"/>
+            <a:ext cx="1111154" cy="707886"/>
+          </a:xfrm>
+          <a:prstGeom prst="rect">
+            <a:avLst/>
+          </a:prstGeom>
+          <a:ln>
+            <a:solidFill>
+              <a:schemeClr val="tx1"/>
+            </a:solidFill>
+          </a:ln>
+        </p:spPr>
+        <p:txBody>
+          <a:bodyPr wrap="square">
+            <a:spAutoFit/>
+          </a:bodyPr>
+          <a:lstStyle/>
+          <a:p>
+            <a:r>
+              <a:rPr lang="en-US" sz="1000" b="1" u="sng" dirty="0">
+                <a:latin typeface="Helvetica"/>
+                <a:cs typeface="Helvetica"/>
+              </a:rPr>
+              <a:t>legend</a:t>
+            </a:r>
+            <a:endParaRPr lang="en-US" sz="1000" b="1" u="sng" baseline="-25000" dirty="0">
+              <a:latin typeface="Helvetica"/>
+              <a:cs typeface="Helvetica"/>
+            </a:endParaRPr>
+          </a:p>
+          <a:p>
+            <a:r>
+              <a:rPr lang="en-US" sz="1000" dirty="0">
+                <a:latin typeface="Helvetica"/>
+                <a:cs typeface="Helvetica"/>
+              </a:rPr>
+              <a:t>mean ± </a:t>
+            </a:r>
+            <a:r>
+              <a:rPr lang="en-US" sz="1000" dirty="0" err="1">
+                <a:latin typeface="Helvetica"/>
+                <a:cs typeface="Helvetica"/>
+              </a:rPr>
+              <a:t>std</a:t>
+            </a:r>
+            <a:r>
+              <a:rPr lang="en-US" sz="1000" dirty="0">
+                <a:latin typeface="Helvetica"/>
+                <a:cs typeface="Helvetica"/>
+              </a:rPr>
+              <a:t> </a:t>
+            </a:r>
+          </a:p>
+          <a:p>
+            <a:r>
+              <a:rPr lang="en-US" sz="1000" dirty="0">
+                <a:latin typeface="Helvetica"/>
+                <a:cs typeface="Helvetica"/>
+              </a:rPr>
+              <a:t>(n records/ n plots/ n areas )</a:t>
+            </a:r>
+          </a:p>
+        </p:txBody>
+      </p:sp>
+      <p:sp>
+        <p:nvSpPr>
+          <p:cNvPr id="58" name="Down Arrow 57"/>
+          <p:cNvSpPr/>
+          <p:nvPr/>
+        </p:nvSpPr>
+        <p:spPr>
+          <a:xfrm rot="10971162">
+            <a:off x="4103611" y="1315051"/>
+            <a:ext cx="329599" cy="4772404"/>
+          </a:xfrm>
+          <a:prstGeom prst="downArrow">
+            <a:avLst/>
+          </a:prstGeom>
+          <a:solidFill>
+            <a:schemeClr val="bg1">
+              <a:lumMod val="65000"/>
+            </a:schemeClr>
+          </a:solidFill>
+          <a:ln>
+            <a:solidFill>
+              <a:schemeClr val="tx1"/>
+            </a:solidFill>
+          </a:ln>
+        </p:spPr>
+        <p:style>
+          <a:lnRef idx="1">
+            <a:schemeClr val="accent1"/>
+          </a:lnRef>
+          <a:fillRef idx="3">
+            <a:schemeClr val="accent1"/>
+          </a:fillRef>
+          <a:effectRef idx="2">
+            <a:schemeClr val="accent1"/>
+          </a:effectRef>
+          <a:fontRef idx="minor">
+            <a:schemeClr val="lt1"/>
+          </a:fontRef>
+        </p:style>
+        <p:txBody>
+          <a:bodyPr rtlCol="0" anchor="ctr"/>
+          <a:lstStyle/>
+          <a:p>
+            <a:pPr algn="ctr"/>
+            <a:endParaRPr lang="en-US"/>
+          </a:p>
+        </p:txBody>
+      </p:sp>
+      <p:sp>
+        <p:nvSpPr>
+          <p:cNvPr id="63" name="Down Arrow 62"/>
+          <p:cNvSpPr/>
+          <p:nvPr/>
+        </p:nvSpPr>
+        <p:spPr>
+          <a:xfrm rot="10800000">
+            <a:off x="3613598" y="5862854"/>
+            <a:ext cx="1167749" cy="851540"/>
+          </a:xfrm>
+          <a:prstGeom prst="downArrow">
+            <a:avLst/>
+          </a:prstGeom>
+          <a:solidFill>
+            <a:schemeClr val="bg1">
+              <a:lumMod val="65000"/>
+            </a:schemeClr>
+          </a:solidFill>
+          <a:ln>
+            <a:solidFill>
+              <a:schemeClr val="tx1"/>
+            </a:solidFill>
+          </a:ln>
+        </p:spPr>
+        <p:style>
+          <a:lnRef idx="1">
+            <a:schemeClr val="accent1"/>
+          </a:lnRef>
+          <a:fillRef idx="3">
+            <a:schemeClr val="accent1"/>
+          </a:fillRef>
+          <a:effectRef idx="2">
+            <a:schemeClr val="accent1"/>
+          </a:effectRef>
+          <a:fontRef idx="minor">
+            <a:schemeClr val="lt1"/>
+          </a:fontRef>
+        </p:style>
+        <p:txBody>
+          <a:bodyPr rtlCol="0" anchor="ctr"/>
+          <a:lstStyle/>
+          <a:p>
+            <a:pPr algn="ctr"/>
+            <a:endParaRPr lang="en-US"/>
+          </a:p>
+        </p:txBody>
+      </p:sp>
+      <p:sp>
+        <p:nvSpPr>
+          <p:cNvPr id="59" name="Rectangle 58"/>
+          <p:cNvSpPr/>
+          <p:nvPr/>
+        </p:nvSpPr>
+        <p:spPr>
+          <a:xfrm>
+            <a:off x="2997605" y="2684031"/>
+            <a:ext cx="994116" cy="153888"/>
+          </a:xfrm>
+          <a:prstGeom prst="rect">
+            <a:avLst/>
+          </a:prstGeom>
+          <a:solidFill>
+            <a:srgbClr val="FFFFFF">
+              <a:alpha val="60000"/>
+            </a:srgbClr>
+          </a:solidFill>
+        </p:spPr>
+        <p:txBody>
+          <a:bodyPr wrap="square" lIns="0" tIns="0" rIns="0" bIns="0">
+            <a:spAutoFit/>
+          </a:bodyPr>
+          <a:lstStyle/>
+          <a:p>
+            <a:pPr algn="ctr"/>
+            <a:r>
+              <a:rPr lang="en-US" sz="1000" b="1" dirty="0" err="1">
+                <a:latin typeface="Helvetica"/>
+                <a:cs typeface="Helvetica"/>
+              </a:rPr>
+              <a:t>ANPP</a:t>
+            </a:r>
+            <a:r>
+              <a:rPr lang="en-US" sz="1000" b="1" baseline="-25000" dirty="0" err="1">
+                <a:latin typeface="Helvetica"/>
+                <a:cs typeface="Helvetica"/>
+              </a:rPr>
+              <a:t>repro</a:t>
+            </a:r>
+            <a:endParaRPr lang="en-US" sz="1000" b="1" baseline="-25000" dirty="0">
+              <a:latin typeface="Helvetica"/>
+              <a:cs typeface="Helvetica"/>
+            </a:endParaRPr>
+          </a:p>
+        </p:txBody>
+      </p:sp>
+      <p:sp>
+        <p:nvSpPr>
+          <p:cNvPr id="60" name="Rectangle 59"/>
+          <p:cNvSpPr/>
+          <p:nvPr/>
+        </p:nvSpPr>
+        <p:spPr>
+          <a:xfrm>
+            <a:off x="4275093" y="3454600"/>
+            <a:ext cx="666274" cy="153888"/>
+          </a:xfrm>
+          <a:prstGeom prst="rect">
+            <a:avLst/>
+          </a:prstGeom>
+          <a:solidFill>
+            <a:srgbClr val="FFFFFF">
+              <a:alpha val="60000"/>
+            </a:srgbClr>
+          </a:solidFill>
+        </p:spPr>
+        <p:txBody>
+          <a:bodyPr wrap="square" lIns="0" tIns="0" rIns="0" bIns="0">
+            <a:spAutoFit/>
+          </a:bodyPr>
+          <a:lstStyle/>
+          <a:p>
+            <a:pPr algn="ctr"/>
+            <a:r>
+              <a:rPr lang="en-US" sz="1000" b="1" dirty="0" err="1">
+                <a:latin typeface="Helvetica"/>
+                <a:cs typeface="Helvetica"/>
+              </a:rPr>
+              <a:t>R</a:t>
+            </a:r>
+            <a:r>
+              <a:rPr lang="en-US" sz="1000" b="1" baseline="-25000" dirty="0" err="1">
+                <a:latin typeface="Helvetica"/>
+                <a:cs typeface="Helvetica"/>
+              </a:rPr>
+              <a:t>root</a:t>
+            </a:r>
+            <a:endParaRPr lang="en-US" sz="1000" b="1" baseline="-25000" dirty="0">
+              <a:latin typeface="Helvetica"/>
+              <a:cs typeface="Helvetica"/>
+            </a:endParaRPr>
+          </a:p>
+        </p:txBody>
+      </p:sp>
+      <p:sp>
+        <p:nvSpPr>
+          <p:cNvPr id="62" name="Down Arrow 61"/>
+          <p:cNvSpPr/>
+          <p:nvPr/>
+        </p:nvSpPr>
+        <p:spPr>
+          <a:xfrm rot="16200000">
+            <a:off x="2530399" y="16019"/>
+            <a:ext cx="664732" cy="2056869"/>
+          </a:xfrm>
+          <a:prstGeom prst="downArrow">
+            <a:avLst/>
+          </a:prstGeom>
+          <a:solidFill>
+            <a:schemeClr val="bg1">
+              <a:lumMod val="65000"/>
+            </a:schemeClr>
+          </a:solidFill>
+          <a:ln>
+            <a:solidFill>
+              <a:schemeClr val="tx1"/>
+            </a:solidFill>
+          </a:ln>
+        </p:spPr>
+        <p:style>
+          <a:lnRef idx="1">
+            <a:schemeClr val="accent1"/>
+          </a:lnRef>
+          <a:fillRef idx="3">
+            <a:schemeClr val="accent1"/>
+          </a:fillRef>
+          <a:effectRef idx="2">
+            <a:schemeClr val="accent1"/>
+          </a:effectRef>
+          <a:fontRef idx="minor">
+            <a:schemeClr val="lt1"/>
+          </a:fontRef>
+        </p:style>
+        <p:txBody>
+          <a:bodyPr rtlCol="0" anchor="ctr"/>
+          <a:lstStyle/>
+          <a:p>
+            <a:pPr algn="ctr"/>
+            <a:endParaRPr lang="en-US"/>
+          </a:p>
+        </p:txBody>
+      </p:sp>
+      <p:sp>
+        <p:nvSpPr>
+          <p:cNvPr id="61" name="Rectangle 60"/>
+          <p:cNvSpPr/>
+          <p:nvPr/>
+        </p:nvSpPr>
+        <p:spPr>
+          <a:xfrm>
+            <a:off x="2173511" y="902461"/>
+            <a:ext cx="1240380" cy="400110"/>
+          </a:xfrm>
+          <a:prstGeom prst="rect">
+            <a:avLst/>
+          </a:prstGeom>
+          <a:noFill/>
+        </p:spPr>
+        <p:txBody>
+          <a:bodyPr wrap="square">
+            <a:spAutoFit/>
+          </a:bodyPr>
+          <a:lstStyle/>
+          <a:p>
+            <a:pPr algn="ctr"/>
+            <a:r>
+              <a:rPr lang="en-US" sz="1000" b="1" dirty="0" err="1">
+                <a:latin typeface="Helvetica"/>
+                <a:cs typeface="Helvetica"/>
+              </a:rPr>
+              <a:t>R</a:t>
+            </a:r>
+            <a:r>
+              <a:rPr lang="en-US" sz="1000" b="1" baseline="-25000" dirty="0" err="1">
+                <a:latin typeface="Helvetica"/>
+                <a:cs typeface="Helvetica"/>
+              </a:rPr>
+              <a:t>auto_ag</a:t>
+            </a:r>
+            <a:endParaRPr lang="en-US" sz="1000" b="1" baseline="-25000" dirty="0">
+              <a:latin typeface="Helvetica"/>
+              <a:cs typeface="Helvetica"/>
+            </a:endParaRPr>
+          </a:p>
+          <a:p>
+            <a:pPr algn="ctr"/>
+            <a:endParaRPr lang="en-US" sz="1000" dirty="0">
+              <a:latin typeface="Helvetica"/>
+              <a:cs typeface="Helvetica"/>
+            </a:endParaRPr>
+          </a:p>
+        </p:txBody>
+      </p:sp>
+      <p:sp>
+        <p:nvSpPr>
+          <p:cNvPr id="21" name="Rectangle 20"/>
+          <p:cNvSpPr/>
+          <p:nvPr/>
+        </p:nvSpPr>
+        <p:spPr>
+          <a:xfrm>
+            <a:off x="3800020" y="6092680"/>
+            <a:ext cx="801096" cy="553998"/>
+          </a:xfrm>
+          <a:prstGeom prst="rect">
+            <a:avLst/>
+          </a:prstGeom>
+          <a:ln>
+            <a:noFill/>
+          </a:ln>
+        </p:spPr>
+        <p:txBody>
+          <a:bodyPr wrap="square">
+            <a:spAutoFit/>
+          </a:bodyPr>
+          <a:lstStyle/>
+          <a:p>
+            <a:pPr algn="ctr"/>
+            <a:r>
+              <a:rPr lang="en-US" sz="1000" b="1" dirty="0">
+                <a:latin typeface="Helvetica"/>
+                <a:cs typeface="Helvetica"/>
+              </a:rPr>
+              <a:t>R</a:t>
+            </a:r>
+            <a:r>
+              <a:rPr lang="en-US" sz="1000" b="1" baseline="-25000" dirty="0">
+                <a:latin typeface="Helvetica"/>
+                <a:cs typeface="Helvetica"/>
+              </a:rPr>
+              <a:t>soil</a:t>
+            </a:r>
+          </a:p>
+          <a:p>
+            <a:pPr algn="ctr"/>
+            <a:r>
+              <a:rPr lang="en-US" sz="1000" dirty="0">
+                <a:latin typeface="Helvetica"/>
+                <a:cs typeface="Helvetica"/>
+              </a:rPr>
+              <a:t>13.5 ± 3.7 (24/19/12)</a:t>
+            </a:r>
+          </a:p>
+        </p:txBody>
+      </p:sp>
+      <p:sp>
+        <p:nvSpPr>
+          <p:cNvPr id="64" name="Rectangle 63"/>
+          <p:cNvSpPr/>
+          <p:nvPr/>
+        </p:nvSpPr>
+        <p:spPr>
+          <a:xfrm>
+            <a:off x="2680571" y="4246174"/>
+            <a:ext cx="748123" cy="153888"/>
+          </a:xfrm>
+          <a:prstGeom prst="rect">
+            <a:avLst/>
+          </a:prstGeom>
+          <a:solidFill>
+            <a:schemeClr val="bg1">
+              <a:alpha val="50000"/>
+            </a:schemeClr>
+          </a:solidFill>
+        </p:spPr>
+        <p:txBody>
+          <a:bodyPr wrap="square" lIns="0" tIns="0" rIns="0" bIns="0">
+            <a:spAutoFit/>
+          </a:bodyPr>
+          <a:lstStyle/>
+          <a:p>
+            <a:pPr algn="ctr"/>
+            <a:r>
+              <a:rPr lang="en-US" sz="1000" b="1" dirty="0" err="1" smtClean="0">
+                <a:latin typeface="Helvetica"/>
+                <a:cs typeface="Helvetica"/>
+              </a:rPr>
+              <a:t>ANPP</a:t>
+            </a:r>
+            <a:r>
+              <a:rPr lang="en-US" sz="1000" b="1" baseline="-25000" dirty="0" err="1" smtClean="0">
+                <a:latin typeface="Helvetica"/>
+                <a:cs typeface="Helvetica"/>
+              </a:rPr>
+              <a:t>branch</a:t>
+            </a:r>
+            <a:endParaRPr lang="en-US" sz="1000" dirty="0">
+              <a:latin typeface="Helvetica"/>
+              <a:cs typeface="Helvetica"/>
+            </a:endParaRPr>
+          </a:p>
+        </p:txBody>
+      </p:sp>
+      <p:sp>
+        <p:nvSpPr>
+          <p:cNvPr id="65" name="Down Arrow 64"/>
+          <p:cNvSpPr/>
+          <p:nvPr/>
+        </p:nvSpPr>
+        <p:spPr>
+          <a:xfrm>
+            <a:off x="2602113" y="3404499"/>
+            <a:ext cx="126462" cy="1727436"/>
+          </a:xfrm>
+          <a:prstGeom prst="downArrow">
+            <a:avLst/>
+          </a:prstGeom>
+          <a:solidFill>
+            <a:schemeClr val="accent3"/>
+          </a:solidFill>
+          <a:ln>
+            <a:solidFill>
+              <a:schemeClr val="tx1"/>
+            </a:solidFill>
+          </a:ln>
+        </p:spPr>
+        <p:style>
+          <a:lnRef idx="1">
+            <a:schemeClr val="accent1"/>
+          </a:lnRef>
+          <a:fillRef idx="3">
+            <a:schemeClr val="accent1"/>
+          </a:fillRef>
+          <a:effectRef idx="2">
+            <a:schemeClr val="accent1"/>
+          </a:effectRef>
+          <a:fontRef idx="minor">
+            <a:schemeClr val="lt1"/>
+          </a:fontRef>
+        </p:style>
+        <p:txBody>
+          <a:bodyPr rtlCol="0" anchor="ctr"/>
+          <a:lstStyle/>
+          <a:p>
+            <a:pPr algn="ctr"/>
+            <a:endParaRPr lang="en-US"/>
+          </a:p>
+        </p:txBody>
+      </p:sp>
+      <p:sp>
+        <p:nvSpPr>
+          <p:cNvPr id="66" name="Rectangle 65"/>
+          <p:cNvSpPr/>
+          <p:nvPr/>
+        </p:nvSpPr>
+        <p:spPr>
+          <a:xfrm>
+            <a:off x="6998762" y="6710151"/>
+            <a:ext cx="1382212" cy="455201"/>
+          </a:xfrm>
+          <a:prstGeom prst="rect">
+            <a:avLst/>
+          </a:prstGeom>
+          <a:solidFill>
+            <a:schemeClr val="bg2"/>
+          </a:solidFill>
+          <a:ln>
+            <a:solidFill>
+              <a:schemeClr val="tx1"/>
+            </a:solidFill>
+          </a:ln>
+        </p:spPr>
+        <p:style>
+          <a:lnRef idx="1">
+            <a:schemeClr val="accent1"/>
+          </a:lnRef>
+          <a:fillRef idx="3">
+            <a:schemeClr val="accent1"/>
+          </a:fillRef>
+          <a:effectRef idx="2">
+            <a:schemeClr val="accent1"/>
+          </a:effectRef>
+          <a:fontRef idx="minor">
+            <a:schemeClr val="lt1"/>
+          </a:fontRef>
+        </p:style>
+        <p:txBody>
+          <a:bodyPr rtlCol="0" anchor="ctr"/>
+          <a:lstStyle/>
+          <a:p>
+            <a:pPr algn="ctr"/>
+            <a:r>
+              <a:rPr lang="en-US" sz="1000" b="1" dirty="0" smtClean="0">
+                <a:solidFill>
+                  <a:schemeClr val="tx1"/>
+                </a:solidFill>
+                <a:latin typeface="Helvetica"/>
+                <a:cs typeface="Helvetica"/>
+              </a:rPr>
+              <a:t>coarse root biomass</a:t>
+            </a:r>
+            <a:endParaRPr lang="en-US" sz="1000" b="1" dirty="0">
+              <a:solidFill>
+                <a:schemeClr val="tx1"/>
+              </a:solidFill>
+              <a:latin typeface="Helvetica"/>
+              <a:cs typeface="Helvetica"/>
+            </a:endParaRPr>
+          </a:p>
+        </p:txBody>
+      </p:sp>
+      <p:sp>
+        <p:nvSpPr>
+          <p:cNvPr id="67" name="Rectangle 66"/>
+          <p:cNvSpPr/>
+          <p:nvPr/>
+        </p:nvSpPr>
+        <p:spPr>
+          <a:xfrm>
+            <a:off x="5469413" y="6147858"/>
+            <a:ext cx="1242695" cy="507805"/>
+          </a:xfrm>
+          <a:prstGeom prst="rect">
+            <a:avLst/>
+          </a:prstGeom>
+          <a:solidFill>
+            <a:schemeClr val="bg2"/>
+          </a:solidFill>
+          <a:ln>
+            <a:solidFill>
+              <a:schemeClr val="tx1"/>
+            </a:solidFill>
+          </a:ln>
+        </p:spPr>
+        <p:style>
+          <a:lnRef idx="1">
+            <a:schemeClr val="accent1"/>
+          </a:lnRef>
+          <a:fillRef idx="3">
+            <a:schemeClr val="accent1"/>
+          </a:fillRef>
+          <a:effectRef idx="2">
+            <a:schemeClr val="accent1"/>
+          </a:effectRef>
+          <a:fontRef idx="minor">
+            <a:schemeClr val="lt1"/>
+          </a:fontRef>
+        </p:style>
+        <p:txBody>
+          <a:bodyPr rtlCol="0" anchor="ctr"/>
+          <a:lstStyle/>
+          <a:p>
+            <a:pPr algn="ctr"/>
+            <a:r>
+              <a:rPr lang="en-US" sz="1000" b="1" dirty="0" smtClean="0">
+                <a:solidFill>
+                  <a:schemeClr val="tx1"/>
+                </a:solidFill>
+                <a:latin typeface="Helvetica"/>
+                <a:cs typeface="Helvetica"/>
+              </a:rPr>
+              <a:t>down dead wood</a:t>
+            </a:r>
+            <a:endParaRPr lang="en-US" sz="1000" b="1" dirty="0">
+              <a:solidFill>
+                <a:schemeClr val="tx1"/>
+              </a:solidFill>
+              <a:latin typeface="Helvetica"/>
+              <a:cs typeface="Helvetica"/>
+            </a:endParaRPr>
+          </a:p>
+        </p:txBody>
+      </p:sp>
+      <p:sp>
+        <p:nvSpPr>
+          <p:cNvPr id="68" name="Rectangle 67"/>
+          <p:cNvSpPr/>
+          <p:nvPr/>
+        </p:nvSpPr>
+        <p:spPr>
+          <a:xfrm>
+            <a:off x="5498004" y="4369344"/>
+            <a:ext cx="1338444" cy="507805"/>
+          </a:xfrm>
+          <a:prstGeom prst="rect">
+            <a:avLst/>
+          </a:prstGeom>
+          <a:solidFill>
+            <a:schemeClr val="bg2"/>
+          </a:solidFill>
+          <a:ln>
+            <a:solidFill>
+              <a:schemeClr val="tx1"/>
+            </a:solidFill>
+          </a:ln>
+        </p:spPr>
+        <p:style>
+          <a:lnRef idx="1">
+            <a:schemeClr val="accent1"/>
+          </a:lnRef>
+          <a:fillRef idx="3">
+            <a:schemeClr val="accent1"/>
+          </a:fillRef>
+          <a:effectRef idx="2">
+            <a:schemeClr val="accent1"/>
+          </a:effectRef>
+          <a:fontRef idx="minor">
+            <a:schemeClr val="lt1"/>
+          </a:fontRef>
+        </p:style>
+        <p:txBody>
+          <a:bodyPr rtlCol="0" anchor="ctr"/>
+          <a:lstStyle/>
+          <a:p>
+            <a:pPr algn="ctr"/>
+            <a:r>
+              <a:rPr lang="en-US" sz="1000" b="1" dirty="0" smtClean="0">
+                <a:solidFill>
+                  <a:schemeClr val="tx1"/>
+                </a:solidFill>
+                <a:latin typeface="Helvetica"/>
+                <a:cs typeface="Helvetica"/>
+              </a:rPr>
+              <a:t>standing dead wood</a:t>
+            </a:r>
+            <a:endParaRPr lang="en-US" sz="1000" b="1" dirty="0">
+              <a:solidFill>
+                <a:schemeClr val="tx1"/>
+              </a:solidFill>
+              <a:latin typeface="Helvetica"/>
+              <a:cs typeface="Helvetica"/>
+            </a:endParaRPr>
+          </a:p>
+        </p:txBody>
+      </p:sp>
+      <p:sp>
+        <p:nvSpPr>
+          <p:cNvPr id="69" name="Rectangle 68"/>
+          <p:cNvSpPr/>
+          <p:nvPr/>
+        </p:nvSpPr>
+        <p:spPr>
+          <a:xfrm>
+            <a:off x="7041694" y="3571423"/>
+            <a:ext cx="1339280" cy="520658"/>
+          </a:xfrm>
+          <a:prstGeom prst="rect">
+            <a:avLst/>
+          </a:prstGeom>
+          <a:solidFill>
+            <a:schemeClr val="bg2"/>
+          </a:solidFill>
+          <a:ln>
+            <a:solidFill>
+              <a:srgbClr val="4A452A"/>
+            </a:solidFill>
+          </a:ln>
+        </p:spPr>
+        <p:style>
+          <a:lnRef idx="1">
+            <a:schemeClr val="accent1"/>
+          </a:lnRef>
+          <a:fillRef idx="3">
+            <a:schemeClr val="accent1"/>
+          </a:fillRef>
+          <a:effectRef idx="2">
+            <a:schemeClr val="accent1"/>
+          </a:effectRef>
+          <a:fontRef idx="minor">
+            <a:schemeClr val="lt1"/>
+          </a:fontRef>
+        </p:style>
+        <p:txBody>
+          <a:bodyPr rtlCol="0" anchor="ctr"/>
+          <a:lstStyle/>
+          <a:p>
+            <a:pPr algn="ctr"/>
+            <a:r>
+              <a:rPr lang="en-US" sz="1000" b="1" smtClean="0">
+                <a:solidFill>
+                  <a:schemeClr val="tx1"/>
+                </a:solidFill>
+                <a:latin typeface="Helvetica"/>
+                <a:cs typeface="Helvetica"/>
+              </a:rPr>
+              <a:t>woody ag biomass</a:t>
+            </a:r>
+            <a:endParaRPr lang="en-US" sz="1000" b="1" dirty="0">
+              <a:solidFill>
+                <a:schemeClr val="tx1"/>
+              </a:solidFill>
+              <a:latin typeface="Helvetica"/>
+              <a:cs typeface="Helvetica"/>
+            </a:endParaRPr>
+          </a:p>
+          <a:p>
+            <a:pPr algn="ctr"/>
+            <a:r>
+              <a:rPr lang="en-US" sz="1000" dirty="0">
+                <a:solidFill>
+                  <a:schemeClr val="tx1"/>
+                </a:solidFill>
+                <a:latin typeface="Helvetica"/>
+                <a:cs typeface="Helvetica"/>
+              </a:rPr>
+              <a:t>4.2 ± 1.3 </a:t>
+            </a:r>
+          </a:p>
+          <a:p>
+            <a:pPr algn="ctr"/>
+            <a:r>
+              <a:rPr lang="en-US" sz="1000" dirty="0">
+                <a:solidFill>
+                  <a:schemeClr val="tx1"/>
+                </a:solidFill>
+                <a:latin typeface="Helvetica"/>
+                <a:cs typeface="Helvetica"/>
+              </a:rPr>
+              <a:t>(18/14/5)</a:t>
+            </a:r>
+          </a:p>
+        </p:txBody>
+      </p:sp>
+      <p:sp>
+        <p:nvSpPr>
+          <p:cNvPr id="70" name="Down Arrow 69"/>
+          <p:cNvSpPr/>
+          <p:nvPr/>
+        </p:nvSpPr>
+        <p:spPr>
+          <a:xfrm rot="18346085">
+            <a:off x="2966314" y="3195024"/>
+            <a:ext cx="193397" cy="796985"/>
+          </a:xfrm>
+          <a:prstGeom prst="downArrow">
+            <a:avLst/>
+          </a:prstGeom>
+          <a:solidFill>
+            <a:schemeClr val="accent3"/>
+          </a:solidFill>
+          <a:ln>
+            <a:solidFill>
+              <a:srgbClr val="4A452A"/>
+            </a:solidFill>
+          </a:ln>
+        </p:spPr>
+        <p:style>
+          <a:lnRef idx="1">
+            <a:schemeClr val="accent1"/>
+          </a:lnRef>
+          <a:fillRef idx="3">
+            <a:schemeClr val="accent1"/>
+          </a:fillRef>
+          <a:effectRef idx="2">
+            <a:schemeClr val="accent1"/>
+          </a:effectRef>
+          <a:fontRef idx="minor">
+            <a:schemeClr val="lt1"/>
+          </a:fontRef>
+        </p:style>
+        <p:txBody>
+          <a:bodyPr rtlCol="0" anchor="ctr"/>
+          <a:lstStyle/>
+          <a:p>
+            <a:pPr algn="ctr"/>
+            <a:endParaRPr lang="en-US"/>
+          </a:p>
+        </p:txBody>
+      </p:sp>
+      <p:sp>
+        <p:nvSpPr>
+          <p:cNvPr id="71" name="Rectangle 70"/>
+          <p:cNvSpPr/>
+          <p:nvPr/>
+        </p:nvSpPr>
+        <p:spPr>
+          <a:xfrm>
+            <a:off x="1388954" y="2940452"/>
+            <a:ext cx="748123" cy="153888"/>
+          </a:xfrm>
+          <a:prstGeom prst="rect">
+            <a:avLst/>
+          </a:prstGeom>
+          <a:solidFill>
+            <a:schemeClr val="bg1">
+              <a:alpha val="50000"/>
+            </a:schemeClr>
+          </a:solidFill>
+        </p:spPr>
+        <p:txBody>
+          <a:bodyPr wrap="square" lIns="0" tIns="0" rIns="0" bIns="0">
+            <a:spAutoFit/>
+          </a:bodyPr>
+          <a:lstStyle/>
+          <a:p>
+            <a:pPr algn="ctr"/>
+            <a:r>
+              <a:rPr lang="en-US" sz="1000" b="1" dirty="0" err="1" smtClean="0">
+                <a:latin typeface="Helvetica"/>
+                <a:cs typeface="Helvetica"/>
+              </a:rPr>
+              <a:t>ANPP</a:t>
+            </a:r>
+            <a:r>
+              <a:rPr lang="en-US" sz="1000" b="1" baseline="-25000" dirty="0" err="1" smtClean="0">
+                <a:latin typeface="Helvetica"/>
+                <a:cs typeface="Helvetica"/>
+              </a:rPr>
+              <a:t>woody</a:t>
+            </a:r>
+            <a:endParaRPr lang="en-US" sz="1000" dirty="0">
+              <a:latin typeface="Helvetica"/>
+              <a:cs typeface="Helvetica"/>
+            </a:endParaRPr>
+          </a:p>
+        </p:txBody>
+      </p:sp>
+      <p:cxnSp>
+        <p:nvCxnSpPr>
+          <p:cNvPr id="75" name="Elbow Connector 74"/>
+          <p:cNvCxnSpPr>
+            <a:stCxn id="31" idx="3"/>
+            <a:endCxn id="54" idx="0"/>
+          </p:cNvCxnSpPr>
+          <p:nvPr/>
+        </p:nvCxnSpPr>
+        <p:spPr>
+          <a:xfrm>
+            <a:off x="8941405" y="2883447"/>
+            <a:ext cx="360878" cy="1059860"/>
+          </a:xfrm>
+          <a:prstGeom prst="bentConnector2">
+            <a:avLst/>
+          </a:prstGeom>
+          <a:ln>
+            <a:solidFill>
+              <a:schemeClr val="tx1"/>
+            </a:solidFill>
+          </a:ln>
+        </p:spPr>
+        <p:style>
+          <a:lnRef idx="1">
+            <a:schemeClr val="accent1"/>
+          </a:lnRef>
+          <a:fillRef idx="0">
+            <a:schemeClr val="accent1"/>
+          </a:fillRef>
+          <a:effectRef idx="0">
+            <a:schemeClr val="accent1"/>
+          </a:effectRef>
+          <a:fontRef idx="minor">
+            <a:schemeClr val="tx1"/>
+          </a:fontRef>
+        </p:style>
+      </p:cxnSp>
+      <p:cxnSp>
+        <p:nvCxnSpPr>
+          <p:cNvPr id="77" name="Elbow Connector 76"/>
+          <p:cNvCxnSpPr>
+            <a:stCxn id="54" idx="2"/>
+            <a:endCxn id="12" idx="0"/>
+          </p:cNvCxnSpPr>
+          <p:nvPr/>
+        </p:nvCxnSpPr>
+        <p:spPr>
+          <a:xfrm rot="5400000">
+            <a:off x="7988355" y="4756117"/>
+            <a:ext cx="1558874" cy="1068982"/>
+          </a:xfrm>
+          <a:prstGeom prst="bentConnector3">
+            <a:avLst>
+              <a:gd name="adj1" fmla="val 50000"/>
+            </a:avLst>
+          </a:prstGeom>
+          <a:ln>
+            <a:solidFill>
+              <a:schemeClr val="tx1"/>
+            </a:solidFill>
+          </a:ln>
+        </p:spPr>
+        <p:style>
+          <a:lnRef idx="1">
+            <a:schemeClr val="accent1"/>
+          </a:lnRef>
+          <a:fillRef idx="0">
+            <a:schemeClr val="accent1"/>
+          </a:fillRef>
+          <a:effectRef idx="0">
+            <a:schemeClr val="accent1"/>
+          </a:effectRef>
+          <a:fontRef idx="minor">
+            <a:schemeClr val="tx1"/>
+          </a:fontRef>
+        </p:style>
+      </p:cxnSp>
+      <p:sp>
+        <p:nvSpPr>
+          <p:cNvPr id="123" name="Down Arrow 122"/>
+          <p:cNvSpPr/>
+          <p:nvPr/>
+        </p:nvSpPr>
+        <p:spPr>
+          <a:xfrm rot="19529667" flipH="1">
+            <a:off x="4120997" y="3622412"/>
+            <a:ext cx="261452" cy="2974859"/>
+          </a:xfrm>
+          <a:prstGeom prst="downArrow">
+            <a:avLst/>
+          </a:prstGeom>
+          <a:solidFill>
+            <a:schemeClr val="accent3"/>
+          </a:solidFill>
+          <a:ln>
+            <a:solidFill>
+              <a:schemeClr val="tx1"/>
+            </a:solidFill>
+          </a:ln>
+        </p:spPr>
+        <p:style>
+          <a:lnRef idx="1">
+            <a:schemeClr val="accent1"/>
+          </a:lnRef>
+          <a:fillRef idx="3">
+            <a:schemeClr val="accent1"/>
+          </a:fillRef>
+          <a:effectRef idx="2">
+            <a:schemeClr val="accent1"/>
+          </a:effectRef>
+          <a:fontRef idx="minor">
+            <a:schemeClr val="lt1"/>
+          </a:fontRef>
+        </p:style>
+        <p:txBody>
+          <a:bodyPr rtlCol="0" anchor="ctr"/>
+          <a:lstStyle/>
+          <a:p>
+            <a:pPr algn="ctr"/>
+            <a:endParaRPr lang="en-US"/>
+          </a:p>
+        </p:txBody>
+      </p:sp>
+      <p:cxnSp>
+        <p:nvCxnSpPr>
+          <p:cNvPr id="4" name="Elbow Connector 3"/>
+          <p:cNvCxnSpPr>
+            <a:stCxn id="30" idx="3"/>
+            <a:endCxn id="31" idx="0"/>
+          </p:cNvCxnSpPr>
+          <p:nvPr/>
+        </p:nvCxnSpPr>
+        <p:spPr>
+          <a:xfrm>
+            <a:off x="8152424" y="2154856"/>
+            <a:ext cx="236532" cy="387509"/>
+          </a:xfrm>
+          <a:prstGeom prst="bentConnector2">
+            <a:avLst/>
+          </a:prstGeom>
+          <a:ln>
+            <a:solidFill>
+              <a:schemeClr val="tx1"/>
+            </a:solidFill>
+          </a:ln>
+        </p:spPr>
+        <p:style>
+          <a:lnRef idx="1">
+            <a:schemeClr val="accent1"/>
+          </a:lnRef>
+          <a:fillRef idx="0">
+            <a:schemeClr val="accent1"/>
+          </a:fillRef>
+          <a:effectRef idx="0">
+            <a:schemeClr val="accent1"/>
+          </a:effectRef>
+          <a:fontRef idx="minor">
+            <a:schemeClr val="tx1"/>
+          </a:fontRef>
+        </p:style>
+      </p:cxnSp>
+      <p:cxnSp>
+        <p:nvCxnSpPr>
+          <p:cNvPr id="9" name="Elbow Connector 8"/>
+          <p:cNvCxnSpPr>
+            <a:stCxn id="69" idx="3"/>
+            <a:endCxn id="31" idx="2"/>
+          </p:cNvCxnSpPr>
+          <p:nvPr/>
+        </p:nvCxnSpPr>
+        <p:spPr>
+          <a:xfrm flipV="1">
+            <a:off x="8380974" y="3224529"/>
+            <a:ext cx="7982" cy="607223"/>
+          </a:xfrm>
+          <a:prstGeom prst="bentConnector2">
+            <a:avLst/>
+          </a:prstGeom>
+          <a:ln>
+            <a:solidFill>
+              <a:schemeClr val="tx1"/>
+            </a:solidFill>
+          </a:ln>
+        </p:spPr>
+        <p:style>
+          <a:lnRef idx="1">
+            <a:schemeClr val="accent1"/>
+          </a:lnRef>
+          <a:fillRef idx="0">
+            <a:schemeClr val="accent1"/>
+          </a:fillRef>
+          <a:effectRef idx="0">
+            <a:schemeClr val="accent1"/>
+          </a:effectRef>
+          <a:fontRef idx="minor">
+            <a:schemeClr val="tx1"/>
+          </a:fontRef>
+        </p:style>
+      </p:cxnSp>
+      <p:cxnSp>
+        <p:nvCxnSpPr>
+          <p:cNvPr id="43" name="Elbow Connector 42"/>
+          <p:cNvCxnSpPr>
+            <a:stCxn id="68" idx="3"/>
+            <a:endCxn id="13" idx="0"/>
+          </p:cNvCxnSpPr>
+          <p:nvPr/>
+        </p:nvCxnSpPr>
+        <p:spPr>
+          <a:xfrm>
+            <a:off x="6836448" y="4623247"/>
+            <a:ext cx="53657" cy="529745"/>
+          </a:xfrm>
+          <a:prstGeom prst="bentConnector2">
+            <a:avLst/>
+          </a:prstGeom>
+          <a:ln>
+            <a:solidFill>
+              <a:schemeClr val="tx1"/>
+            </a:solidFill>
+          </a:ln>
+        </p:spPr>
+        <p:style>
+          <a:lnRef idx="1">
+            <a:schemeClr val="accent1"/>
+          </a:lnRef>
+          <a:fillRef idx="0">
+            <a:schemeClr val="accent1"/>
+          </a:fillRef>
+          <a:effectRef idx="0">
+            <a:schemeClr val="accent1"/>
+          </a:effectRef>
+          <a:fontRef idx="minor">
+            <a:schemeClr val="tx1"/>
+          </a:fontRef>
+        </p:style>
+      </p:cxnSp>
+      <p:cxnSp>
+        <p:nvCxnSpPr>
+          <p:cNvPr id="45" name="Elbow Connector 44"/>
+          <p:cNvCxnSpPr>
+            <a:stCxn id="67" idx="3"/>
+            <a:endCxn id="13" idx="2"/>
+          </p:cNvCxnSpPr>
+          <p:nvPr/>
+        </p:nvCxnSpPr>
+        <p:spPr>
+          <a:xfrm flipV="1">
+            <a:off x="6712108" y="5660797"/>
+            <a:ext cx="177997" cy="740964"/>
+          </a:xfrm>
+          <a:prstGeom prst="bentConnector2">
+            <a:avLst/>
+          </a:prstGeom>
+          <a:ln>
+            <a:solidFill>
+              <a:schemeClr val="tx1"/>
+            </a:solidFill>
+          </a:ln>
+        </p:spPr>
+        <p:style>
+          <a:lnRef idx="1">
+            <a:schemeClr val="accent1"/>
+          </a:lnRef>
+          <a:fillRef idx="0">
+            <a:schemeClr val="accent1"/>
+          </a:fillRef>
+          <a:effectRef idx="0">
+            <a:schemeClr val="accent1"/>
+          </a:effectRef>
+          <a:fontRef idx="minor">
+            <a:schemeClr val="tx1"/>
+          </a:fontRef>
+        </p:style>
+      </p:cxnSp>
+      <p:cxnSp>
+        <p:nvCxnSpPr>
+          <p:cNvPr id="83" name="Elbow Connector 82"/>
+          <p:cNvCxnSpPr/>
+          <p:nvPr/>
+        </p:nvCxnSpPr>
+        <p:spPr>
+          <a:xfrm rot="5400000" flipH="1" flipV="1">
+            <a:off x="8718347" y="6444544"/>
+            <a:ext cx="412713" cy="46696"/>
+          </a:xfrm>
+          <a:prstGeom prst="bentConnector3">
+            <a:avLst>
+              <a:gd name="adj1" fmla="val 50000"/>
+            </a:avLst>
+          </a:prstGeom>
+          <a:ln>
+            <a:solidFill>
+              <a:schemeClr val="tx1"/>
+            </a:solidFill>
+          </a:ln>
+        </p:spPr>
+        <p:style>
+          <a:lnRef idx="1">
+            <a:schemeClr val="accent1"/>
+          </a:lnRef>
+          <a:fillRef idx="0">
+            <a:schemeClr val="accent1"/>
+          </a:fillRef>
+          <a:effectRef idx="0">
+            <a:schemeClr val="accent1"/>
+          </a:effectRef>
+          <a:fontRef idx="minor">
+            <a:schemeClr val="tx1"/>
+          </a:fontRef>
+        </p:style>
+      </p:cxnSp>
+      <p:cxnSp>
+        <p:nvCxnSpPr>
+          <p:cNvPr id="85" name="Elbow Connector 84"/>
+          <p:cNvCxnSpPr>
+            <a:stCxn id="12" idx="1"/>
+          </p:cNvCxnSpPr>
+          <p:nvPr/>
+        </p:nvCxnSpPr>
+        <p:spPr>
+          <a:xfrm rot="10800000" flipV="1">
+            <a:off x="7400144" y="6323046"/>
+            <a:ext cx="243275" cy="392564"/>
+          </a:xfrm>
+          <a:prstGeom prst="bentConnector2">
+            <a:avLst/>
+          </a:prstGeom>
+        </p:spPr>
+        <p:style>
+          <a:lnRef idx="1">
+            <a:schemeClr val="accent1"/>
+          </a:lnRef>
+          <a:fillRef idx="0">
+            <a:schemeClr val="accent1"/>
+          </a:fillRef>
+          <a:effectRef idx="0">
+            <a:schemeClr val="accent1"/>
+          </a:effectRef>
+          <a:fontRef idx="minor">
+            <a:schemeClr val="tx1"/>
+          </a:fontRef>
+        </p:style>
+      </p:cxnSp>
+      <p:sp>
+        <p:nvSpPr>
+          <p:cNvPr id="143" name="Down Arrow 142"/>
+          <p:cNvSpPr/>
+          <p:nvPr/>
+        </p:nvSpPr>
+        <p:spPr>
+          <a:xfrm rot="1148444" flipH="1">
+            <a:off x="2704377" y="2845294"/>
+            <a:ext cx="69469" cy="2128586"/>
+          </a:xfrm>
+          <a:prstGeom prst="downArrow">
+            <a:avLst/>
+          </a:prstGeom>
+          <a:solidFill>
+            <a:schemeClr val="accent3"/>
+          </a:solidFill>
+          <a:ln>
+            <a:solidFill>
+              <a:srgbClr val="4A452A"/>
+            </a:solidFill>
+          </a:ln>
+        </p:spPr>
+        <p:style>
+          <a:lnRef idx="1">
+            <a:schemeClr val="accent1"/>
+          </a:lnRef>
+          <a:fillRef idx="3">
+            <a:schemeClr val="accent1"/>
+          </a:fillRef>
+          <a:effectRef idx="2">
+            <a:schemeClr val="accent1"/>
+          </a:effectRef>
+          <a:fontRef idx="minor">
+            <a:schemeClr val="lt1"/>
+          </a:fontRef>
+        </p:style>
+        <p:txBody>
+          <a:bodyPr rtlCol="0" anchor="ctr"/>
+          <a:lstStyle/>
+          <a:p>
+            <a:pPr algn="ctr"/>
+            <a:endParaRPr lang="en-US"/>
+          </a:p>
+        </p:txBody>
+      </p:sp>
+      <p:sp>
+        <p:nvSpPr>
+          <p:cNvPr id="72" name="Rectangle 71"/>
+          <p:cNvSpPr/>
+          <p:nvPr/>
+        </p:nvSpPr>
+        <p:spPr>
+          <a:xfrm>
+            <a:off x="2323669" y="1607000"/>
+            <a:ext cx="1404919" cy="246221"/>
+          </a:xfrm>
+          <a:prstGeom prst="rect">
+            <a:avLst/>
+          </a:prstGeom>
+          <a:solidFill>
+            <a:srgbClr val="FFFFFF">
+              <a:alpha val="64000"/>
+            </a:srgbClr>
+          </a:solidFill>
+          <a:ln>
+            <a:noFill/>
+          </a:ln>
+        </p:spPr>
+        <p:txBody>
+          <a:bodyPr wrap="square">
+            <a:spAutoFit/>
+          </a:bodyPr>
+          <a:lstStyle/>
+          <a:p>
+            <a:pPr algn="ctr"/>
+            <a:r>
+              <a:rPr lang="en-US" sz="1000" b="1" smtClean="0">
+                <a:latin typeface="Helvetica"/>
+                <a:cs typeface="Helvetica"/>
+              </a:rPr>
+              <a:t>∆AGB</a:t>
+            </a:r>
+            <a:endParaRPr lang="en-US" sz="1000" b="1" dirty="0">
+              <a:latin typeface="Helvetica"/>
+              <a:cs typeface="Helvetica"/>
+            </a:endParaRPr>
+          </a:p>
+        </p:txBody>
+      </p:sp>
+      <p:cxnSp>
+        <p:nvCxnSpPr>
+          <p:cNvPr id="135" name="Straight Arrow Connector 134"/>
+          <p:cNvCxnSpPr/>
+          <p:nvPr/>
+        </p:nvCxnSpPr>
+        <p:spPr>
+          <a:xfrm flipV="1">
+            <a:off x="4055380" y="1958312"/>
+            <a:ext cx="1226483" cy="685452"/>
+          </a:xfrm>
+          <a:prstGeom prst="straightConnector1">
+            <a:avLst/>
+          </a:prstGeom>
+          <a:ln w="19050" cmpd="sng">
+            <a:solidFill>
+              <a:schemeClr val="tx1">
+                <a:lumMod val="50000"/>
+                <a:lumOff val="50000"/>
+              </a:schemeClr>
+            </a:solidFill>
+            <a:prstDash val="dash"/>
+            <a:headEnd type="none"/>
+            <a:tailEnd type="triangle"/>
+          </a:ln>
+        </p:spPr>
+        <p:style>
+          <a:lnRef idx="2">
+            <a:schemeClr val="accent1"/>
+          </a:lnRef>
+          <a:fillRef idx="0">
+            <a:schemeClr val="accent1"/>
+          </a:fillRef>
+          <a:effectRef idx="1">
+            <a:schemeClr val="accent1"/>
+          </a:effectRef>
+          <a:fontRef idx="minor">
+            <a:schemeClr val="tx1"/>
+          </a:fontRef>
+        </p:style>
+      </p:cxnSp>
+      <p:sp>
+        <p:nvSpPr>
+          <p:cNvPr id="140" name="Rectangle 139"/>
+          <p:cNvSpPr/>
+          <p:nvPr/>
+        </p:nvSpPr>
+        <p:spPr>
+          <a:xfrm>
+            <a:off x="5419838" y="1648205"/>
+            <a:ext cx="672998" cy="153888"/>
+          </a:xfrm>
+          <a:prstGeom prst="rect">
+            <a:avLst/>
+          </a:prstGeom>
+          <a:noFill/>
+        </p:spPr>
+        <p:txBody>
+          <a:bodyPr wrap="square" lIns="0" tIns="0" rIns="0" bIns="0">
+            <a:spAutoFit/>
+          </a:bodyPr>
+          <a:lstStyle/>
+          <a:p>
+            <a:pPr algn="ctr"/>
+            <a:r>
+              <a:rPr lang="en-US" sz="1000" b="1" dirty="0" err="1" smtClean="0">
+                <a:latin typeface="Helvetica"/>
+                <a:cs typeface="Helvetica"/>
+              </a:rPr>
+              <a:t>R</a:t>
+            </a:r>
+            <a:r>
+              <a:rPr lang="en-US" sz="1000" b="1" baseline="-25000" dirty="0" err="1" smtClean="0">
+                <a:latin typeface="Helvetica"/>
+                <a:cs typeface="Helvetica"/>
+              </a:rPr>
+              <a:t>het</a:t>
+            </a:r>
+            <a:endParaRPr lang="en-US" sz="1000" b="1" baseline="-25000" dirty="0">
+              <a:latin typeface="Helvetica"/>
+              <a:cs typeface="Helvetica"/>
+            </a:endParaRPr>
+          </a:p>
+        </p:txBody>
+      </p:sp>
+      <p:cxnSp>
+        <p:nvCxnSpPr>
+          <p:cNvPr id="171" name="Straight Arrow Connector 170"/>
+          <p:cNvCxnSpPr/>
+          <p:nvPr/>
+        </p:nvCxnSpPr>
+        <p:spPr>
+          <a:xfrm flipV="1">
+            <a:off x="5442468" y="1507751"/>
+            <a:ext cx="148459" cy="361002"/>
+          </a:xfrm>
+          <a:prstGeom prst="straightConnector1">
+            <a:avLst/>
+          </a:prstGeom>
+          <a:ln w="19050" cmpd="sng">
+            <a:solidFill>
+              <a:schemeClr val="tx1">
+                <a:lumMod val="50000"/>
+                <a:lumOff val="50000"/>
+              </a:schemeClr>
+            </a:solidFill>
+            <a:prstDash val="dash"/>
+            <a:headEnd type="none"/>
+            <a:tailEnd type="triangle"/>
+          </a:ln>
+        </p:spPr>
+        <p:style>
+          <a:lnRef idx="2">
+            <a:schemeClr val="accent1"/>
+          </a:lnRef>
+          <a:fillRef idx="0">
+            <a:schemeClr val="accent1"/>
+          </a:fillRef>
+          <a:effectRef idx="1">
+            <a:schemeClr val="accent1"/>
+          </a:effectRef>
+          <a:fontRef idx="minor">
+            <a:schemeClr val="tx1"/>
+          </a:fontRef>
+        </p:style>
+      </p:cxnSp>
+    </p:spTree>
+    <p:extLst>
+      <p:ext uri="{BB962C8B-B14F-4D97-AF65-F5344CB8AC3E}">
+        <p14:creationId xmlns:p14="http://schemas.microsoft.com/office/powerpoint/2010/main" val="3279568633"/>
+      </p:ext>
+    </p:extLst>
+  </p:cSld>
+  <p:clrMapOvr>
+    <a:masterClrMapping/>
+  </p:clrMapOvr>
+</p:sld>
+</file>
+
+<file path=ppt/slides/slide2.xml><?xml version="1.0" encoding="utf-8"?>
+<p:sld xmlns:a="http://schemas.openxmlformats.org/drawingml/2006/main" xmlns:r="http://schemas.openxmlformats.org/officeDocument/2006/relationships" xmlns:p="http://schemas.openxmlformats.org/presentationml/2006/main">
+  <p:cSld>
+    <p:spTree>
+      <p:nvGrpSpPr>
+        <p:cNvPr id="1" name=""/>
+        <p:cNvGrpSpPr/>
+        <p:nvPr/>
+      </p:nvGrpSpPr>
+      <p:grpSpPr>
+        <a:xfrm>
+          <a:off x="0" y="0"/>
+          <a:ext cx="0" cy="0"/>
+          <a:chOff x="0" y="0"/>
+          <a:chExt cx="0" cy="0"/>
+        </a:xfrm>
+      </p:grpSpPr>
+      <p:grpSp>
+        <p:nvGrpSpPr>
+          <p:cNvPr id="2" name="Group 1"/>
+          <p:cNvGrpSpPr/>
+          <p:nvPr/>
+        </p:nvGrpSpPr>
+        <p:grpSpPr>
+          <a:xfrm>
+            <a:off x="1461441" y="498082"/>
+            <a:ext cx="4359361" cy="6858000"/>
+            <a:chOff x="954104" y="843197"/>
+            <a:chExt cx="4359361" cy="6858000"/>
+          </a:xfrm>
+        </p:grpSpPr>
+        <p:pic>
+          <p:nvPicPr>
+            <p:cNvPr id="121" name="Picture 120"/>
+            <p:cNvPicPr>
+              <a:picLocks noChangeAspect="1"/>
+            </p:cNvPicPr>
+            <p:nvPr/>
+          </p:nvPicPr>
+          <p:blipFill>
+            <a:blip r:embed="rId3"/>
+            <a:stretch>
+              <a:fillRect/>
+            </a:stretch>
+          </p:blipFill>
+          <p:spPr>
+            <a:xfrm>
+              <a:off x="954104" y="843197"/>
+              <a:ext cx="4359361" cy="6858000"/>
+            </a:xfrm>
+            <a:prstGeom prst="rect">
+              <a:avLst/>
+            </a:prstGeom>
+          </p:spPr>
+        </p:pic>
+        <p:pic>
+          <p:nvPicPr>
+            <p:cNvPr id="122" name="Picture 121"/>
+            <p:cNvPicPr>
+              <a:picLocks noChangeAspect="1"/>
+            </p:cNvPicPr>
+            <p:nvPr/>
+          </p:nvPicPr>
+          <p:blipFill rotWithShape="1">
+            <a:blip r:embed="rId4"/>
+            <a:srcRect l="11630"/>
+            <a:stretch/>
+          </p:blipFill>
+          <p:spPr>
+            <a:xfrm>
+              <a:off x="3320736" y="3884124"/>
+              <a:ext cx="594189" cy="850900"/>
+            </a:xfrm>
+            <a:prstGeom prst="rect">
+              <a:avLst/>
+            </a:prstGeom>
+          </p:spPr>
+        </p:pic>
+      </p:grpSp>
+      <p:sp>
+        <p:nvSpPr>
+          <p:cNvPr id="6" name="Down Arrow 5"/>
+          <p:cNvSpPr/>
+          <p:nvPr/>
+        </p:nvSpPr>
+        <p:spPr>
+          <a:xfrm>
             <a:off x="581634" y="415083"/>
             <a:ext cx="1444751" cy="1002632"/>
           </a:xfrm>
@@ -6804,7 +10438,7 @@
     </p:spTree>
     <p:extLst>
       <p:ext uri="{BB962C8B-B14F-4D97-AF65-F5344CB8AC3E}">
-        <p14:creationId xmlns:p14="http://schemas.microsoft.com/office/powerpoint/2010/main" val="3279568633"/>
+        <p14:creationId xmlns:p14="http://schemas.microsoft.com/office/powerpoint/2010/main" val="962167224"/>
       </p:ext>
     </p:extLst>
   </p:cSld>

</xml_diff>

<commit_message>
C cycle diagram data, figures and script see issue 2 here: https://github.com/forc-db/ERL-review/issues/2#issuecomment-380404858
</commit_message>
<xml_diff>
--- a/figures/C_cycle_diagrams/rough_draft_C_cycle_diagram.pptx
+++ b/figures/C_cycle_diagrams/rough_draft_C_cycle_diagram.pptx
@@ -215,7 +215,7 @@
           <a:p>
             <a:fld id="{D26A1CBE-BB6E-4336-B9D2-0DBF25804396}" type="datetimeFigureOut">
               <a:rPr lang="en-US" smtClean="0"/>
-              <a:t>4/11/18</a:t>
+              <a:t>4/11/2018</a:t>
             </a:fld>
             <a:endParaRPr lang="en-US"/>
           </a:p>
@@ -792,7 +792,7 @@
           <a:p>
             <a:fld id="{3D51230C-6699-44FE-8AB2-9F66E2F4BD1B}" type="datetimeFigureOut">
               <a:rPr lang="en-US" smtClean="0"/>
-              <a:t>4/11/18</a:t>
+              <a:t>4/11/2018</a:t>
             </a:fld>
             <a:endParaRPr lang="en-US"/>
           </a:p>
@@ -957,7 +957,7 @@
           <a:p>
             <a:fld id="{3D51230C-6699-44FE-8AB2-9F66E2F4BD1B}" type="datetimeFigureOut">
               <a:rPr lang="en-US" smtClean="0"/>
-              <a:t>4/11/18</a:t>
+              <a:t>4/11/2018</a:t>
             </a:fld>
             <a:endParaRPr lang="en-US"/>
           </a:p>
@@ -1132,7 +1132,7 @@
           <a:p>
             <a:fld id="{3D51230C-6699-44FE-8AB2-9F66E2F4BD1B}" type="datetimeFigureOut">
               <a:rPr lang="en-US" smtClean="0"/>
-              <a:t>4/11/18</a:t>
+              <a:t>4/11/2018</a:t>
             </a:fld>
             <a:endParaRPr lang="en-US"/>
           </a:p>
@@ -1297,7 +1297,7 @@
           <a:p>
             <a:fld id="{3D51230C-6699-44FE-8AB2-9F66E2F4BD1B}" type="datetimeFigureOut">
               <a:rPr lang="en-US" smtClean="0"/>
-              <a:t>4/11/18</a:t>
+              <a:t>4/11/2018</a:t>
             </a:fld>
             <a:endParaRPr lang="en-US"/>
           </a:p>
@@ -1536,7 +1536,7 @@
           <a:p>
             <a:fld id="{3D51230C-6699-44FE-8AB2-9F66E2F4BD1B}" type="datetimeFigureOut">
               <a:rPr lang="en-US" smtClean="0"/>
-              <a:t>4/11/18</a:t>
+              <a:t>4/11/2018</a:t>
             </a:fld>
             <a:endParaRPr lang="en-US"/>
           </a:p>
@@ -1763,7 +1763,7 @@
           <a:p>
             <a:fld id="{3D51230C-6699-44FE-8AB2-9F66E2F4BD1B}" type="datetimeFigureOut">
               <a:rPr lang="en-US" smtClean="0"/>
-              <a:t>4/11/18</a:t>
+              <a:t>4/11/2018</a:t>
             </a:fld>
             <a:endParaRPr lang="en-US"/>
           </a:p>
@@ -2125,7 +2125,7 @@
           <a:p>
             <a:fld id="{3D51230C-6699-44FE-8AB2-9F66E2F4BD1B}" type="datetimeFigureOut">
               <a:rPr lang="en-US" smtClean="0"/>
-              <a:t>4/11/18</a:t>
+              <a:t>4/11/2018</a:t>
             </a:fld>
             <a:endParaRPr lang="en-US"/>
           </a:p>
@@ -2238,7 +2238,7 @@
           <a:p>
             <a:fld id="{3D51230C-6699-44FE-8AB2-9F66E2F4BD1B}" type="datetimeFigureOut">
               <a:rPr lang="en-US" smtClean="0"/>
-              <a:t>4/11/18</a:t>
+              <a:t>4/11/2018</a:t>
             </a:fld>
             <a:endParaRPr lang="en-US"/>
           </a:p>
@@ -2328,7 +2328,7 @@
           <a:p>
             <a:fld id="{3D51230C-6699-44FE-8AB2-9F66E2F4BD1B}" type="datetimeFigureOut">
               <a:rPr lang="en-US" smtClean="0"/>
-              <a:t>4/11/18</a:t>
+              <a:t>4/11/2018</a:t>
             </a:fld>
             <a:endParaRPr lang="en-US"/>
           </a:p>
@@ -2600,7 +2600,7 @@
           <a:p>
             <a:fld id="{3D51230C-6699-44FE-8AB2-9F66E2F4BD1B}" type="datetimeFigureOut">
               <a:rPr lang="en-US" smtClean="0"/>
-              <a:t>4/11/18</a:t>
+              <a:t>4/11/2018</a:t>
             </a:fld>
             <a:endParaRPr lang="en-US"/>
           </a:p>
@@ -2852,7 +2852,7 @@
           <a:p>
             <a:fld id="{3D51230C-6699-44FE-8AB2-9F66E2F4BD1B}" type="datetimeFigureOut">
               <a:rPr lang="en-US" smtClean="0"/>
-              <a:t>4/11/18</a:t>
+              <a:t>4/11/2018</a:t>
             </a:fld>
             <a:endParaRPr lang="en-US"/>
           </a:p>
@@ -3060,7 +3060,7 @@
           <a:p>
             <a:fld id="{3D51230C-6699-44FE-8AB2-9F66E2F4BD1B}" type="datetimeFigureOut">
               <a:rPr lang="en-US" smtClean="0"/>
-              <a:t>4/11/18</a:t>
+              <a:t>4/11/2018</a:t>
             </a:fld>
             <a:endParaRPr lang="en-US"/>
           </a:p>
@@ -4015,64 +4015,6 @@
       </p:sp>
       <p:sp>
         <p:nvSpPr>
-          <p:cNvPr id="16" name="Rectangle 15"/>
-          <p:cNvSpPr/>
-          <p:nvPr/>
-        </p:nvSpPr>
-        <p:spPr>
-          <a:xfrm>
-            <a:off x="1576446" y="4015381"/>
-            <a:ext cx="748123" cy="461665"/>
-          </a:xfrm>
-          <a:prstGeom prst="rect">
-            <a:avLst/>
-          </a:prstGeom>
-          <a:solidFill>
-            <a:schemeClr val="bg1">
-              <a:alpha val="50000"/>
-            </a:schemeClr>
-          </a:solidFill>
-        </p:spPr>
-        <p:txBody>
-          <a:bodyPr wrap="square" lIns="0" tIns="0" rIns="0" bIns="0">
-            <a:spAutoFit/>
-          </a:bodyPr>
-          <a:lstStyle/>
-          <a:p>
-            <a:pPr algn="ctr"/>
-            <a:r>
-              <a:rPr lang="en-US" sz="1000" b="1" dirty="0" err="1">
-                <a:latin typeface="Helvetica"/>
-                <a:cs typeface="Helvetica"/>
-              </a:rPr>
-              <a:t>ANPP</a:t>
-            </a:r>
-            <a:r>
-              <a:rPr lang="en-US" sz="1000" b="1" baseline="-25000" dirty="0" err="1">
-                <a:latin typeface="Helvetica"/>
-                <a:cs typeface="Helvetica"/>
-              </a:rPr>
-              <a:t>foliage</a:t>
-            </a:r>
-            <a:endParaRPr lang="en-US" sz="1000" b="1" baseline="-25000" dirty="0">
-              <a:latin typeface="Helvetica"/>
-              <a:cs typeface="Helvetica"/>
-            </a:endParaRPr>
-          </a:p>
-          <a:p>
-            <a:pPr algn="ctr"/>
-            <a:r>
-              <a:rPr lang="en-US" sz="1000" dirty="0">
-                <a:latin typeface="Helvetica"/>
-                <a:cs typeface="Helvetica"/>
-              </a:rPr>
-              <a:t>3.0 ± 1.2 (43/38/18)</a:t>
-            </a:r>
-          </a:p>
-        </p:txBody>
-      </p:sp>
-      <p:sp>
-        <p:nvSpPr>
           <p:cNvPr id="17" name="Rectangle 16"/>
           <p:cNvSpPr/>
           <p:nvPr/>
@@ -4443,7 +4385,7 @@
         </p:nvSpPr>
         <p:spPr>
           <a:xfrm rot="18431627">
-            <a:off x="1393559" y="2174105"/>
+            <a:off x="1394182" y="2146714"/>
             <a:ext cx="228600" cy="668151"/>
           </a:xfrm>
           <a:prstGeom prst="downArrow">
@@ -4491,52 +4433,6 @@
           <a:xfrm flipH="1">
             <a:off x="2266255" y="4956262"/>
             <a:ext cx="220900" cy="1469959"/>
-          </a:xfrm>
-          <a:prstGeom prst="downArrow">
-            <a:avLst/>
-          </a:prstGeom>
-          <a:solidFill>
-            <a:schemeClr val="accent3"/>
-          </a:solidFill>
-          <a:ln>
-            <a:solidFill>
-              <a:srgbClr val="4A452A"/>
-            </a:solidFill>
-          </a:ln>
-        </p:spPr>
-        <p:style>
-          <a:lnRef idx="1">
-            <a:schemeClr val="accent1"/>
-          </a:lnRef>
-          <a:fillRef idx="3">
-            <a:schemeClr val="accent1"/>
-          </a:fillRef>
-          <a:effectRef idx="2">
-            <a:schemeClr val="accent1"/>
-          </a:effectRef>
-          <a:fontRef idx="minor">
-            <a:schemeClr val="lt1"/>
-          </a:fontRef>
-        </p:style>
-        <p:txBody>
-          <a:bodyPr rtlCol="0" anchor="ctr"/>
-          <a:lstStyle/>
-          <a:p>
-            <a:pPr algn="ctr"/>
-            <a:endParaRPr lang="en-US"/>
-          </a:p>
-        </p:txBody>
-      </p:sp>
-      <p:sp>
-        <p:nvSpPr>
-          <p:cNvPr id="28" name="Down Arrow 27"/>
-          <p:cNvSpPr/>
-          <p:nvPr/>
-        </p:nvSpPr>
-        <p:spPr>
-          <a:xfrm rot="16920000">
-            <a:off x="2062431" y="2459633"/>
-            <a:ext cx="137160" cy="566928"/>
           </a:xfrm>
           <a:prstGeom prst="downArrow">
             <a:avLst/>
@@ -5305,8 +5201,8 @@
         </p:nvCxnSpPr>
         <p:spPr>
           <a:xfrm flipV="1">
-            <a:off x="5281863" y="2033115"/>
-            <a:ext cx="232052" cy="4319004"/>
+            <a:off x="5281863" y="1929196"/>
+            <a:ext cx="299698" cy="4422923"/>
           </a:xfrm>
           <a:prstGeom prst="straightConnector1">
             <a:avLst/>
@@ -5530,9 +5426,9 @@
           <p:nvPr/>
         </p:nvSpPr>
         <p:spPr>
-          <a:xfrm>
-            <a:off x="2298119" y="2692317"/>
-            <a:ext cx="137160" cy="2194560"/>
+          <a:xfrm rot="20675077">
+            <a:off x="1962656" y="2764984"/>
+            <a:ext cx="208995" cy="2198350"/>
           </a:xfrm>
           <a:prstGeom prst="downArrow">
             <a:avLst/>
@@ -5793,7 +5689,7 @@
         </p:nvSpPr>
         <p:spPr>
           <a:xfrm>
-            <a:off x="4275093" y="3454600"/>
+            <a:off x="4052944" y="3343622"/>
             <a:ext cx="666274" cy="153888"/>
           </a:xfrm>
           <a:prstGeom prst="rect">
@@ -6406,7 +6302,7 @@
         </p:nvSpPr>
         <p:spPr>
           <a:xfrm>
-            <a:off x="1388954" y="2940452"/>
+            <a:off x="2007079" y="2807377"/>
             <a:ext cx="748123" cy="153888"/>
           </a:xfrm>
           <a:prstGeom prst="rect">
@@ -6725,18 +6621,19 @@
       <p:cxnSp>
         <p:nvCxnSpPr>
           <p:cNvPr id="83" name="Elbow Connector 82"/>
-          <p:cNvCxnSpPr/>
+          <p:cNvCxnSpPr>
+            <a:stCxn id="53" idx="0"/>
+            <a:endCxn id="12" idx="3"/>
+          </p:cNvCxnSpPr>
           <p:nvPr/>
         </p:nvCxnSpPr>
         <p:spPr>
-          <a:xfrm rot="5400000" flipH="1" flipV="1">
-            <a:off x="8718347" y="6444544"/>
-            <a:ext cx="412713" cy="46696"/>
-          </a:xfrm>
-          <a:prstGeom prst="bentConnector3">
-            <a:avLst>
-              <a:gd name="adj1" fmla="val 50000"/>
-            </a:avLst>
+          <a:xfrm rot="16200000" flipV="1">
+            <a:off x="8779944" y="6366285"/>
+            <a:ext cx="387106" cy="300628"/>
+          </a:xfrm>
+          <a:prstGeom prst="bentConnector2">
+            <a:avLst/>
           </a:prstGeom>
           <a:ln>
             <a:solidFill>
@@ -6775,6 +6672,11 @@
           <a:prstGeom prst="bentConnector2">
             <a:avLst/>
           </a:prstGeom>
+          <a:ln>
+            <a:solidFill>
+              <a:schemeClr val="tx1"/>
+            </a:solidFill>
+          </a:ln>
         </p:spPr>
         <p:style>
           <a:lnRef idx="1">
@@ -6837,50 +6739,6 @@
           </a:p>
         </p:txBody>
       </p:sp>
-      <p:sp>
-        <p:nvSpPr>
-          <p:cNvPr id="72" name="Rectangle 71"/>
-          <p:cNvSpPr/>
-          <p:nvPr/>
-        </p:nvSpPr>
-        <p:spPr>
-          <a:xfrm>
-            <a:off x="2323669" y="1607000"/>
-            <a:ext cx="1404919" cy="246221"/>
-          </a:xfrm>
-          <a:prstGeom prst="rect">
-            <a:avLst/>
-          </a:prstGeom>
-          <a:solidFill>
-            <a:srgbClr val="FFFFFF">
-              <a:alpha val="64000"/>
-            </a:srgbClr>
-          </a:solidFill>
-          <a:ln>
-            <a:noFill/>
-          </a:ln>
-        </p:spPr>
-        <p:txBody>
-          <a:bodyPr wrap="square">
-            <a:spAutoFit/>
-          </a:bodyPr>
-          <a:lstStyle/>
-          <a:p>
-            <a:pPr algn="ctr"/>
-            <a:r>
-              <a:rPr lang="en-US" sz="1000" b="1" smtClean="0">
-                <a:latin typeface="Helvetica"/>
-                <a:cs typeface="Helvetica"/>
-              </a:rPr>
-              <a:t>∆AGB</a:t>
-            </a:r>
-            <a:endParaRPr lang="en-US" sz="1000" b="1" dirty="0">
-              <a:latin typeface="Helvetica"/>
-              <a:cs typeface="Helvetica"/>
-            </a:endParaRPr>
-          </a:p>
-        </p:txBody>
-      </p:sp>
       <p:cxnSp>
         <p:nvCxnSpPr>
           <p:cNvPr id="135" name="Straight Arrow Connector 134"/>
@@ -6888,9 +6746,9 @@
           <p:nvPr/>
         </p:nvCxnSpPr>
         <p:spPr>
-          <a:xfrm flipV="1">
-            <a:off x="4055380" y="1958312"/>
-            <a:ext cx="1226483" cy="685452"/>
+          <a:xfrm flipH="1" flipV="1">
+            <a:off x="5655704" y="1929196"/>
+            <a:ext cx="234277" cy="3536968"/>
           </a:xfrm>
           <a:prstGeom prst="straightConnector1">
             <a:avLst/>
@@ -6930,7 +6788,7 @@
         </p:nvSpPr>
         <p:spPr>
           <a:xfrm>
-            <a:off x="5419838" y="1648205"/>
+            <a:off x="5504240" y="1572874"/>
             <a:ext cx="672998" cy="153888"/>
           </a:xfrm>
           <a:prstGeom prst="rect">
@@ -6974,8 +6832,8 @@
         </p:nvCxnSpPr>
         <p:spPr>
           <a:xfrm flipV="1">
-            <a:off x="5442468" y="1507751"/>
-            <a:ext cx="148459" cy="361002"/>
+            <a:off x="5581561" y="1507751"/>
+            <a:ext cx="9366" cy="344344"/>
           </a:xfrm>
           <a:prstGeom prst="straightConnector1">
             <a:avLst/>
@@ -7007,6 +6865,152 @@
           </a:fontRef>
         </p:style>
       </p:cxnSp>
+      <p:sp>
+        <p:nvSpPr>
+          <p:cNvPr id="78" name="Rectangle 77"/>
+          <p:cNvSpPr/>
+          <p:nvPr/>
+        </p:nvSpPr>
+        <p:spPr>
+          <a:xfrm>
+            <a:off x="5254428" y="4048482"/>
+            <a:ext cx="672998" cy="153888"/>
+          </a:xfrm>
+          <a:prstGeom prst="rect">
+            <a:avLst/>
+          </a:prstGeom>
+          <a:noFill/>
+        </p:spPr>
+        <p:txBody>
+          <a:bodyPr wrap="square" lIns="0" tIns="0" rIns="0" bIns="0">
+            <a:spAutoFit/>
+          </a:bodyPr>
+          <a:lstStyle/>
+          <a:p>
+            <a:pPr algn="ctr"/>
+            <a:r>
+              <a:rPr lang="en-US" sz="1000" b="1" dirty="0" err="1" smtClean="0">
+                <a:latin typeface="Helvetica"/>
+                <a:cs typeface="Helvetica"/>
+              </a:rPr>
+              <a:t>R</a:t>
+            </a:r>
+            <a:r>
+              <a:rPr lang="en-US" sz="1000" b="1" baseline="-25000" dirty="0" err="1" smtClean="0">
+                <a:latin typeface="Helvetica"/>
+                <a:cs typeface="Helvetica"/>
+              </a:rPr>
+              <a:t>cwd</a:t>
+            </a:r>
+            <a:endParaRPr lang="en-US" sz="1000" b="1" baseline="-25000" dirty="0">
+              <a:latin typeface="Helvetica"/>
+              <a:cs typeface="Helvetica"/>
+            </a:endParaRPr>
+          </a:p>
+        </p:txBody>
+      </p:sp>
+      <p:sp>
+        <p:nvSpPr>
+          <p:cNvPr id="79" name="Rectangle 78"/>
+          <p:cNvSpPr/>
+          <p:nvPr/>
+        </p:nvSpPr>
+        <p:spPr>
+          <a:xfrm>
+            <a:off x="5629592" y="3004380"/>
+            <a:ext cx="672998" cy="153888"/>
+          </a:xfrm>
+          <a:prstGeom prst="rect">
+            <a:avLst/>
+          </a:prstGeom>
+          <a:noFill/>
+        </p:spPr>
+        <p:txBody>
+          <a:bodyPr wrap="square" lIns="0" tIns="0" rIns="0" bIns="0">
+            <a:spAutoFit/>
+          </a:bodyPr>
+          <a:lstStyle/>
+          <a:p>
+            <a:pPr algn="ctr"/>
+            <a:r>
+              <a:rPr lang="en-US" sz="1000" b="1" dirty="0" smtClean="0">
+                <a:latin typeface="Helvetica"/>
+                <a:cs typeface="Helvetica"/>
+              </a:rPr>
+              <a:t>R</a:t>
+            </a:r>
+            <a:r>
+              <a:rPr lang="en-US" sz="1000" b="1" baseline="-25000" dirty="0" smtClean="0">
+                <a:latin typeface="Helvetica"/>
+                <a:cs typeface="Helvetica"/>
+              </a:rPr>
+              <a:t>ag-het</a:t>
+            </a:r>
+            <a:endParaRPr lang="en-US" sz="1000" b="1" baseline="-25000" dirty="0">
+              <a:latin typeface="Helvetica"/>
+              <a:cs typeface="Helvetica"/>
+            </a:endParaRPr>
+          </a:p>
+        </p:txBody>
+      </p:sp>
+      <p:sp>
+        <p:nvSpPr>
+          <p:cNvPr id="16" name="Rectangle 15"/>
+          <p:cNvSpPr/>
+          <p:nvPr/>
+        </p:nvSpPr>
+        <p:spPr>
+          <a:xfrm>
+            <a:off x="1576446" y="4015381"/>
+            <a:ext cx="748123" cy="461665"/>
+          </a:xfrm>
+          <a:prstGeom prst="rect">
+            <a:avLst/>
+          </a:prstGeom>
+          <a:solidFill>
+            <a:schemeClr val="bg1">
+              <a:alpha val="50000"/>
+            </a:schemeClr>
+          </a:solidFill>
+        </p:spPr>
+        <p:txBody>
+          <a:bodyPr wrap="square" lIns="0" tIns="0" rIns="0" bIns="0">
+            <a:spAutoFit/>
+          </a:bodyPr>
+          <a:lstStyle/>
+          <a:p>
+            <a:pPr algn="ctr"/>
+            <a:r>
+              <a:rPr lang="en-US" sz="1000" b="1" dirty="0" err="1">
+                <a:latin typeface="Helvetica"/>
+                <a:cs typeface="Helvetica"/>
+              </a:rPr>
+              <a:t>ANPP</a:t>
+            </a:r>
+            <a:r>
+              <a:rPr lang="en-US" sz="1000" b="1" baseline="-25000" dirty="0" err="1">
+                <a:latin typeface="Helvetica"/>
+                <a:cs typeface="Helvetica"/>
+              </a:rPr>
+              <a:t>foliage</a:t>
+            </a:r>
+            <a:endParaRPr lang="en-US" sz="1000" b="1" baseline="-25000" dirty="0">
+              <a:latin typeface="Helvetica"/>
+              <a:cs typeface="Helvetica"/>
+            </a:endParaRPr>
+          </a:p>
+          <a:p>
+            <a:pPr algn="ctr"/>
+            <a:r>
+              <a:rPr lang="en-US" sz="1000" dirty="0">
+                <a:latin typeface="Helvetica"/>
+                <a:cs typeface="Helvetica"/>
+              </a:rPr>
+              <a:t>3.0 ± 1.2 (43/38/18)</a:t>
+            </a:r>
+          </a:p>
+        </p:txBody>
+      </p:sp>
     </p:spTree>
     <p:extLst>
       <p:ext uri="{BB962C8B-B14F-4D97-AF65-F5344CB8AC3E}">

</xml_diff>

<commit_message>
Update carbon cycle diagram
</commit_message>
<xml_diff>
--- a/figures/C_cycle_diagrams/rough_draft_C_cycle_diagram.pptx
+++ b/figures/C_cycle_diagrams/rough_draft_C_cycle_diagram.pptx
@@ -5,11 +5,12 @@
     <p:sldMasterId id="2147483732" r:id="rId1"/>
   </p:sldMasterIdLst>
   <p:notesMasterIdLst>
-    <p:notesMasterId r:id="rId4"/>
+    <p:notesMasterId r:id="rId5"/>
   </p:notesMasterIdLst>
   <p:sldIdLst>
-    <p:sldId id="260" r:id="rId2"/>
-    <p:sldId id="261" r:id="rId3"/>
+    <p:sldId id="264" r:id="rId2"/>
+    <p:sldId id="263" r:id="rId3"/>
+    <p:sldId id="261" r:id="rId4"/>
   </p:sldIdLst>
   <p:sldSz cx="10058400" cy="7875588"/>
   <p:notesSz cx="6858000" cy="9144000"/>
@@ -215,7 +216,7 @@
           <a:p>
             <a:fld id="{D26A1CBE-BB6E-4336-B9D2-0DBF25804396}" type="datetimeFigureOut">
               <a:rPr lang="en-US" smtClean="0"/>
-              <a:t>4/11/2018</a:t>
+              <a:t>4/13/2018</a:t>
             </a:fld>
             <a:endParaRPr lang="en-US"/>
           </a:p>
@@ -562,7 +563,7 @@
     </p:spTree>
     <p:extLst>
       <p:ext uri="{BB962C8B-B14F-4D97-AF65-F5344CB8AC3E}">
-        <p14:creationId xmlns:p14="http://schemas.microsoft.com/office/powerpoint/2010/main" val="3215559286"/>
+        <p14:creationId xmlns:p14="http://schemas.microsoft.com/office/powerpoint/2010/main" val="1706483376"/>
       </p:ext>
     </p:extLst>
   </p:cSld>
@@ -643,6 +644,95 @@
             <a:fld id="{B8EBD99C-08D7-4F61-AA50-EFB7CB305AFE}" type="slidenum">
               <a:rPr lang="en-US" smtClean="0"/>
               <a:t>2</a:t>
+            </a:fld>
+            <a:endParaRPr lang="en-US"/>
+          </a:p>
+        </p:txBody>
+      </p:sp>
+    </p:spTree>
+    <p:extLst>
+      <p:ext uri="{BB962C8B-B14F-4D97-AF65-F5344CB8AC3E}">
+        <p14:creationId xmlns:p14="http://schemas.microsoft.com/office/powerpoint/2010/main" val="2248961210"/>
+      </p:ext>
+    </p:extLst>
+  </p:cSld>
+  <p:clrMapOvr>
+    <a:masterClrMapping/>
+  </p:clrMapOvr>
+</p:notes>
+</file>
+
+<file path=ppt/notesSlides/notesSlide3.xml><?xml version="1.0" encoding="utf-8"?>
+<p:notes xmlns:a="http://schemas.openxmlformats.org/drawingml/2006/main" xmlns:r="http://schemas.openxmlformats.org/officeDocument/2006/relationships" xmlns:p="http://schemas.openxmlformats.org/presentationml/2006/main">
+  <p:cSld>
+    <p:spTree>
+      <p:nvGrpSpPr>
+        <p:cNvPr id="1" name=""/>
+        <p:cNvGrpSpPr/>
+        <p:nvPr/>
+      </p:nvGrpSpPr>
+      <p:grpSpPr>
+        <a:xfrm>
+          <a:off x="0" y="0"/>
+          <a:ext cx="0" cy="0"/>
+          <a:chOff x="0" y="0"/>
+          <a:chExt cx="0" cy="0"/>
+        </a:xfrm>
+      </p:grpSpPr>
+      <p:sp>
+        <p:nvSpPr>
+          <p:cNvPr id="2" name="Slide Image Placeholder 1"/>
+          <p:cNvSpPr>
+            <a:spLocks noGrp="1" noRot="1" noChangeAspect="1"/>
+          </p:cNvSpPr>
+          <p:nvPr>
+            <p:ph type="sldImg"/>
+          </p:nvPr>
+        </p:nvSpPr>
+        <p:spPr>
+          <a:xfrm>
+            <a:off x="1458913" y="1143000"/>
+            <a:ext cx="3940175" cy="3086100"/>
+          </a:xfrm>
+        </p:spPr>
+      </p:sp>
+      <p:sp>
+        <p:nvSpPr>
+          <p:cNvPr id="3" name="Notes Placeholder 2"/>
+          <p:cNvSpPr>
+            <a:spLocks noGrp="1"/>
+          </p:cNvSpPr>
+          <p:nvPr>
+            <p:ph type="body" idx="1"/>
+          </p:nvPr>
+        </p:nvSpPr>
+        <p:spPr/>
+        <p:txBody>
+          <a:bodyPr/>
+          <a:lstStyle/>
+          <a:p>
+            <a:endParaRPr lang="en-US" dirty="0"/>
+          </a:p>
+        </p:txBody>
+      </p:sp>
+      <p:sp>
+        <p:nvSpPr>
+          <p:cNvPr id="4" name="Slide Number Placeholder 3"/>
+          <p:cNvSpPr>
+            <a:spLocks noGrp="1"/>
+          </p:cNvSpPr>
+          <p:nvPr>
+            <p:ph type="sldNum" sz="quarter" idx="10"/>
+          </p:nvPr>
+        </p:nvSpPr>
+        <p:spPr/>
+        <p:txBody>
+          <a:bodyPr/>
+          <a:lstStyle/>
+          <a:p>
+            <a:fld id="{B8EBD99C-08D7-4F61-AA50-EFB7CB305AFE}" type="slidenum">
+              <a:rPr lang="en-US" smtClean="0"/>
+              <a:t>3</a:t>
             </a:fld>
             <a:endParaRPr lang="en-US"/>
           </a:p>
@@ -792,7 +882,7 @@
           <a:p>
             <a:fld id="{3D51230C-6699-44FE-8AB2-9F66E2F4BD1B}" type="datetimeFigureOut">
               <a:rPr lang="en-US" smtClean="0"/>
-              <a:t>4/11/2018</a:t>
+              <a:t>4/13/2018</a:t>
             </a:fld>
             <a:endParaRPr lang="en-US"/>
           </a:p>
@@ -957,7 +1047,7 @@
           <a:p>
             <a:fld id="{3D51230C-6699-44FE-8AB2-9F66E2F4BD1B}" type="datetimeFigureOut">
               <a:rPr lang="en-US" smtClean="0"/>
-              <a:t>4/11/2018</a:t>
+              <a:t>4/13/2018</a:t>
             </a:fld>
             <a:endParaRPr lang="en-US"/>
           </a:p>
@@ -1132,7 +1222,7 @@
           <a:p>
             <a:fld id="{3D51230C-6699-44FE-8AB2-9F66E2F4BD1B}" type="datetimeFigureOut">
               <a:rPr lang="en-US" smtClean="0"/>
-              <a:t>4/11/2018</a:t>
+              <a:t>4/13/2018</a:t>
             </a:fld>
             <a:endParaRPr lang="en-US"/>
           </a:p>
@@ -1297,7 +1387,7 @@
           <a:p>
             <a:fld id="{3D51230C-6699-44FE-8AB2-9F66E2F4BD1B}" type="datetimeFigureOut">
               <a:rPr lang="en-US" smtClean="0"/>
-              <a:t>4/11/2018</a:t>
+              <a:t>4/13/2018</a:t>
             </a:fld>
             <a:endParaRPr lang="en-US"/>
           </a:p>
@@ -1536,7 +1626,7 @@
           <a:p>
             <a:fld id="{3D51230C-6699-44FE-8AB2-9F66E2F4BD1B}" type="datetimeFigureOut">
               <a:rPr lang="en-US" smtClean="0"/>
-              <a:t>4/11/2018</a:t>
+              <a:t>4/13/2018</a:t>
             </a:fld>
             <a:endParaRPr lang="en-US"/>
           </a:p>
@@ -1763,7 +1853,7 @@
           <a:p>
             <a:fld id="{3D51230C-6699-44FE-8AB2-9F66E2F4BD1B}" type="datetimeFigureOut">
               <a:rPr lang="en-US" smtClean="0"/>
-              <a:t>4/11/2018</a:t>
+              <a:t>4/13/2018</a:t>
             </a:fld>
             <a:endParaRPr lang="en-US"/>
           </a:p>
@@ -2125,7 +2215,7 @@
           <a:p>
             <a:fld id="{3D51230C-6699-44FE-8AB2-9F66E2F4BD1B}" type="datetimeFigureOut">
               <a:rPr lang="en-US" smtClean="0"/>
-              <a:t>4/11/2018</a:t>
+              <a:t>4/13/2018</a:t>
             </a:fld>
             <a:endParaRPr lang="en-US"/>
           </a:p>
@@ -2238,7 +2328,7 @@
           <a:p>
             <a:fld id="{3D51230C-6699-44FE-8AB2-9F66E2F4BD1B}" type="datetimeFigureOut">
               <a:rPr lang="en-US" smtClean="0"/>
-              <a:t>4/11/2018</a:t>
+              <a:t>4/13/2018</a:t>
             </a:fld>
             <a:endParaRPr lang="en-US"/>
           </a:p>
@@ -2328,7 +2418,7 @@
           <a:p>
             <a:fld id="{3D51230C-6699-44FE-8AB2-9F66E2F4BD1B}" type="datetimeFigureOut">
               <a:rPr lang="en-US" smtClean="0"/>
-              <a:t>4/11/2018</a:t>
+              <a:t>4/13/2018</a:t>
             </a:fld>
             <a:endParaRPr lang="en-US"/>
           </a:p>
@@ -2600,7 +2690,7 @@
           <a:p>
             <a:fld id="{3D51230C-6699-44FE-8AB2-9F66E2F4BD1B}" type="datetimeFigureOut">
               <a:rPr lang="en-US" smtClean="0"/>
-              <a:t>4/11/2018</a:t>
+              <a:t>4/13/2018</a:t>
             </a:fld>
             <a:endParaRPr lang="en-US"/>
           </a:p>
@@ -2852,7 +2942,7 @@
           <a:p>
             <a:fld id="{3D51230C-6699-44FE-8AB2-9F66E2F4BD1B}" type="datetimeFigureOut">
               <a:rPr lang="en-US" smtClean="0"/>
-              <a:t>4/11/2018</a:t>
+              <a:t>4/13/2018</a:t>
             </a:fld>
             <a:endParaRPr lang="en-US"/>
           </a:p>
@@ -3060,7 +3150,7 @@
           <a:p>
             <a:fld id="{3D51230C-6699-44FE-8AB2-9F66E2F4BD1B}" type="datetimeFigureOut">
               <a:rPr lang="en-US" smtClean="0"/>
-              <a:t>4/11/2018</a:t>
+              <a:t>4/13/2018</a:t>
             </a:fld>
             <a:endParaRPr lang="en-US"/>
           </a:p>
@@ -4175,7 +4265,7 @@
         </p:nvSpPr>
         <p:spPr>
           <a:xfrm>
-            <a:off x="3010691" y="2351375"/>
+            <a:off x="2788716" y="1554482"/>
             <a:ext cx="994116" cy="307777"/>
           </a:xfrm>
           <a:prstGeom prst="rect">
@@ -4338,9 +4428,9 @@
           <p:nvPr/>
         </p:nvSpPr>
         <p:spPr>
-          <a:xfrm rot="16200000">
-            <a:off x="2335634" y="2061603"/>
-            <a:ext cx="45719" cy="1067763"/>
+          <a:xfrm rot="13636164">
+            <a:off x="2254997" y="1656170"/>
+            <a:ext cx="98378" cy="1188422"/>
           </a:xfrm>
           <a:prstGeom prst="downArrow">
             <a:avLst/>
@@ -5641,7 +5731,7 @@
         </p:nvSpPr>
         <p:spPr>
           <a:xfrm>
-            <a:off x="2997605" y="2684031"/>
+            <a:off x="3234735" y="2344144"/>
             <a:ext cx="994116" cy="153888"/>
           </a:xfrm>
           <a:prstGeom prst="rect">
@@ -6701,8 +6791,8 @@
         </p:nvSpPr>
         <p:spPr>
           <a:xfrm rot="1148444" flipH="1">
-            <a:off x="2704377" y="2845294"/>
-            <a:ext cx="69469" cy="2128586"/>
+            <a:off x="2764645" y="2487839"/>
+            <a:ext cx="145399" cy="2509005"/>
           </a:xfrm>
           <a:prstGeom prst="downArrow">
             <a:avLst/>
@@ -6746,9 +6836,9 @@
           <p:nvPr/>
         </p:nvCxnSpPr>
         <p:spPr>
-          <a:xfrm flipH="1" flipV="1">
-            <a:off x="5655704" y="1929196"/>
-            <a:ext cx="234277" cy="3536968"/>
+          <a:xfrm>
+            <a:off x="3931849" y="1726762"/>
+            <a:ext cx="1536019" cy="84284"/>
           </a:xfrm>
           <a:prstGeom prst="straightConnector1">
             <a:avLst/>
@@ -7011,10 +7101,56 @@
           </a:p>
         </p:txBody>
       </p:sp>
+      <p:sp>
+        <p:nvSpPr>
+          <p:cNvPr id="76" name="Down Arrow 75"/>
+          <p:cNvSpPr/>
+          <p:nvPr/>
+        </p:nvSpPr>
+        <p:spPr>
+          <a:xfrm rot="15723102">
+            <a:off x="2482963" y="1969260"/>
+            <a:ext cx="199152" cy="1318315"/>
+          </a:xfrm>
+          <a:prstGeom prst="downArrow">
+            <a:avLst/>
+          </a:prstGeom>
+          <a:solidFill>
+            <a:schemeClr val="accent3"/>
+          </a:solidFill>
+          <a:ln>
+            <a:solidFill>
+              <a:srgbClr val="4A452A"/>
+            </a:solidFill>
+          </a:ln>
+        </p:spPr>
+        <p:style>
+          <a:lnRef idx="1">
+            <a:schemeClr val="accent1"/>
+          </a:lnRef>
+          <a:fillRef idx="3">
+            <a:schemeClr val="accent1"/>
+          </a:fillRef>
+          <a:effectRef idx="2">
+            <a:schemeClr val="accent1"/>
+          </a:effectRef>
+          <a:fontRef idx="minor">
+            <a:schemeClr val="lt1"/>
+          </a:fontRef>
+        </p:style>
+        <p:txBody>
+          <a:bodyPr rtlCol="0" anchor="ctr"/>
+          <a:lstStyle/>
+          <a:p>
+            <a:pPr algn="ctr"/>
+            <a:endParaRPr lang="en-US"/>
+          </a:p>
+        </p:txBody>
+      </p:sp>
     </p:spTree>
     <p:extLst>
       <p:ext uri="{BB962C8B-B14F-4D97-AF65-F5344CB8AC3E}">
-        <p14:creationId xmlns:p14="http://schemas.microsoft.com/office/powerpoint/2010/main" val="3279568633"/>
+        <p14:creationId xmlns:p14="http://schemas.microsoft.com/office/powerpoint/2010/main" val="2496189039"/>
       </p:ext>
     </p:extLst>
   </p:cSld>
@@ -7025,6 +7161,3582 @@
 </file>
 
 <file path=ppt/slides/slide2.xml><?xml version="1.0" encoding="utf-8"?>
+<p:sld xmlns:a="http://schemas.openxmlformats.org/drawingml/2006/main" xmlns:r="http://schemas.openxmlformats.org/officeDocument/2006/relationships" xmlns:p="http://schemas.openxmlformats.org/presentationml/2006/main">
+  <p:cSld>
+    <p:spTree>
+      <p:nvGrpSpPr>
+        <p:cNvPr id="1" name=""/>
+        <p:cNvGrpSpPr/>
+        <p:nvPr/>
+      </p:nvGrpSpPr>
+      <p:grpSpPr>
+        <a:xfrm>
+          <a:off x="0" y="0"/>
+          <a:ext cx="0" cy="0"/>
+          <a:chOff x="0" y="0"/>
+          <a:chExt cx="0" cy="0"/>
+        </a:xfrm>
+      </p:grpSpPr>
+      <p:grpSp>
+        <p:nvGrpSpPr>
+          <p:cNvPr id="86" name="Group 85"/>
+          <p:cNvGrpSpPr/>
+          <p:nvPr/>
+        </p:nvGrpSpPr>
+        <p:grpSpPr>
+          <a:xfrm flipH="1">
+            <a:off x="5543103" y="513147"/>
+            <a:ext cx="4064955" cy="6858000"/>
+            <a:chOff x="814404" y="843197"/>
+            <a:chExt cx="4359361" cy="6858000"/>
+          </a:xfrm>
+        </p:grpSpPr>
+        <p:pic>
+          <p:nvPicPr>
+            <p:cNvPr id="87" name="Picture 86"/>
+            <p:cNvPicPr>
+              <a:picLocks noChangeAspect="1"/>
+            </p:cNvPicPr>
+            <p:nvPr/>
+          </p:nvPicPr>
+          <p:blipFill>
+            <a:blip r:embed="rId3"/>
+            <a:stretch>
+              <a:fillRect/>
+            </a:stretch>
+          </p:blipFill>
+          <p:spPr>
+            <a:xfrm>
+              <a:off x="814404" y="843197"/>
+              <a:ext cx="4359361" cy="6858000"/>
+            </a:xfrm>
+            <a:prstGeom prst="rect">
+              <a:avLst/>
+            </a:prstGeom>
+          </p:spPr>
+        </p:pic>
+        <p:pic>
+          <p:nvPicPr>
+            <p:cNvPr id="88" name="Picture 87"/>
+            <p:cNvPicPr>
+              <a:picLocks noChangeAspect="1"/>
+            </p:cNvPicPr>
+            <p:nvPr/>
+          </p:nvPicPr>
+          <p:blipFill rotWithShape="1">
+            <a:blip r:embed="rId4"/>
+            <a:srcRect l="11630"/>
+            <a:stretch/>
+          </p:blipFill>
+          <p:spPr>
+            <a:xfrm>
+              <a:off x="3225398" y="3884124"/>
+              <a:ext cx="594189" cy="850900"/>
+            </a:xfrm>
+            <a:prstGeom prst="rect">
+              <a:avLst/>
+            </a:prstGeom>
+          </p:spPr>
+        </p:pic>
+      </p:grpSp>
+      <p:grpSp>
+        <p:nvGrpSpPr>
+          <p:cNvPr id="2" name="Group 1"/>
+          <p:cNvGrpSpPr/>
+          <p:nvPr/>
+        </p:nvGrpSpPr>
+        <p:grpSpPr>
+          <a:xfrm>
+            <a:off x="1296341" y="498082"/>
+            <a:ext cx="4359361" cy="6858000"/>
+            <a:chOff x="954104" y="843197"/>
+            <a:chExt cx="4359361" cy="6858000"/>
+          </a:xfrm>
+        </p:grpSpPr>
+        <p:pic>
+          <p:nvPicPr>
+            <p:cNvPr id="121" name="Picture 120"/>
+            <p:cNvPicPr>
+              <a:picLocks noChangeAspect="1"/>
+            </p:cNvPicPr>
+            <p:nvPr/>
+          </p:nvPicPr>
+          <p:blipFill>
+            <a:blip r:embed="rId3"/>
+            <a:stretch>
+              <a:fillRect/>
+            </a:stretch>
+          </p:blipFill>
+          <p:spPr>
+            <a:xfrm>
+              <a:off x="954104" y="843197"/>
+              <a:ext cx="4359361" cy="6858000"/>
+            </a:xfrm>
+            <a:prstGeom prst="rect">
+              <a:avLst/>
+            </a:prstGeom>
+          </p:spPr>
+        </p:pic>
+        <p:pic>
+          <p:nvPicPr>
+            <p:cNvPr id="122" name="Picture 121"/>
+            <p:cNvPicPr>
+              <a:picLocks noChangeAspect="1"/>
+            </p:cNvPicPr>
+            <p:nvPr/>
+          </p:nvPicPr>
+          <p:blipFill rotWithShape="1">
+            <a:blip r:embed="rId4"/>
+            <a:srcRect l="11630"/>
+            <a:stretch/>
+          </p:blipFill>
+          <p:spPr>
+            <a:xfrm>
+              <a:off x="3320736" y="3884124"/>
+              <a:ext cx="594189" cy="850900"/>
+            </a:xfrm>
+            <a:prstGeom prst="rect">
+              <a:avLst/>
+            </a:prstGeom>
+          </p:spPr>
+        </p:pic>
+      </p:grpSp>
+      <p:sp>
+        <p:nvSpPr>
+          <p:cNvPr id="6" name="Down Arrow 5"/>
+          <p:cNvSpPr/>
+          <p:nvPr/>
+        </p:nvSpPr>
+        <p:spPr>
+          <a:xfrm>
+            <a:off x="416534" y="415083"/>
+            <a:ext cx="1444751" cy="1002632"/>
+          </a:xfrm>
+          <a:prstGeom prst="downArrow">
+            <a:avLst/>
+          </a:prstGeom>
+          <a:solidFill>
+            <a:schemeClr val="accent3"/>
+          </a:solidFill>
+          <a:ln>
+            <a:solidFill>
+              <a:srgbClr val="4A452A"/>
+            </a:solidFill>
+          </a:ln>
+        </p:spPr>
+        <p:style>
+          <a:lnRef idx="1">
+            <a:schemeClr val="accent1"/>
+          </a:lnRef>
+          <a:fillRef idx="3">
+            <a:schemeClr val="accent1"/>
+          </a:fillRef>
+          <a:effectRef idx="2">
+            <a:schemeClr val="accent1"/>
+          </a:effectRef>
+          <a:fontRef idx="minor">
+            <a:schemeClr val="lt1"/>
+          </a:fontRef>
+        </p:style>
+        <p:txBody>
+          <a:bodyPr rtlCol="0" anchor="ctr"/>
+          <a:lstStyle/>
+          <a:p>
+            <a:pPr algn="ctr"/>
+            <a:endParaRPr lang="en-US"/>
+          </a:p>
+        </p:txBody>
+      </p:sp>
+      <p:sp>
+        <p:nvSpPr>
+          <p:cNvPr id="8" name="Down Arrow 7"/>
+          <p:cNvSpPr/>
+          <p:nvPr/>
+        </p:nvSpPr>
+        <p:spPr>
+          <a:xfrm rot="20728107">
+            <a:off x="1464584" y="2283141"/>
+            <a:ext cx="146304" cy="4458147"/>
+          </a:xfrm>
+          <a:prstGeom prst="downArrow">
+            <a:avLst/>
+          </a:prstGeom>
+          <a:solidFill>
+            <a:schemeClr val="accent3"/>
+          </a:solidFill>
+          <a:ln>
+            <a:solidFill>
+              <a:srgbClr val="4A452A"/>
+            </a:solidFill>
+          </a:ln>
+        </p:spPr>
+        <p:style>
+          <a:lnRef idx="1">
+            <a:schemeClr val="accent1"/>
+          </a:lnRef>
+          <a:fillRef idx="3">
+            <a:schemeClr val="accent1"/>
+          </a:fillRef>
+          <a:effectRef idx="2">
+            <a:schemeClr val="accent1"/>
+          </a:effectRef>
+          <a:fontRef idx="minor">
+            <a:schemeClr val="lt1"/>
+          </a:fontRef>
+        </p:style>
+        <p:txBody>
+          <a:bodyPr rtlCol="0" anchor="ctr"/>
+          <a:lstStyle/>
+          <a:p>
+            <a:pPr algn="ctr"/>
+            <a:endParaRPr lang="en-US"/>
+          </a:p>
+        </p:txBody>
+      </p:sp>
+      <p:sp>
+        <p:nvSpPr>
+          <p:cNvPr id="10" name="Down Arrow 9"/>
+          <p:cNvSpPr/>
+          <p:nvPr/>
+        </p:nvSpPr>
+        <p:spPr>
+          <a:xfrm rot="10800000">
+            <a:off x="4976026" y="415084"/>
+            <a:ext cx="1298448" cy="1005840"/>
+          </a:xfrm>
+          <a:prstGeom prst="downArrow">
+            <a:avLst>
+              <a:gd name="adj1" fmla="val 50000"/>
+              <a:gd name="adj2" fmla="val 31420"/>
+            </a:avLst>
+          </a:prstGeom>
+          <a:solidFill>
+            <a:schemeClr val="bg1">
+              <a:lumMod val="65000"/>
+            </a:schemeClr>
+          </a:solidFill>
+          <a:ln>
+            <a:solidFill>
+              <a:srgbClr val="4A452A"/>
+            </a:solidFill>
+          </a:ln>
+        </p:spPr>
+        <p:style>
+          <a:lnRef idx="1">
+            <a:schemeClr val="accent1"/>
+          </a:lnRef>
+          <a:fillRef idx="3">
+            <a:schemeClr val="accent1"/>
+          </a:fillRef>
+          <a:effectRef idx="2">
+            <a:schemeClr val="accent1"/>
+          </a:effectRef>
+          <a:fontRef idx="minor">
+            <a:schemeClr val="lt1"/>
+          </a:fontRef>
+        </p:style>
+        <p:txBody>
+          <a:bodyPr rtlCol="0" anchor="ctr"/>
+          <a:lstStyle/>
+          <a:p>
+            <a:pPr algn="ctr"/>
+            <a:endParaRPr lang="en-US"/>
+          </a:p>
+        </p:txBody>
+      </p:sp>
+      <p:sp>
+        <p:nvSpPr>
+          <p:cNvPr id="11" name="Down Arrow 10"/>
+          <p:cNvSpPr/>
+          <p:nvPr/>
+        </p:nvSpPr>
+        <p:spPr>
+          <a:xfrm rot="11704169">
+            <a:off x="4691292" y="1887857"/>
+            <a:ext cx="338569" cy="4203277"/>
+          </a:xfrm>
+          <a:prstGeom prst="downArrow">
+            <a:avLst/>
+          </a:prstGeom>
+          <a:solidFill>
+            <a:schemeClr val="bg1">
+              <a:lumMod val="65000"/>
+            </a:schemeClr>
+          </a:solidFill>
+          <a:ln>
+            <a:solidFill>
+              <a:schemeClr val="tx1"/>
+            </a:solidFill>
+          </a:ln>
+        </p:spPr>
+        <p:style>
+          <a:lnRef idx="1">
+            <a:schemeClr val="accent1"/>
+          </a:lnRef>
+          <a:fillRef idx="3">
+            <a:schemeClr val="accent1"/>
+          </a:fillRef>
+          <a:effectRef idx="2">
+            <a:schemeClr val="accent1"/>
+          </a:effectRef>
+          <a:fontRef idx="minor">
+            <a:schemeClr val="lt1"/>
+          </a:fontRef>
+        </p:style>
+        <p:txBody>
+          <a:bodyPr rtlCol="0" anchor="ctr"/>
+          <a:lstStyle/>
+          <a:p>
+            <a:pPr algn="ctr"/>
+            <a:endParaRPr lang="en-US"/>
+          </a:p>
+        </p:txBody>
+      </p:sp>
+      <p:sp>
+        <p:nvSpPr>
+          <p:cNvPr id="12" name="Rectangle 11"/>
+          <p:cNvSpPr/>
+          <p:nvPr/>
+        </p:nvSpPr>
+        <p:spPr>
+          <a:xfrm>
+            <a:off x="7643418" y="6070045"/>
+            <a:ext cx="1179765" cy="506002"/>
+          </a:xfrm>
+          <a:prstGeom prst="rect">
+            <a:avLst/>
+          </a:prstGeom>
+          <a:solidFill>
+            <a:schemeClr val="bg2"/>
+          </a:solidFill>
+          <a:ln>
+            <a:solidFill>
+              <a:srgbClr val="4A452A"/>
+            </a:solidFill>
+          </a:ln>
+        </p:spPr>
+        <p:style>
+          <a:lnRef idx="1">
+            <a:schemeClr val="accent1"/>
+          </a:lnRef>
+          <a:fillRef idx="3">
+            <a:schemeClr val="accent1"/>
+          </a:fillRef>
+          <a:effectRef idx="2">
+            <a:schemeClr val="accent1"/>
+          </a:effectRef>
+          <a:fontRef idx="minor">
+            <a:schemeClr val="lt1"/>
+          </a:fontRef>
+        </p:style>
+        <p:txBody>
+          <a:bodyPr rtlCol="0" anchor="ctr"/>
+          <a:lstStyle/>
+          <a:p>
+            <a:pPr algn="ctr"/>
+            <a:r>
+              <a:rPr lang="en-US" sz="1000" b="1" dirty="0">
+                <a:solidFill>
+                  <a:schemeClr val="tx1"/>
+                </a:solidFill>
+                <a:latin typeface="Helvetica"/>
+                <a:cs typeface="Helvetica"/>
+              </a:rPr>
+              <a:t>root biomass</a:t>
+            </a:r>
+          </a:p>
+          <a:p>
+            <a:pPr algn="ctr"/>
+            <a:r>
+              <a:rPr lang="en-US" sz="1000" dirty="0">
+                <a:solidFill>
+                  <a:schemeClr val="tx1"/>
+                </a:solidFill>
+                <a:latin typeface="Helvetica"/>
+                <a:cs typeface="Helvetica"/>
+              </a:rPr>
+              <a:t>26.5 ± 15.6</a:t>
+            </a:r>
+          </a:p>
+          <a:p>
+            <a:pPr algn="ctr"/>
+            <a:r>
+              <a:rPr lang="en-US" sz="1000" dirty="0">
+                <a:solidFill>
+                  <a:schemeClr val="tx1"/>
+                </a:solidFill>
+                <a:latin typeface="Helvetica"/>
+                <a:cs typeface="Helvetica"/>
+              </a:rPr>
+              <a:t>(39/22/12)</a:t>
+            </a:r>
+          </a:p>
+        </p:txBody>
+      </p:sp>
+      <p:sp>
+        <p:nvSpPr>
+          <p:cNvPr id="13" name="Rectangle 12"/>
+          <p:cNvSpPr/>
+          <p:nvPr/>
+        </p:nvSpPr>
+        <p:spPr>
+          <a:xfrm>
+            <a:off x="6360623" y="5152992"/>
+            <a:ext cx="1058964" cy="507805"/>
+          </a:xfrm>
+          <a:prstGeom prst="rect">
+            <a:avLst/>
+          </a:prstGeom>
+          <a:solidFill>
+            <a:schemeClr val="bg2"/>
+          </a:solidFill>
+          <a:ln>
+            <a:solidFill>
+              <a:srgbClr val="4A452A"/>
+            </a:solidFill>
+          </a:ln>
+        </p:spPr>
+        <p:style>
+          <a:lnRef idx="1">
+            <a:schemeClr val="accent1"/>
+          </a:lnRef>
+          <a:fillRef idx="3">
+            <a:schemeClr val="accent1"/>
+          </a:fillRef>
+          <a:effectRef idx="2">
+            <a:schemeClr val="accent1"/>
+          </a:effectRef>
+          <a:fontRef idx="minor">
+            <a:schemeClr val="lt1"/>
+          </a:fontRef>
+        </p:style>
+        <p:txBody>
+          <a:bodyPr rtlCol="0" anchor="ctr"/>
+          <a:lstStyle/>
+          <a:p>
+            <a:pPr algn="ctr"/>
+            <a:r>
+              <a:rPr lang="en-US" sz="1000" b="1" dirty="0">
+                <a:solidFill>
+                  <a:schemeClr val="tx1"/>
+                </a:solidFill>
+                <a:latin typeface="Helvetica"/>
+                <a:cs typeface="Helvetica"/>
+              </a:rPr>
+              <a:t>dead wood</a:t>
+            </a:r>
+          </a:p>
+          <a:p>
+            <a:pPr algn="ctr"/>
+            <a:r>
+              <a:rPr lang="en-US" sz="1000" dirty="0">
+                <a:solidFill>
+                  <a:schemeClr val="tx1"/>
+                </a:solidFill>
+                <a:latin typeface="Helvetica"/>
+                <a:cs typeface="Helvetica"/>
+              </a:rPr>
+              <a:t>17.6 ± 12.7 (9/9/5)</a:t>
+            </a:r>
+          </a:p>
+        </p:txBody>
+      </p:sp>
+      <p:sp>
+        <p:nvSpPr>
+          <p:cNvPr id="14" name="Rectangle 13"/>
+          <p:cNvSpPr/>
+          <p:nvPr/>
+        </p:nvSpPr>
+        <p:spPr>
+          <a:xfrm>
+            <a:off x="479292" y="3227412"/>
+            <a:ext cx="760115" cy="553998"/>
+          </a:xfrm>
+          <a:prstGeom prst="rect">
+            <a:avLst/>
+          </a:prstGeom>
+        </p:spPr>
+        <p:txBody>
+          <a:bodyPr wrap="square">
+            <a:spAutoFit/>
+          </a:bodyPr>
+          <a:lstStyle/>
+          <a:p>
+            <a:pPr algn="ctr"/>
+            <a:r>
+              <a:rPr lang="en-US" sz="1000" b="1" dirty="0">
+                <a:latin typeface="Helvetica"/>
+                <a:cs typeface="Helvetica"/>
+              </a:rPr>
+              <a:t>BNPP</a:t>
+            </a:r>
+          </a:p>
+          <a:p>
+            <a:pPr algn="ctr"/>
+            <a:r>
+              <a:rPr lang="en-US" sz="1000" dirty="0">
+                <a:latin typeface="Helvetica"/>
+                <a:cs typeface="Helvetica"/>
+              </a:rPr>
+              <a:t>3.1 ± 1.9 (34/30/12)</a:t>
+            </a:r>
+          </a:p>
+        </p:txBody>
+      </p:sp>
+      <p:sp>
+        <p:nvSpPr>
+          <p:cNvPr id="15" name="Rectangle 14"/>
+          <p:cNvSpPr/>
+          <p:nvPr/>
+        </p:nvSpPr>
+        <p:spPr>
+          <a:xfrm>
+            <a:off x="310356" y="1479117"/>
+            <a:ext cx="789394" cy="553998"/>
+          </a:xfrm>
+          <a:prstGeom prst="rect">
+            <a:avLst/>
+          </a:prstGeom>
+        </p:spPr>
+        <p:txBody>
+          <a:bodyPr wrap="square">
+            <a:spAutoFit/>
+          </a:bodyPr>
+          <a:lstStyle/>
+          <a:p>
+            <a:pPr algn="ctr"/>
+            <a:r>
+              <a:rPr lang="en-US" sz="1000" b="1" dirty="0">
+                <a:latin typeface="Helvetica"/>
+                <a:cs typeface="Helvetica"/>
+              </a:rPr>
+              <a:t>NPP</a:t>
+            </a:r>
+          </a:p>
+          <a:p>
+            <a:pPr algn="ctr"/>
+            <a:r>
+              <a:rPr lang="en-US" sz="1000" dirty="0">
+                <a:latin typeface="Helvetica"/>
+                <a:cs typeface="Helvetica"/>
+              </a:rPr>
+              <a:t>8.7 ± 3.7 (50/32/13)</a:t>
+            </a:r>
+          </a:p>
+        </p:txBody>
+      </p:sp>
+      <p:sp>
+        <p:nvSpPr>
+          <p:cNvPr id="17" name="Rectangle 16"/>
+          <p:cNvSpPr/>
+          <p:nvPr/>
+        </p:nvSpPr>
+        <p:spPr>
+          <a:xfrm>
+            <a:off x="3107980" y="3142551"/>
+            <a:ext cx="725652" cy="461665"/>
+          </a:xfrm>
+          <a:prstGeom prst="rect">
+            <a:avLst/>
+          </a:prstGeom>
+          <a:solidFill>
+            <a:srgbClr val="FFFFFF">
+              <a:alpha val="61000"/>
+            </a:srgbClr>
+          </a:solidFill>
+        </p:spPr>
+        <p:txBody>
+          <a:bodyPr wrap="square" lIns="0" tIns="0" rIns="0" bIns="0">
+            <a:spAutoFit/>
+          </a:bodyPr>
+          <a:lstStyle/>
+          <a:p>
+            <a:pPr algn="ctr"/>
+            <a:r>
+              <a:rPr lang="en-US" sz="1000" b="1" dirty="0" err="1">
+                <a:latin typeface="Helvetica"/>
+                <a:cs typeface="Helvetica"/>
+              </a:rPr>
+              <a:t>ANPP</a:t>
+            </a:r>
+            <a:r>
+              <a:rPr lang="en-US" sz="1000" b="1" baseline="-25000" dirty="0" err="1">
+                <a:latin typeface="Helvetica"/>
+                <a:cs typeface="Helvetica"/>
+              </a:rPr>
+              <a:t>stem</a:t>
+            </a:r>
+            <a:endParaRPr lang="en-US" sz="1000" b="1" baseline="-25000" dirty="0">
+              <a:latin typeface="Helvetica"/>
+              <a:cs typeface="Helvetica"/>
+            </a:endParaRPr>
+          </a:p>
+          <a:p>
+            <a:pPr algn="ctr"/>
+            <a:r>
+              <a:rPr lang="en-US" sz="1000" dirty="0">
+                <a:latin typeface="Helvetica"/>
+                <a:cs typeface="Helvetica"/>
+              </a:rPr>
+              <a:t>2.8 ± 1.0 (141/137/40)</a:t>
+            </a:r>
+          </a:p>
+        </p:txBody>
+      </p:sp>
+      <p:sp>
+        <p:nvSpPr>
+          <p:cNvPr id="18" name="Rectangle 17"/>
+          <p:cNvSpPr/>
+          <p:nvPr/>
+        </p:nvSpPr>
+        <p:spPr>
+          <a:xfrm>
+            <a:off x="5231646" y="561872"/>
+            <a:ext cx="804394" cy="553998"/>
+          </a:xfrm>
+          <a:prstGeom prst="rect">
+            <a:avLst/>
+          </a:prstGeom>
+        </p:spPr>
+        <p:txBody>
+          <a:bodyPr wrap="square">
+            <a:spAutoFit/>
+          </a:bodyPr>
+          <a:lstStyle/>
+          <a:p>
+            <a:pPr algn="ctr"/>
+            <a:r>
+              <a:rPr lang="en-US" sz="1000" b="1" dirty="0">
+                <a:latin typeface="Helvetica"/>
+                <a:cs typeface="Helvetica"/>
+              </a:rPr>
+              <a:t>R</a:t>
+            </a:r>
+            <a:r>
+              <a:rPr lang="en-US" sz="1000" b="1" baseline="-25000" dirty="0">
+                <a:latin typeface="Helvetica"/>
+                <a:cs typeface="Helvetica"/>
+              </a:rPr>
+              <a:t>eco</a:t>
+            </a:r>
+          </a:p>
+          <a:p>
+            <a:pPr algn="ctr"/>
+            <a:r>
+              <a:rPr lang="en-US" sz="1000" dirty="0">
+                <a:latin typeface="Helvetica"/>
+                <a:cs typeface="Helvetica"/>
+              </a:rPr>
+              <a:t>28.3 ± 8.2 (29/11/10)</a:t>
+            </a:r>
+          </a:p>
+        </p:txBody>
+      </p:sp>
+      <p:sp>
+        <p:nvSpPr>
+          <p:cNvPr id="19" name="Rectangle 18"/>
+          <p:cNvSpPr/>
+          <p:nvPr/>
+        </p:nvSpPr>
+        <p:spPr>
+          <a:xfrm>
+            <a:off x="1284968" y="1844976"/>
+            <a:ext cx="821016" cy="553998"/>
+          </a:xfrm>
+          <a:prstGeom prst="rect">
+            <a:avLst/>
+          </a:prstGeom>
+          <a:solidFill>
+            <a:schemeClr val="bg1">
+              <a:alpha val="50000"/>
+            </a:schemeClr>
+          </a:solidFill>
+        </p:spPr>
+        <p:txBody>
+          <a:bodyPr wrap="square" lIns="0" rIns="0">
+            <a:spAutoFit/>
+          </a:bodyPr>
+          <a:lstStyle/>
+          <a:p>
+            <a:pPr algn="ctr"/>
+            <a:r>
+              <a:rPr lang="en-US" sz="1000" b="1" dirty="0">
+                <a:latin typeface="Helvetica"/>
+                <a:cs typeface="Helvetica"/>
+              </a:rPr>
+              <a:t>ANPP</a:t>
+            </a:r>
+          </a:p>
+          <a:p>
+            <a:pPr algn="ctr"/>
+            <a:r>
+              <a:rPr lang="en-US" sz="1000" dirty="0">
+                <a:latin typeface="Helvetica"/>
+                <a:cs typeface="Helvetica"/>
+              </a:rPr>
+              <a:t>5.0 ± 2.4  (57/31/13)</a:t>
+            </a:r>
+          </a:p>
+        </p:txBody>
+      </p:sp>
+      <p:sp>
+        <p:nvSpPr>
+          <p:cNvPr id="22" name="Rectangle 21"/>
+          <p:cNvSpPr/>
+          <p:nvPr/>
+        </p:nvSpPr>
+        <p:spPr>
+          <a:xfrm>
+            <a:off x="3010691" y="2351375"/>
+            <a:ext cx="994116" cy="307777"/>
+          </a:xfrm>
+          <a:prstGeom prst="rect">
+            <a:avLst/>
+          </a:prstGeom>
+          <a:solidFill>
+            <a:srgbClr val="FFFFFF">
+              <a:alpha val="60000"/>
+            </a:srgbClr>
+          </a:solidFill>
+        </p:spPr>
+        <p:txBody>
+          <a:bodyPr wrap="square" lIns="0" tIns="0" rIns="0" bIns="0">
+            <a:spAutoFit/>
+          </a:bodyPr>
+          <a:lstStyle/>
+          <a:p>
+            <a:pPr algn="ctr"/>
+            <a:r>
+              <a:rPr lang="en-US" sz="1000" b="1" dirty="0" err="1">
+                <a:latin typeface="Helvetica"/>
+                <a:cs typeface="Helvetica"/>
+              </a:rPr>
+              <a:t>ANPP</a:t>
+            </a:r>
+            <a:r>
+              <a:rPr lang="en-US" sz="1000" b="1" baseline="-25000" dirty="0" err="1">
+                <a:latin typeface="Helvetica"/>
+                <a:cs typeface="Helvetica"/>
+              </a:rPr>
+              <a:t>folivory</a:t>
+            </a:r>
+            <a:endParaRPr lang="en-US" sz="1000" b="1" baseline="-25000" dirty="0">
+              <a:latin typeface="Helvetica"/>
+              <a:cs typeface="Helvetica"/>
+            </a:endParaRPr>
+          </a:p>
+          <a:p>
+            <a:pPr algn="ctr"/>
+            <a:r>
+              <a:rPr lang="en-US" sz="1000" dirty="0">
+                <a:latin typeface="Helvetica"/>
+                <a:cs typeface="Helvetica"/>
+              </a:rPr>
+              <a:t>0.4 ± 0.3 (10/8/5)</a:t>
+            </a:r>
+          </a:p>
+        </p:txBody>
+      </p:sp>
+      <p:sp>
+        <p:nvSpPr>
+          <p:cNvPr id="23" name="Rectangle 22"/>
+          <p:cNvSpPr/>
+          <p:nvPr/>
+        </p:nvSpPr>
+        <p:spPr>
+          <a:xfrm>
+            <a:off x="850686" y="5407863"/>
+            <a:ext cx="1038827" cy="553998"/>
+          </a:xfrm>
+          <a:prstGeom prst="rect">
+            <a:avLst/>
+          </a:prstGeom>
+        </p:spPr>
+        <p:txBody>
+          <a:bodyPr wrap="square">
+            <a:spAutoFit/>
+          </a:bodyPr>
+          <a:lstStyle/>
+          <a:p>
+            <a:pPr algn="ctr"/>
+            <a:r>
+              <a:rPr lang="en-US" sz="1000" b="1" dirty="0" err="1">
+                <a:latin typeface="Helvetica"/>
+                <a:cs typeface="Helvetica"/>
+              </a:rPr>
+              <a:t>BNPP</a:t>
+            </a:r>
+            <a:r>
+              <a:rPr lang="en-US" sz="1000" b="1" baseline="-25000" dirty="0" err="1">
+                <a:latin typeface="Helvetica"/>
+                <a:cs typeface="Helvetica"/>
+              </a:rPr>
+              <a:t>fine</a:t>
+            </a:r>
+            <a:endParaRPr lang="en-US" sz="1000" b="1" baseline="-25000" dirty="0">
+              <a:latin typeface="Helvetica"/>
+              <a:cs typeface="Helvetica"/>
+            </a:endParaRPr>
+          </a:p>
+          <a:p>
+            <a:pPr algn="ctr"/>
+            <a:r>
+              <a:rPr lang="en-US" sz="1000" dirty="0">
+                <a:latin typeface="Helvetica"/>
+                <a:cs typeface="Helvetica"/>
+              </a:rPr>
+              <a:t>2.6 ± 1.7 (34/30/13)</a:t>
+            </a:r>
+          </a:p>
+        </p:txBody>
+      </p:sp>
+      <p:sp>
+        <p:nvSpPr>
+          <p:cNvPr id="24" name="Rectangle 23"/>
+          <p:cNvSpPr/>
+          <p:nvPr/>
+        </p:nvSpPr>
+        <p:spPr>
+          <a:xfrm>
+            <a:off x="692043" y="4712787"/>
+            <a:ext cx="1038827" cy="553998"/>
+          </a:xfrm>
+          <a:prstGeom prst="rect">
+            <a:avLst/>
+          </a:prstGeom>
+        </p:spPr>
+        <p:txBody>
+          <a:bodyPr wrap="square">
+            <a:spAutoFit/>
+          </a:bodyPr>
+          <a:lstStyle/>
+          <a:p>
+            <a:pPr algn="ctr"/>
+            <a:r>
+              <a:rPr lang="en-US" sz="1000" b="1" dirty="0" err="1">
+                <a:latin typeface="Helvetica"/>
+                <a:cs typeface="Helvetica"/>
+              </a:rPr>
+              <a:t>BNPP</a:t>
+            </a:r>
+            <a:r>
+              <a:rPr lang="en-US" sz="1000" b="1" baseline="-25000" dirty="0" err="1">
+                <a:latin typeface="Helvetica"/>
+                <a:cs typeface="Helvetica"/>
+              </a:rPr>
+              <a:t>coarse</a:t>
+            </a:r>
+            <a:endParaRPr lang="en-US" sz="1000" b="1" baseline="-25000" dirty="0">
+              <a:latin typeface="Helvetica"/>
+              <a:cs typeface="Helvetica"/>
+            </a:endParaRPr>
+          </a:p>
+          <a:p>
+            <a:pPr algn="ctr"/>
+            <a:r>
+              <a:rPr lang="en-US" sz="1000" dirty="0">
+                <a:latin typeface="Helvetica"/>
+                <a:cs typeface="Helvetica"/>
+              </a:rPr>
+              <a:t>0.4 ± 0.2 (29/27/10)</a:t>
+            </a:r>
+          </a:p>
+        </p:txBody>
+      </p:sp>
+      <p:sp>
+        <p:nvSpPr>
+          <p:cNvPr id="25" name="Down Arrow 24"/>
+          <p:cNvSpPr/>
+          <p:nvPr/>
+        </p:nvSpPr>
+        <p:spPr>
+          <a:xfrm rot="16200000">
+            <a:off x="2335634" y="2061603"/>
+            <a:ext cx="45719" cy="1067763"/>
+          </a:xfrm>
+          <a:prstGeom prst="downArrow">
+            <a:avLst/>
+          </a:prstGeom>
+          <a:solidFill>
+            <a:schemeClr val="accent3"/>
+          </a:solidFill>
+          <a:ln>
+            <a:solidFill>
+              <a:srgbClr val="4A452A"/>
+            </a:solidFill>
+          </a:ln>
+        </p:spPr>
+        <p:style>
+          <a:lnRef idx="1">
+            <a:schemeClr val="accent1"/>
+          </a:lnRef>
+          <a:fillRef idx="3">
+            <a:schemeClr val="accent1"/>
+          </a:fillRef>
+          <a:effectRef idx="2">
+            <a:schemeClr val="accent1"/>
+          </a:effectRef>
+          <a:fontRef idx="minor">
+            <a:schemeClr val="lt1"/>
+          </a:fontRef>
+        </p:style>
+        <p:txBody>
+          <a:bodyPr rtlCol="0" anchor="ctr"/>
+          <a:lstStyle/>
+          <a:p>
+            <a:pPr algn="ctr"/>
+            <a:endParaRPr lang="en-US"/>
+          </a:p>
+        </p:txBody>
+      </p:sp>
+      <p:sp>
+        <p:nvSpPr>
+          <p:cNvPr id="26" name="Down Arrow 25"/>
+          <p:cNvSpPr/>
+          <p:nvPr/>
+        </p:nvSpPr>
+        <p:spPr>
+          <a:xfrm rot="18431627">
+            <a:off x="1394182" y="2146714"/>
+            <a:ext cx="228600" cy="668151"/>
+          </a:xfrm>
+          <a:prstGeom prst="downArrow">
+            <a:avLst/>
+          </a:prstGeom>
+          <a:solidFill>
+            <a:schemeClr val="accent3"/>
+          </a:solidFill>
+          <a:ln>
+            <a:solidFill>
+              <a:srgbClr val="4A452A"/>
+            </a:solidFill>
+          </a:ln>
+        </p:spPr>
+        <p:style>
+          <a:lnRef idx="1">
+            <a:schemeClr val="accent1"/>
+          </a:lnRef>
+          <a:fillRef idx="3">
+            <a:schemeClr val="accent1"/>
+          </a:fillRef>
+          <a:effectRef idx="2">
+            <a:schemeClr val="accent1"/>
+          </a:effectRef>
+          <a:fontRef idx="minor">
+            <a:schemeClr val="lt1"/>
+          </a:fontRef>
+        </p:style>
+        <p:txBody>
+          <a:bodyPr rtlCol="0" anchor="ctr"/>
+          <a:lstStyle/>
+          <a:p>
+            <a:pPr algn="ctr"/>
+            <a:endParaRPr lang="en-US"/>
+          </a:p>
+        </p:txBody>
+      </p:sp>
+      <p:sp>
+        <p:nvSpPr>
+          <p:cNvPr id="27" name="Down Arrow 26"/>
+          <p:cNvSpPr/>
+          <p:nvPr/>
+        </p:nvSpPr>
+        <p:spPr>
+          <a:xfrm flipH="1">
+            <a:off x="2266255" y="4956262"/>
+            <a:ext cx="220900" cy="1469959"/>
+          </a:xfrm>
+          <a:prstGeom prst="downArrow">
+            <a:avLst/>
+          </a:prstGeom>
+          <a:solidFill>
+            <a:schemeClr val="accent3"/>
+          </a:solidFill>
+          <a:ln>
+            <a:solidFill>
+              <a:srgbClr val="4A452A"/>
+            </a:solidFill>
+          </a:ln>
+        </p:spPr>
+        <p:style>
+          <a:lnRef idx="1">
+            <a:schemeClr val="accent1"/>
+          </a:lnRef>
+          <a:fillRef idx="3">
+            <a:schemeClr val="accent1"/>
+          </a:fillRef>
+          <a:effectRef idx="2">
+            <a:schemeClr val="accent1"/>
+          </a:effectRef>
+          <a:fontRef idx="minor">
+            <a:schemeClr val="lt1"/>
+          </a:fontRef>
+        </p:style>
+        <p:txBody>
+          <a:bodyPr rtlCol="0" anchor="ctr"/>
+          <a:lstStyle/>
+          <a:p>
+            <a:pPr algn="ctr"/>
+            <a:endParaRPr lang="en-US"/>
+          </a:p>
+        </p:txBody>
+      </p:sp>
+      <p:sp>
+        <p:nvSpPr>
+          <p:cNvPr id="29" name="Rectangle 28"/>
+          <p:cNvSpPr/>
+          <p:nvPr/>
+        </p:nvSpPr>
+        <p:spPr>
+          <a:xfrm>
+            <a:off x="2704731" y="361817"/>
+            <a:ext cx="1404919" cy="400110"/>
+          </a:xfrm>
+          <a:prstGeom prst="rect">
+            <a:avLst/>
+          </a:prstGeom>
+          <a:solidFill>
+            <a:srgbClr val="FFFFFF">
+              <a:alpha val="64000"/>
+            </a:srgbClr>
+          </a:solidFill>
+          <a:ln>
+            <a:noFill/>
+          </a:ln>
+        </p:spPr>
+        <p:txBody>
+          <a:bodyPr wrap="square">
+            <a:spAutoFit/>
+          </a:bodyPr>
+          <a:lstStyle/>
+          <a:p>
+            <a:pPr algn="ctr"/>
+            <a:r>
+              <a:rPr lang="en-US" sz="1000" b="1" dirty="0">
+                <a:latin typeface="Helvetica"/>
+                <a:cs typeface="Helvetica"/>
+              </a:rPr>
+              <a:t>NEE</a:t>
+            </a:r>
+          </a:p>
+          <a:p>
+            <a:pPr algn="ctr"/>
+            <a:r>
+              <a:rPr lang="en-US" sz="1000" dirty="0">
+                <a:latin typeface="Helvetica"/>
+                <a:cs typeface="Helvetica"/>
+              </a:rPr>
+              <a:t>-1.9 ± 2.3 (37/11/11)</a:t>
+            </a:r>
+          </a:p>
+        </p:txBody>
+      </p:sp>
+      <p:sp>
+        <p:nvSpPr>
+          <p:cNvPr id="30" name="Rectangle 29"/>
+          <p:cNvSpPr/>
+          <p:nvPr/>
+        </p:nvSpPr>
+        <p:spPr>
+          <a:xfrm>
+            <a:off x="7005459" y="1894527"/>
+            <a:ext cx="1146965" cy="520658"/>
+          </a:xfrm>
+          <a:prstGeom prst="rect">
+            <a:avLst/>
+          </a:prstGeom>
+          <a:solidFill>
+            <a:schemeClr val="bg2"/>
+          </a:solidFill>
+          <a:ln>
+            <a:solidFill>
+              <a:srgbClr val="4A452A"/>
+            </a:solidFill>
+          </a:ln>
+        </p:spPr>
+        <p:style>
+          <a:lnRef idx="1">
+            <a:schemeClr val="accent1"/>
+          </a:lnRef>
+          <a:fillRef idx="3">
+            <a:schemeClr val="accent1"/>
+          </a:fillRef>
+          <a:effectRef idx="2">
+            <a:schemeClr val="accent1"/>
+          </a:effectRef>
+          <a:fontRef idx="minor">
+            <a:schemeClr val="lt1"/>
+          </a:fontRef>
+        </p:style>
+        <p:txBody>
+          <a:bodyPr rtlCol="0" anchor="ctr"/>
+          <a:lstStyle/>
+          <a:p>
+            <a:pPr algn="ctr"/>
+            <a:r>
+              <a:rPr lang="en-US" sz="1000" b="1" dirty="0">
+                <a:solidFill>
+                  <a:schemeClr val="tx1"/>
+                </a:solidFill>
+                <a:latin typeface="Helvetica"/>
+                <a:cs typeface="Helvetica"/>
+              </a:rPr>
+              <a:t>foliage biomass</a:t>
+            </a:r>
+          </a:p>
+          <a:p>
+            <a:pPr algn="ctr"/>
+            <a:r>
+              <a:rPr lang="en-US" sz="1000" dirty="0">
+                <a:solidFill>
+                  <a:schemeClr val="tx1"/>
+                </a:solidFill>
+                <a:latin typeface="Helvetica"/>
+                <a:cs typeface="Helvetica"/>
+              </a:rPr>
+              <a:t>4.2 ± 1.3 </a:t>
+            </a:r>
+          </a:p>
+          <a:p>
+            <a:pPr algn="ctr"/>
+            <a:r>
+              <a:rPr lang="en-US" sz="1000" dirty="0">
+                <a:solidFill>
+                  <a:schemeClr val="tx1"/>
+                </a:solidFill>
+                <a:latin typeface="Helvetica"/>
+                <a:cs typeface="Helvetica"/>
+              </a:rPr>
+              <a:t>(18/14/5)</a:t>
+            </a:r>
+          </a:p>
+        </p:txBody>
+      </p:sp>
+      <p:sp>
+        <p:nvSpPr>
+          <p:cNvPr id="31" name="Rectangle 30"/>
+          <p:cNvSpPr/>
+          <p:nvPr/>
+        </p:nvSpPr>
+        <p:spPr>
+          <a:xfrm>
+            <a:off x="7836506" y="2542365"/>
+            <a:ext cx="1104899" cy="682164"/>
+          </a:xfrm>
+          <a:prstGeom prst="rect">
+            <a:avLst/>
+          </a:prstGeom>
+          <a:solidFill>
+            <a:schemeClr val="bg2"/>
+          </a:solidFill>
+          <a:ln>
+            <a:solidFill>
+              <a:srgbClr val="4A452A"/>
+            </a:solidFill>
+          </a:ln>
+        </p:spPr>
+        <p:style>
+          <a:lnRef idx="1">
+            <a:schemeClr val="accent1"/>
+          </a:lnRef>
+          <a:fillRef idx="3">
+            <a:schemeClr val="accent1"/>
+          </a:fillRef>
+          <a:effectRef idx="2">
+            <a:schemeClr val="accent1"/>
+          </a:effectRef>
+          <a:fontRef idx="minor">
+            <a:schemeClr val="lt1"/>
+          </a:fontRef>
+        </p:style>
+        <p:txBody>
+          <a:bodyPr rtlCol="0" anchor="ctr"/>
+          <a:lstStyle/>
+          <a:p>
+            <a:pPr algn="ctr"/>
+            <a:r>
+              <a:rPr lang="en-US" sz="1000" b="1" dirty="0">
+                <a:solidFill>
+                  <a:schemeClr val="tx1"/>
+                </a:solidFill>
+                <a:latin typeface="Helvetica"/>
+                <a:cs typeface="Helvetica"/>
+              </a:rPr>
+              <a:t>aboveground biomass</a:t>
+            </a:r>
+          </a:p>
+          <a:p>
+            <a:pPr algn="ctr"/>
+            <a:r>
+              <a:rPr lang="en-US" sz="1000" dirty="0">
+                <a:solidFill>
+                  <a:schemeClr val="tx1"/>
+                </a:solidFill>
+                <a:latin typeface="Helvetica"/>
+                <a:cs typeface="Helvetica"/>
+              </a:rPr>
+              <a:t>133.9 ± 50.8 </a:t>
+            </a:r>
+          </a:p>
+          <a:p>
+            <a:pPr algn="ctr"/>
+            <a:r>
+              <a:rPr lang="en-US" sz="1000" dirty="0">
+                <a:solidFill>
+                  <a:schemeClr val="tx1"/>
+                </a:solidFill>
+                <a:latin typeface="Helvetica"/>
+                <a:cs typeface="Helvetica"/>
+              </a:rPr>
+              <a:t>(203/118/42)</a:t>
+            </a:r>
+          </a:p>
+        </p:txBody>
+      </p:sp>
+      <p:sp>
+        <p:nvSpPr>
+          <p:cNvPr id="32" name="Rectangle 31"/>
+          <p:cNvSpPr/>
+          <p:nvPr/>
+        </p:nvSpPr>
+        <p:spPr>
+          <a:xfrm>
+            <a:off x="718750" y="406851"/>
+            <a:ext cx="825500" cy="553998"/>
+          </a:xfrm>
+          <a:prstGeom prst="rect">
+            <a:avLst/>
+          </a:prstGeom>
+        </p:spPr>
+        <p:txBody>
+          <a:bodyPr wrap="square">
+            <a:spAutoFit/>
+          </a:bodyPr>
+          <a:lstStyle/>
+          <a:p>
+            <a:pPr algn="ctr"/>
+            <a:r>
+              <a:rPr lang="en-US" sz="1000" b="1" dirty="0">
+                <a:latin typeface="Helvetica"/>
+                <a:cs typeface="Helvetica"/>
+              </a:rPr>
+              <a:t>GPP</a:t>
+            </a:r>
+          </a:p>
+          <a:p>
+            <a:pPr algn="ctr"/>
+            <a:r>
+              <a:rPr lang="en-US" sz="1000" dirty="0">
+                <a:latin typeface="Helvetica"/>
+                <a:cs typeface="Helvetica"/>
+              </a:rPr>
+              <a:t>31.6 ± 6.7 (38/18/13)</a:t>
+            </a:r>
+          </a:p>
+        </p:txBody>
+      </p:sp>
+      <p:sp>
+        <p:nvSpPr>
+          <p:cNvPr id="33" name="Down Arrow 32"/>
+          <p:cNvSpPr/>
+          <p:nvPr/>
+        </p:nvSpPr>
+        <p:spPr>
+          <a:xfrm rot="18346085">
+            <a:off x="2079570" y="2499831"/>
+            <a:ext cx="333195" cy="1058309"/>
+          </a:xfrm>
+          <a:prstGeom prst="downArrow">
+            <a:avLst/>
+          </a:prstGeom>
+          <a:solidFill>
+            <a:schemeClr val="accent3"/>
+          </a:solidFill>
+          <a:ln>
+            <a:solidFill>
+              <a:srgbClr val="4A452A"/>
+            </a:solidFill>
+          </a:ln>
+        </p:spPr>
+        <p:style>
+          <a:lnRef idx="1">
+            <a:schemeClr val="accent1"/>
+          </a:lnRef>
+          <a:fillRef idx="3">
+            <a:schemeClr val="accent1"/>
+          </a:fillRef>
+          <a:effectRef idx="2">
+            <a:schemeClr val="accent1"/>
+          </a:effectRef>
+          <a:fontRef idx="minor">
+            <a:schemeClr val="lt1"/>
+          </a:fontRef>
+        </p:style>
+        <p:txBody>
+          <a:bodyPr rtlCol="0" anchor="ctr"/>
+          <a:lstStyle/>
+          <a:p>
+            <a:pPr algn="ctr"/>
+            <a:endParaRPr lang="en-US"/>
+          </a:p>
+        </p:txBody>
+      </p:sp>
+      <p:sp>
+        <p:nvSpPr>
+          <p:cNvPr id="34" name="Down Arrow 33"/>
+          <p:cNvSpPr/>
+          <p:nvPr/>
+        </p:nvSpPr>
+        <p:spPr>
+          <a:xfrm>
+            <a:off x="2715016" y="454177"/>
+            <a:ext cx="82296" cy="274320"/>
+          </a:xfrm>
+          <a:prstGeom prst="downArrow">
+            <a:avLst/>
+          </a:prstGeom>
+          <a:solidFill>
+            <a:schemeClr val="accent3">
+              <a:lumMod val="40000"/>
+              <a:lumOff val="60000"/>
+            </a:schemeClr>
+          </a:solidFill>
+          <a:ln>
+            <a:solidFill>
+              <a:srgbClr val="4A452A"/>
+            </a:solidFill>
+          </a:ln>
+        </p:spPr>
+        <p:style>
+          <a:lnRef idx="1">
+            <a:schemeClr val="accent1"/>
+          </a:lnRef>
+          <a:fillRef idx="3">
+            <a:schemeClr val="accent1"/>
+          </a:fillRef>
+          <a:effectRef idx="2">
+            <a:schemeClr val="accent1"/>
+          </a:effectRef>
+          <a:fontRef idx="minor">
+            <a:schemeClr val="lt1"/>
+          </a:fontRef>
+        </p:style>
+        <p:txBody>
+          <a:bodyPr rtlCol="0" anchor="ctr"/>
+          <a:lstStyle/>
+          <a:p>
+            <a:pPr algn="ctr"/>
+            <a:endParaRPr lang="en-US"/>
+          </a:p>
+        </p:txBody>
+      </p:sp>
+      <p:sp>
+        <p:nvSpPr>
+          <p:cNvPr id="36" name="Rectangle 35"/>
+          <p:cNvSpPr/>
+          <p:nvPr/>
+        </p:nvSpPr>
+        <p:spPr>
+          <a:xfrm>
+            <a:off x="4729288" y="4435788"/>
+            <a:ext cx="700226" cy="553998"/>
+          </a:xfrm>
+          <a:prstGeom prst="rect">
+            <a:avLst/>
+          </a:prstGeom>
+        </p:spPr>
+        <p:txBody>
+          <a:bodyPr wrap="square">
+            <a:spAutoFit/>
+          </a:bodyPr>
+          <a:lstStyle/>
+          <a:p>
+            <a:pPr algn="ctr"/>
+            <a:r>
+              <a:rPr lang="en-US" sz="1000" b="1" dirty="0" err="1">
+                <a:latin typeface="Helvetica"/>
+                <a:cs typeface="Helvetica"/>
+              </a:rPr>
+              <a:t>R</a:t>
+            </a:r>
+            <a:r>
+              <a:rPr lang="en-US" sz="1000" b="1" baseline="-25000" dirty="0" err="1">
+                <a:latin typeface="Helvetica"/>
+                <a:cs typeface="Helvetica"/>
+              </a:rPr>
+              <a:t>soil</a:t>
+            </a:r>
+            <a:r>
+              <a:rPr lang="en-US" sz="1000" b="1" baseline="-25000" dirty="0">
+                <a:latin typeface="Helvetica"/>
+                <a:cs typeface="Helvetica"/>
+              </a:rPr>
+              <a:t>-het</a:t>
+            </a:r>
+          </a:p>
+          <a:p>
+            <a:pPr algn="ctr"/>
+            <a:r>
+              <a:rPr lang="en-US" sz="1000" dirty="0">
+                <a:latin typeface="Helvetica"/>
+                <a:cs typeface="Helvetica"/>
+              </a:rPr>
+              <a:t>7.5 ± 3.4 (18/16/9)</a:t>
+            </a:r>
+          </a:p>
+        </p:txBody>
+      </p:sp>
+      <p:sp>
+        <p:nvSpPr>
+          <p:cNvPr id="38" name="Down Arrow 37"/>
+          <p:cNvSpPr/>
+          <p:nvPr/>
+        </p:nvSpPr>
+        <p:spPr>
+          <a:xfrm rot="16200000">
+            <a:off x="3990462" y="588519"/>
+            <a:ext cx="969264" cy="1086490"/>
+          </a:xfrm>
+          <a:prstGeom prst="downArrow">
+            <a:avLst/>
+          </a:prstGeom>
+          <a:solidFill>
+            <a:schemeClr val="bg1">
+              <a:lumMod val="65000"/>
+            </a:schemeClr>
+          </a:solidFill>
+          <a:ln>
+            <a:solidFill>
+              <a:srgbClr val="4A452A"/>
+            </a:solidFill>
+          </a:ln>
+        </p:spPr>
+        <p:style>
+          <a:lnRef idx="1">
+            <a:schemeClr val="accent1"/>
+          </a:lnRef>
+          <a:fillRef idx="3">
+            <a:schemeClr val="accent1"/>
+          </a:fillRef>
+          <a:effectRef idx="2">
+            <a:schemeClr val="accent1"/>
+          </a:effectRef>
+          <a:fontRef idx="minor">
+            <a:schemeClr val="lt1"/>
+          </a:fontRef>
+        </p:style>
+        <p:txBody>
+          <a:bodyPr rtlCol="0" anchor="ctr"/>
+          <a:lstStyle/>
+          <a:p>
+            <a:pPr algn="ctr"/>
+            <a:endParaRPr lang="en-US"/>
+          </a:p>
+        </p:txBody>
+      </p:sp>
+      <p:sp>
+        <p:nvSpPr>
+          <p:cNvPr id="39" name="Rectangle 38"/>
+          <p:cNvSpPr/>
+          <p:nvPr/>
+        </p:nvSpPr>
+        <p:spPr>
+          <a:xfrm>
+            <a:off x="3850547" y="939070"/>
+            <a:ext cx="1240380" cy="553998"/>
+          </a:xfrm>
+          <a:prstGeom prst="rect">
+            <a:avLst/>
+          </a:prstGeom>
+          <a:noFill/>
+        </p:spPr>
+        <p:txBody>
+          <a:bodyPr wrap="square">
+            <a:spAutoFit/>
+          </a:bodyPr>
+          <a:lstStyle/>
+          <a:p>
+            <a:pPr algn="ctr"/>
+            <a:r>
+              <a:rPr lang="en-US" sz="1000" b="1" dirty="0">
+                <a:latin typeface="Helvetica"/>
+                <a:cs typeface="Helvetica"/>
+              </a:rPr>
+              <a:t>R</a:t>
+            </a:r>
+            <a:r>
+              <a:rPr lang="en-US" sz="1000" b="1" baseline="-25000" dirty="0">
+                <a:latin typeface="Helvetica"/>
+                <a:cs typeface="Helvetica"/>
+              </a:rPr>
+              <a:t>a</a:t>
+            </a:r>
+          </a:p>
+          <a:p>
+            <a:pPr algn="ctr"/>
+            <a:r>
+              <a:rPr lang="en-US" sz="1000" dirty="0">
+                <a:latin typeface="Helvetica"/>
+                <a:cs typeface="Helvetica"/>
+              </a:rPr>
+              <a:t>21.2 ± 4.1 (9/8/5)</a:t>
+            </a:r>
+          </a:p>
+          <a:p>
+            <a:pPr algn="ctr"/>
+            <a:endParaRPr lang="en-US" sz="1000" dirty="0">
+              <a:latin typeface="Helvetica"/>
+              <a:cs typeface="Helvetica"/>
+            </a:endParaRPr>
+          </a:p>
+        </p:txBody>
+      </p:sp>
+      <p:sp>
+        <p:nvSpPr>
+          <p:cNvPr id="41" name="Rectangle 40"/>
+          <p:cNvSpPr/>
+          <p:nvPr/>
+        </p:nvSpPr>
+        <p:spPr>
+          <a:xfrm>
+            <a:off x="2463374" y="5401189"/>
+            <a:ext cx="732742" cy="461665"/>
+          </a:xfrm>
+          <a:prstGeom prst="rect">
+            <a:avLst/>
+          </a:prstGeom>
+          <a:solidFill>
+            <a:schemeClr val="bg1">
+              <a:alpha val="50000"/>
+            </a:schemeClr>
+          </a:solidFill>
+        </p:spPr>
+        <p:txBody>
+          <a:bodyPr wrap="square" lIns="0" tIns="0" rIns="0" bIns="0">
+            <a:spAutoFit/>
+          </a:bodyPr>
+          <a:lstStyle/>
+          <a:p>
+            <a:pPr algn="ctr"/>
+            <a:r>
+              <a:rPr lang="en-US" sz="1000" b="1" dirty="0" err="1">
+                <a:latin typeface="Helvetica"/>
+                <a:cs typeface="Helvetica"/>
+              </a:rPr>
+              <a:t>ANPP</a:t>
+            </a:r>
+            <a:r>
+              <a:rPr lang="en-US" sz="1000" b="1" baseline="-25000" dirty="0" err="1">
+                <a:latin typeface="Helvetica"/>
+                <a:cs typeface="Helvetica"/>
+              </a:rPr>
+              <a:t>litterfall</a:t>
+            </a:r>
+            <a:endParaRPr lang="en-US" sz="1000" b="1" baseline="-25000" dirty="0">
+              <a:latin typeface="Helvetica"/>
+              <a:cs typeface="Helvetica"/>
+            </a:endParaRPr>
+          </a:p>
+          <a:p>
+            <a:pPr algn="ctr"/>
+            <a:r>
+              <a:rPr lang="en-US" sz="1000" dirty="0">
+                <a:latin typeface="Helvetica"/>
+                <a:cs typeface="Helvetica"/>
+              </a:rPr>
+              <a:t>3.6 ± 1.5 (17/16/10)</a:t>
+            </a:r>
+          </a:p>
+        </p:txBody>
+      </p:sp>
+      <p:sp>
+        <p:nvSpPr>
+          <p:cNvPr id="42" name="Rectangle 41"/>
+          <p:cNvSpPr/>
+          <p:nvPr/>
+        </p:nvSpPr>
+        <p:spPr>
+          <a:xfrm>
+            <a:off x="5467868" y="6730830"/>
+            <a:ext cx="1270008" cy="437855"/>
+          </a:xfrm>
+          <a:prstGeom prst="rect">
+            <a:avLst/>
+          </a:prstGeom>
+          <a:solidFill>
+            <a:schemeClr val="bg2"/>
+          </a:solidFill>
+          <a:ln>
+            <a:solidFill>
+              <a:srgbClr val="4A452A"/>
+            </a:solidFill>
+          </a:ln>
+        </p:spPr>
+        <p:style>
+          <a:lnRef idx="1">
+            <a:schemeClr val="accent1"/>
+          </a:lnRef>
+          <a:fillRef idx="3">
+            <a:schemeClr val="accent1"/>
+          </a:fillRef>
+          <a:effectRef idx="2">
+            <a:schemeClr val="accent1"/>
+          </a:effectRef>
+          <a:fontRef idx="minor">
+            <a:schemeClr val="lt1"/>
+          </a:fontRef>
+        </p:style>
+        <p:txBody>
+          <a:bodyPr rtlCol="0" anchor="ctr"/>
+          <a:lstStyle/>
+          <a:p>
+            <a:pPr algn="ctr"/>
+            <a:r>
+              <a:rPr lang="en-US" sz="1000" b="1" dirty="0">
+                <a:solidFill>
+                  <a:schemeClr val="tx1"/>
+                </a:solidFill>
+                <a:latin typeface="Helvetica"/>
+                <a:cs typeface="Helvetica"/>
+              </a:rPr>
+              <a:t>organic layer</a:t>
+            </a:r>
+          </a:p>
+          <a:p>
+            <a:pPr algn="ctr"/>
+            <a:r>
+              <a:rPr lang="en-US" sz="1000" dirty="0">
+                <a:solidFill>
+                  <a:schemeClr val="tx1"/>
+                </a:solidFill>
+                <a:latin typeface="Helvetica"/>
+                <a:cs typeface="Helvetica"/>
+              </a:rPr>
+              <a:t>6.8 ± 8.0 (3/3/3)</a:t>
+            </a:r>
+          </a:p>
+        </p:txBody>
+      </p:sp>
+      <p:sp>
+        <p:nvSpPr>
+          <p:cNvPr id="7" name="Down Arrow 6"/>
+          <p:cNvSpPr/>
+          <p:nvPr/>
+        </p:nvSpPr>
+        <p:spPr>
+          <a:xfrm>
+            <a:off x="947317" y="1504582"/>
+            <a:ext cx="393192" cy="756242"/>
+          </a:xfrm>
+          <a:prstGeom prst="downArrow">
+            <a:avLst/>
+          </a:prstGeom>
+          <a:solidFill>
+            <a:schemeClr val="accent3"/>
+          </a:solidFill>
+          <a:ln>
+            <a:solidFill>
+              <a:srgbClr val="4A452A"/>
+            </a:solidFill>
+          </a:ln>
+        </p:spPr>
+        <p:style>
+          <a:lnRef idx="1">
+            <a:schemeClr val="accent1"/>
+          </a:lnRef>
+          <a:fillRef idx="3">
+            <a:schemeClr val="accent1"/>
+          </a:fillRef>
+          <a:effectRef idx="2">
+            <a:schemeClr val="accent1"/>
+          </a:effectRef>
+          <a:fontRef idx="minor">
+            <a:schemeClr val="lt1"/>
+          </a:fontRef>
+        </p:style>
+        <p:txBody>
+          <a:bodyPr rtlCol="0" anchor="ctr"/>
+          <a:lstStyle/>
+          <a:p>
+            <a:pPr algn="ctr"/>
+            <a:endParaRPr lang="en-US"/>
+          </a:p>
+        </p:txBody>
+      </p:sp>
+      <p:sp>
+        <p:nvSpPr>
+          <p:cNvPr id="46" name="Rectangle 45"/>
+          <p:cNvSpPr/>
+          <p:nvPr/>
+        </p:nvSpPr>
+        <p:spPr>
+          <a:xfrm>
+            <a:off x="429123" y="373584"/>
+            <a:ext cx="6080760" cy="6858001"/>
+          </a:xfrm>
+          <a:prstGeom prst="rect">
+            <a:avLst/>
+          </a:prstGeom>
+          <a:noFill/>
+          <a:ln>
+            <a:noFill/>
+          </a:ln>
+        </p:spPr>
+        <p:style>
+          <a:lnRef idx="1">
+            <a:schemeClr val="accent1"/>
+          </a:lnRef>
+          <a:fillRef idx="3">
+            <a:schemeClr val="accent1"/>
+          </a:fillRef>
+          <a:effectRef idx="2">
+            <a:schemeClr val="accent1"/>
+          </a:effectRef>
+          <a:fontRef idx="minor">
+            <a:schemeClr val="lt1"/>
+          </a:fontRef>
+        </p:style>
+        <p:txBody>
+          <a:bodyPr rtlCol="0" anchor="ctr"/>
+          <a:lstStyle/>
+          <a:p>
+            <a:pPr algn="ctr"/>
+            <a:endParaRPr lang="en-US"/>
+          </a:p>
+        </p:txBody>
+      </p:sp>
+      <p:cxnSp>
+        <p:nvCxnSpPr>
+          <p:cNvPr id="51" name="Straight Arrow Connector 50"/>
+          <p:cNvCxnSpPr/>
+          <p:nvPr/>
+        </p:nvCxnSpPr>
+        <p:spPr>
+          <a:xfrm flipV="1">
+            <a:off x="5281863" y="1929196"/>
+            <a:ext cx="299698" cy="4422923"/>
+          </a:xfrm>
+          <a:prstGeom prst="straightConnector1">
+            <a:avLst/>
+          </a:prstGeom>
+          <a:ln w="19050" cmpd="sng">
+            <a:solidFill>
+              <a:schemeClr val="tx1">
+                <a:lumMod val="50000"/>
+                <a:lumOff val="50000"/>
+              </a:schemeClr>
+            </a:solidFill>
+            <a:prstDash val="dash"/>
+            <a:headEnd type="none"/>
+            <a:tailEnd type="triangle"/>
+          </a:ln>
+        </p:spPr>
+        <p:style>
+          <a:lnRef idx="2">
+            <a:schemeClr val="accent1"/>
+          </a:lnRef>
+          <a:fillRef idx="0">
+            <a:schemeClr val="accent1"/>
+          </a:fillRef>
+          <a:effectRef idx="1">
+            <a:schemeClr val="accent1"/>
+          </a:effectRef>
+          <a:fontRef idx="minor">
+            <a:schemeClr val="tx1"/>
+          </a:fontRef>
+        </p:style>
+      </p:cxnSp>
+      <p:sp>
+        <p:nvSpPr>
+          <p:cNvPr id="52" name="Rectangle 51"/>
+          <p:cNvSpPr/>
+          <p:nvPr/>
+        </p:nvSpPr>
+        <p:spPr>
+          <a:xfrm>
+            <a:off x="3315086" y="4731825"/>
+            <a:ext cx="833414" cy="400110"/>
+          </a:xfrm>
+          <a:prstGeom prst="rect">
+            <a:avLst/>
+          </a:prstGeom>
+        </p:spPr>
+        <p:txBody>
+          <a:bodyPr wrap="square">
+            <a:spAutoFit/>
+          </a:bodyPr>
+          <a:lstStyle/>
+          <a:p>
+            <a:pPr algn="ctr"/>
+            <a:r>
+              <a:rPr lang="en-US" sz="1000" b="1" dirty="0">
+                <a:latin typeface="Helvetica"/>
+                <a:cs typeface="Helvetica"/>
+              </a:rPr>
+              <a:t>woody mortality</a:t>
+            </a:r>
+            <a:endParaRPr lang="en-US" sz="1000" b="1" baseline="-25000" dirty="0">
+              <a:latin typeface="Helvetica"/>
+              <a:cs typeface="Helvetica"/>
+            </a:endParaRPr>
+          </a:p>
+        </p:txBody>
+      </p:sp>
+      <p:sp>
+        <p:nvSpPr>
+          <p:cNvPr id="53" name="Rectangle 52"/>
+          <p:cNvSpPr/>
+          <p:nvPr/>
+        </p:nvSpPr>
+        <p:spPr>
+          <a:xfrm>
+            <a:off x="8426461" y="6710152"/>
+            <a:ext cx="1394700" cy="455201"/>
+          </a:xfrm>
+          <a:prstGeom prst="rect">
+            <a:avLst/>
+          </a:prstGeom>
+          <a:solidFill>
+            <a:schemeClr val="bg2"/>
+          </a:solidFill>
+          <a:ln>
+            <a:solidFill>
+              <a:srgbClr val="4A452A"/>
+            </a:solidFill>
+          </a:ln>
+        </p:spPr>
+        <p:style>
+          <a:lnRef idx="1">
+            <a:schemeClr val="accent1"/>
+          </a:lnRef>
+          <a:fillRef idx="3">
+            <a:schemeClr val="accent1"/>
+          </a:fillRef>
+          <a:effectRef idx="2">
+            <a:schemeClr val="accent1"/>
+          </a:effectRef>
+          <a:fontRef idx="minor">
+            <a:schemeClr val="lt1"/>
+          </a:fontRef>
+        </p:style>
+        <p:txBody>
+          <a:bodyPr rtlCol="0" anchor="ctr"/>
+          <a:lstStyle/>
+          <a:p>
+            <a:pPr algn="ctr"/>
+            <a:r>
+              <a:rPr lang="en-US" sz="1000" b="1" dirty="0">
+                <a:solidFill>
+                  <a:schemeClr val="tx1"/>
+                </a:solidFill>
+                <a:latin typeface="Helvetica"/>
+                <a:cs typeface="Helvetica"/>
+              </a:rPr>
+              <a:t>fine root biomass</a:t>
+            </a:r>
+          </a:p>
+          <a:p>
+            <a:pPr algn="ctr"/>
+            <a:r>
+              <a:rPr lang="en-US" sz="1000" dirty="0">
+                <a:solidFill>
+                  <a:schemeClr val="tx1"/>
+                </a:solidFill>
+                <a:latin typeface="Helvetica"/>
+                <a:cs typeface="Helvetica"/>
+              </a:rPr>
+              <a:t>8.5 ± 12.2 (11/8/8)</a:t>
+            </a:r>
+          </a:p>
+        </p:txBody>
+      </p:sp>
+      <p:sp>
+        <p:nvSpPr>
+          <p:cNvPr id="54" name="Rectangle 53"/>
+          <p:cNvSpPr/>
+          <p:nvPr/>
+        </p:nvSpPr>
+        <p:spPr>
+          <a:xfrm>
+            <a:off x="8794283" y="3943307"/>
+            <a:ext cx="1016000" cy="567864"/>
+          </a:xfrm>
+          <a:prstGeom prst="rect">
+            <a:avLst/>
+          </a:prstGeom>
+          <a:solidFill>
+            <a:schemeClr val="bg2"/>
+          </a:solidFill>
+          <a:ln>
+            <a:solidFill>
+              <a:srgbClr val="4A452A"/>
+            </a:solidFill>
+          </a:ln>
+        </p:spPr>
+        <p:style>
+          <a:lnRef idx="1">
+            <a:schemeClr val="accent1"/>
+          </a:lnRef>
+          <a:fillRef idx="3">
+            <a:schemeClr val="accent1"/>
+          </a:fillRef>
+          <a:effectRef idx="2">
+            <a:schemeClr val="accent1"/>
+          </a:effectRef>
+          <a:fontRef idx="minor">
+            <a:schemeClr val="lt1"/>
+          </a:fontRef>
+        </p:style>
+        <p:txBody>
+          <a:bodyPr rtlCol="0" anchor="ctr"/>
+          <a:lstStyle/>
+          <a:p>
+            <a:pPr algn="ctr"/>
+            <a:r>
+              <a:rPr lang="en-US" sz="1000" b="1" dirty="0">
+                <a:solidFill>
+                  <a:schemeClr val="tx1"/>
+                </a:solidFill>
+                <a:latin typeface="Helvetica"/>
+                <a:cs typeface="Helvetica"/>
+              </a:rPr>
+              <a:t>total biomass</a:t>
+            </a:r>
+          </a:p>
+          <a:p>
+            <a:pPr algn="ctr"/>
+            <a:r>
+              <a:rPr lang="en-US" sz="1000" dirty="0">
+                <a:solidFill>
+                  <a:schemeClr val="tx1"/>
+                </a:solidFill>
+                <a:latin typeface="Helvetica"/>
+                <a:cs typeface="Helvetica"/>
+              </a:rPr>
+              <a:t>166 ± 14</a:t>
+            </a:r>
+          </a:p>
+          <a:p>
+            <a:pPr algn="ctr"/>
+            <a:r>
+              <a:rPr lang="en-US" sz="1000" dirty="0">
+                <a:solidFill>
+                  <a:schemeClr val="tx1"/>
+                </a:solidFill>
+                <a:latin typeface="Helvetica"/>
+                <a:cs typeface="Helvetica"/>
+              </a:rPr>
+              <a:t>(37/13/7)</a:t>
+            </a:r>
+          </a:p>
+        </p:txBody>
+      </p:sp>
+      <p:sp>
+        <p:nvSpPr>
+          <p:cNvPr id="56" name="Down Arrow 55"/>
+          <p:cNvSpPr/>
+          <p:nvPr/>
+        </p:nvSpPr>
+        <p:spPr>
+          <a:xfrm rot="20675077">
+            <a:off x="1962656" y="2764984"/>
+            <a:ext cx="208995" cy="2198350"/>
+          </a:xfrm>
+          <a:prstGeom prst="downArrow">
+            <a:avLst/>
+          </a:prstGeom>
+          <a:solidFill>
+            <a:schemeClr val="accent3"/>
+          </a:solidFill>
+          <a:ln>
+            <a:solidFill>
+              <a:srgbClr val="4A452A"/>
+            </a:solidFill>
+          </a:ln>
+        </p:spPr>
+        <p:style>
+          <a:lnRef idx="1">
+            <a:schemeClr val="accent1"/>
+          </a:lnRef>
+          <a:fillRef idx="3">
+            <a:schemeClr val="accent1"/>
+          </a:fillRef>
+          <a:effectRef idx="2">
+            <a:schemeClr val="accent1"/>
+          </a:effectRef>
+          <a:fontRef idx="minor">
+            <a:schemeClr val="lt1"/>
+          </a:fontRef>
+        </p:style>
+        <p:txBody>
+          <a:bodyPr rtlCol="0" anchor="ctr"/>
+          <a:lstStyle/>
+          <a:p>
+            <a:pPr algn="ctr"/>
+            <a:endParaRPr lang="en-US"/>
+          </a:p>
+        </p:txBody>
+      </p:sp>
+      <p:sp>
+        <p:nvSpPr>
+          <p:cNvPr id="57" name="Rectangle 56"/>
+          <p:cNvSpPr/>
+          <p:nvPr/>
+        </p:nvSpPr>
+        <p:spPr>
+          <a:xfrm>
+            <a:off x="8719874" y="454177"/>
+            <a:ext cx="1111154" cy="707886"/>
+          </a:xfrm>
+          <a:prstGeom prst="rect">
+            <a:avLst/>
+          </a:prstGeom>
+          <a:ln>
+            <a:solidFill>
+              <a:schemeClr val="tx1"/>
+            </a:solidFill>
+          </a:ln>
+        </p:spPr>
+        <p:txBody>
+          <a:bodyPr wrap="square">
+            <a:spAutoFit/>
+          </a:bodyPr>
+          <a:lstStyle/>
+          <a:p>
+            <a:r>
+              <a:rPr lang="en-US" sz="1000" b="1" u="sng" dirty="0">
+                <a:latin typeface="Helvetica"/>
+                <a:cs typeface="Helvetica"/>
+              </a:rPr>
+              <a:t>legend</a:t>
+            </a:r>
+            <a:endParaRPr lang="en-US" sz="1000" b="1" u="sng" baseline="-25000" dirty="0">
+              <a:latin typeface="Helvetica"/>
+              <a:cs typeface="Helvetica"/>
+            </a:endParaRPr>
+          </a:p>
+          <a:p>
+            <a:r>
+              <a:rPr lang="en-US" sz="1000" dirty="0">
+                <a:latin typeface="Helvetica"/>
+                <a:cs typeface="Helvetica"/>
+              </a:rPr>
+              <a:t>mean ± </a:t>
+            </a:r>
+            <a:r>
+              <a:rPr lang="en-US" sz="1000" dirty="0" err="1">
+                <a:latin typeface="Helvetica"/>
+                <a:cs typeface="Helvetica"/>
+              </a:rPr>
+              <a:t>std</a:t>
+            </a:r>
+            <a:r>
+              <a:rPr lang="en-US" sz="1000" dirty="0">
+                <a:latin typeface="Helvetica"/>
+                <a:cs typeface="Helvetica"/>
+              </a:rPr>
+              <a:t> </a:t>
+            </a:r>
+          </a:p>
+          <a:p>
+            <a:r>
+              <a:rPr lang="en-US" sz="1000" dirty="0">
+                <a:latin typeface="Helvetica"/>
+                <a:cs typeface="Helvetica"/>
+              </a:rPr>
+              <a:t>(n records/ n plots/ n areas )</a:t>
+            </a:r>
+          </a:p>
+        </p:txBody>
+      </p:sp>
+      <p:sp>
+        <p:nvSpPr>
+          <p:cNvPr id="58" name="Down Arrow 57"/>
+          <p:cNvSpPr/>
+          <p:nvPr/>
+        </p:nvSpPr>
+        <p:spPr>
+          <a:xfrm rot="10971162">
+            <a:off x="4103611" y="1315051"/>
+            <a:ext cx="329599" cy="4772404"/>
+          </a:xfrm>
+          <a:prstGeom prst="downArrow">
+            <a:avLst/>
+          </a:prstGeom>
+          <a:solidFill>
+            <a:schemeClr val="bg1">
+              <a:lumMod val="65000"/>
+            </a:schemeClr>
+          </a:solidFill>
+          <a:ln>
+            <a:solidFill>
+              <a:schemeClr val="tx1"/>
+            </a:solidFill>
+          </a:ln>
+        </p:spPr>
+        <p:style>
+          <a:lnRef idx="1">
+            <a:schemeClr val="accent1"/>
+          </a:lnRef>
+          <a:fillRef idx="3">
+            <a:schemeClr val="accent1"/>
+          </a:fillRef>
+          <a:effectRef idx="2">
+            <a:schemeClr val="accent1"/>
+          </a:effectRef>
+          <a:fontRef idx="minor">
+            <a:schemeClr val="lt1"/>
+          </a:fontRef>
+        </p:style>
+        <p:txBody>
+          <a:bodyPr rtlCol="0" anchor="ctr"/>
+          <a:lstStyle/>
+          <a:p>
+            <a:pPr algn="ctr"/>
+            <a:endParaRPr lang="en-US"/>
+          </a:p>
+        </p:txBody>
+      </p:sp>
+      <p:sp>
+        <p:nvSpPr>
+          <p:cNvPr id="63" name="Down Arrow 62"/>
+          <p:cNvSpPr/>
+          <p:nvPr/>
+        </p:nvSpPr>
+        <p:spPr>
+          <a:xfrm rot="10800000">
+            <a:off x="3613598" y="5862854"/>
+            <a:ext cx="1167749" cy="851540"/>
+          </a:xfrm>
+          <a:prstGeom prst="downArrow">
+            <a:avLst/>
+          </a:prstGeom>
+          <a:solidFill>
+            <a:schemeClr val="bg1">
+              <a:lumMod val="65000"/>
+            </a:schemeClr>
+          </a:solidFill>
+          <a:ln>
+            <a:solidFill>
+              <a:schemeClr val="tx1"/>
+            </a:solidFill>
+          </a:ln>
+        </p:spPr>
+        <p:style>
+          <a:lnRef idx="1">
+            <a:schemeClr val="accent1"/>
+          </a:lnRef>
+          <a:fillRef idx="3">
+            <a:schemeClr val="accent1"/>
+          </a:fillRef>
+          <a:effectRef idx="2">
+            <a:schemeClr val="accent1"/>
+          </a:effectRef>
+          <a:fontRef idx="minor">
+            <a:schemeClr val="lt1"/>
+          </a:fontRef>
+        </p:style>
+        <p:txBody>
+          <a:bodyPr rtlCol="0" anchor="ctr"/>
+          <a:lstStyle/>
+          <a:p>
+            <a:pPr algn="ctr"/>
+            <a:endParaRPr lang="en-US"/>
+          </a:p>
+        </p:txBody>
+      </p:sp>
+      <p:sp>
+        <p:nvSpPr>
+          <p:cNvPr id="59" name="Rectangle 58"/>
+          <p:cNvSpPr/>
+          <p:nvPr/>
+        </p:nvSpPr>
+        <p:spPr>
+          <a:xfrm>
+            <a:off x="2997605" y="2684031"/>
+            <a:ext cx="994116" cy="153888"/>
+          </a:xfrm>
+          <a:prstGeom prst="rect">
+            <a:avLst/>
+          </a:prstGeom>
+          <a:solidFill>
+            <a:srgbClr val="FFFFFF">
+              <a:alpha val="60000"/>
+            </a:srgbClr>
+          </a:solidFill>
+        </p:spPr>
+        <p:txBody>
+          <a:bodyPr wrap="square" lIns="0" tIns="0" rIns="0" bIns="0">
+            <a:spAutoFit/>
+          </a:bodyPr>
+          <a:lstStyle/>
+          <a:p>
+            <a:pPr algn="ctr"/>
+            <a:r>
+              <a:rPr lang="en-US" sz="1000" b="1" dirty="0" err="1">
+                <a:latin typeface="Helvetica"/>
+                <a:cs typeface="Helvetica"/>
+              </a:rPr>
+              <a:t>ANPP</a:t>
+            </a:r>
+            <a:r>
+              <a:rPr lang="en-US" sz="1000" b="1" baseline="-25000" dirty="0" err="1">
+                <a:latin typeface="Helvetica"/>
+                <a:cs typeface="Helvetica"/>
+              </a:rPr>
+              <a:t>repro</a:t>
+            </a:r>
+            <a:endParaRPr lang="en-US" sz="1000" b="1" baseline="-25000" dirty="0">
+              <a:latin typeface="Helvetica"/>
+              <a:cs typeface="Helvetica"/>
+            </a:endParaRPr>
+          </a:p>
+        </p:txBody>
+      </p:sp>
+      <p:sp>
+        <p:nvSpPr>
+          <p:cNvPr id="60" name="Rectangle 59"/>
+          <p:cNvSpPr/>
+          <p:nvPr/>
+        </p:nvSpPr>
+        <p:spPr>
+          <a:xfrm>
+            <a:off x="4052944" y="3343622"/>
+            <a:ext cx="666274" cy="153888"/>
+          </a:xfrm>
+          <a:prstGeom prst="rect">
+            <a:avLst/>
+          </a:prstGeom>
+          <a:solidFill>
+            <a:srgbClr val="FFFFFF">
+              <a:alpha val="60000"/>
+            </a:srgbClr>
+          </a:solidFill>
+        </p:spPr>
+        <p:txBody>
+          <a:bodyPr wrap="square" lIns="0" tIns="0" rIns="0" bIns="0">
+            <a:spAutoFit/>
+          </a:bodyPr>
+          <a:lstStyle/>
+          <a:p>
+            <a:pPr algn="ctr"/>
+            <a:r>
+              <a:rPr lang="en-US" sz="1000" b="1" dirty="0" err="1">
+                <a:latin typeface="Helvetica"/>
+                <a:cs typeface="Helvetica"/>
+              </a:rPr>
+              <a:t>R</a:t>
+            </a:r>
+            <a:r>
+              <a:rPr lang="en-US" sz="1000" b="1" baseline="-25000" dirty="0" err="1">
+                <a:latin typeface="Helvetica"/>
+                <a:cs typeface="Helvetica"/>
+              </a:rPr>
+              <a:t>root</a:t>
+            </a:r>
+            <a:endParaRPr lang="en-US" sz="1000" b="1" baseline="-25000" dirty="0">
+              <a:latin typeface="Helvetica"/>
+              <a:cs typeface="Helvetica"/>
+            </a:endParaRPr>
+          </a:p>
+        </p:txBody>
+      </p:sp>
+      <p:sp>
+        <p:nvSpPr>
+          <p:cNvPr id="62" name="Down Arrow 61"/>
+          <p:cNvSpPr/>
+          <p:nvPr/>
+        </p:nvSpPr>
+        <p:spPr>
+          <a:xfrm rot="16200000">
+            <a:off x="2530399" y="16019"/>
+            <a:ext cx="664732" cy="2056869"/>
+          </a:xfrm>
+          <a:prstGeom prst="downArrow">
+            <a:avLst/>
+          </a:prstGeom>
+          <a:solidFill>
+            <a:schemeClr val="bg1">
+              <a:lumMod val="65000"/>
+            </a:schemeClr>
+          </a:solidFill>
+          <a:ln>
+            <a:solidFill>
+              <a:schemeClr val="tx1"/>
+            </a:solidFill>
+          </a:ln>
+        </p:spPr>
+        <p:style>
+          <a:lnRef idx="1">
+            <a:schemeClr val="accent1"/>
+          </a:lnRef>
+          <a:fillRef idx="3">
+            <a:schemeClr val="accent1"/>
+          </a:fillRef>
+          <a:effectRef idx="2">
+            <a:schemeClr val="accent1"/>
+          </a:effectRef>
+          <a:fontRef idx="minor">
+            <a:schemeClr val="lt1"/>
+          </a:fontRef>
+        </p:style>
+        <p:txBody>
+          <a:bodyPr rtlCol="0" anchor="ctr"/>
+          <a:lstStyle/>
+          <a:p>
+            <a:pPr algn="ctr"/>
+            <a:endParaRPr lang="en-US"/>
+          </a:p>
+        </p:txBody>
+      </p:sp>
+      <p:sp>
+        <p:nvSpPr>
+          <p:cNvPr id="61" name="Rectangle 60"/>
+          <p:cNvSpPr/>
+          <p:nvPr/>
+        </p:nvSpPr>
+        <p:spPr>
+          <a:xfrm>
+            <a:off x="2173511" y="902461"/>
+            <a:ext cx="1240380" cy="400110"/>
+          </a:xfrm>
+          <a:prstGeom prst="rect">
+            <a:avLst/>
+          </a:prstGeom>
+          <a:noFill/>
+        </p:spPr>
+        <p:txBody>
+          <a:bodyPr wrap="square">
+            <a:spAutoFit/>
+          </a:bodyPr>
+          <a:lstStyle/>
+          <a:p>
+            <a:pPr algn="ctr"/>
+            <a:r>
+              <a:rPr lang="en-US" sz="1000" b="1" dirty="0" err="1">
+                <a:latin typeface="Helvetica"/>
+                <a:cs typeface="Helvetica"/>
+              </a:rPr>
+              <a:t>R</a:t>
+            </a:r>
+            <a:r>
+              <a:rPr lang="en-US" sz="1000" b="1" baseline="-25000" dirty="0" err="1">
+                <a:latin typeface="Helvetica"/>
+                <a:cs typeface="Helvetica"/>
+              </a:rPr>
+              <a:t>auto_ag</a:t>
+            </a:r>
+            <a:endParaRPr lang="en-US" sz="1000" b="1" baseline="-25000" dirty="0">
+              <a:latin typeface="Helvetica"/>
+              <a:cs typeface="Helvetica"/>
+            </a:endParaRPr>
+          </a:p>
+          <a:p>
+            <a:pPr algn="ctr"/>
+            <a:endParaRPr lang="en-US" sz="1000" dirty="0">
+              <a:latin typeface="Helvetica"/>
+              <a:cs typeface="Helvetica"/>
+            </a:endParaRPr>
+          </a:p>
+        </p:txBody>
+      </p:sp>
+      <p:sp>
+        <p:nvSpPr>
+          <p:cNvPr id="21" name="Rectangle 20"/>
+          <p:cNvSpPr/>
+          <p:nvPr/>
+        </p:nvSpPr>
+        <p:spPr>
+          <a:xfrm>
+            <a:off x="3800020" y="6092680"/>
+            <a:ext cx="801096" cy="553998"/>
+          </a:xfrm>
+          <a:prstGeom prst="rect">
+            <a:avLst/>
+          </a:prstGeom>
+          <a:ln>
+            <a:noFill/>
+          </a:ln>
+        </p:spPr>
+        <p:txBody>
+          <a:bodyPr wrap="square">
+            <a:spAutoFit/>
+          </a:bodyPr>
+          <a:lstStyle/>
+          <a:p>
+            <a:pPr algn="ctr"/>
+            <a:r>
+              <a:rPr lang="en-US" sz="1000" b="1" dirty="0">
+                <a:latin typeface="Helvetica"/>
+                <a:cs typeface="Helvetica"/>
+              </a:rPr>
+              <a:t>R</a:t>
+            </a:r>
+            <a:r>
+              <a:rPr lang="en-US" sz="1000" b="1" baseline="-25000" dirty="0">
+                <a:latin typeface="Helvetica"/>
+                <a:cs typeface="Helvetica"/>
+              </a:rPr>
+              <a:t>soil</a:t>
+            </a:r>
+          </a:p>
+          <a:p>
+            <a:pPr algn="ctr"/>
+            <a:r>
+              <a:rPr lang="en-US" sz="1000" dirty="0">
+                <a:latin typeface="Helvetica"/>
+                <a:cs typeface="Helvetica"/>
+              </a:rPr>
+              <a:t>13.5 ± 3.7 (24/19/12)</a:t>
+            </a:r>
+          </a:p>
+        </p:txBody>
+      </p:sp>
+      <p:sp>
+        <p:nvSpPr>
+          <p:cNvPr id="64" name="Rectangle 63"/>
+          <p:cNvSpPr/>
+          <p:nvPr/>
+        </p:nvSpPr>
+        <p:spPr>
+          <a:xfrm>
+            <a:off x="2680571" y="4246174"/>
+            <a:ext cx="748123" cy="153888"/>
+          </a:xfrm>
+          <a:prstGeom prst="rect">
+            <a:avLst/>
+          </a:prstGeom>
+          <a:solidFill>
+            <a:schemeClr val="bg1">
+              <a:alpha val="50000"/>
+            </a:schemeClr>
+          </a:solidFill>
+        </p:spPr>
+        <p:txBody>
+          <a:bodyPr wrap="square" lIns="0" tIns="0" rIns="0" bIns="0">
+            <a:spAutoFit/>
+          </a:bodyPr>
+          <a:lstStyle/>
+          <a:p>
+            <a:pPr algn="ctr"/>
+            <a:r>
+              <a:rPr lang="en-US" sz="1000" b="1" dirty="0" err="1" smtClean="0">
+                <a:latin typeface="Helvetica"/>
+                <a:cs typeface="Helvetica"/>
+              </a:rPr>
+              <a:t>ANPP</a:t>
+            </a:r>
+            <a:r>
+              <a:rPr lang="en-US" sz="1000" b="1" baseline="-25000" dirty="0" err="1" smtClean="0">
+                <a:latin typeface="Helvetica"/>
+                <a:cs typeface="Helvetica"/>
+              </a:rPr>
+              <a:t>branch</a:t>
+            </a:r>
+            <a:endParaRPr lang="en-US" sz="1000" dirty="0">
+              <a:latin typeface="Helvetica"/>
+              <a:cs typeface="Helvetica"/>
+            </a:endParaRPr>
+          </a:p>
+        </p:txBody>
+      </p:sp>
+      <p:sp>
+        <p:nvSpPr>
+          <p:cNvPr id="65" name="Down Arrow 64"/>
+          <p:cNvSpPr/>
+          <p:nvPr/>
+        </p:nvSpPr>
+        <p:spPr>
+          <a:xfrm>
+            <a:off x="2602113" y="3404499"/>
+            <a:ext cx="126462" cy="1727436"/>
+          </a:xfrm>
+          <a:prstGeom prst="downArrow">
+            <a:avLst/>
+          </a:prstGeom>
+          <a:solidFill>
+            <a:schemeClr val="accent3"/>
+          </a:solidFill>
+          <a:ln>
+            <a:solidFill>
+              <a:schemeClr val="tx1"/>
+            </a:solidFill>
+          </a:ln>
+        </p:spPr>
+        <p:style>
+          <a:lnRef idx="1">
+            <a:schemeClr val="accent1"/>
+          </a:lnRef>
+          <a:fillRef idx="3">
+            <a:schemeClr val="accent1"/>
+          </a:fillRef>
+          <a:effectRef idx="2">
+            <a:schemeClr val="accent1"/>
+          </a:effectRef>
+          <a:fontRef idx="minor">
+            <a:schemeClr val="lt1"/>
+          </a:fontRef>
+        </p:style>
+        <p:txBody>
+          <a:bodyPr rtlCol="0" anchor="ctr"/>
+          <a:lstStyle/>
+          <a:p>
+            <a:pPr algn="ctr"/>
+            <a:endParaRPr lang="en-US"/>
+          </a:p>
+        </p:txBody>
+      </p:sp>
+      <p:sp>
+        <p:nvSpPr>
+          <p:cNvPr id="66" name="Rectangle 65"/>
+          <p:cNvSpPr/>
+          <p:nvPr/>
+        </p:nvSpPr>
+        <p:spPr>
+          <a:xfrm>
+            <a:off x="6998762" y="6710151"/>
+            <a:ext cx="1382212" cy="455201"/>
+          </a:xfrm>
+          <a:prstGeom prst="rect">
+            <a:avLst/>
+          </a:prstGeom>
+          <a:solidFill>
+            <a:schemeClr val="bg2"/>
+          </a:solidFill>
+          <a:ln>
+            <a:solidFill>
+              <a:schemeClr val="tx1"/>
+            </a:solidFill>
+          </a:ln>
+        </p:spPr>
+        <p:style>
+          <a:lnRef idx="1">
+            <a:schemeClr val="accent1"/>
+          </a:lnRef>
+          <a:fillRef idx="3">
+            <a:schemeClr val="accent1"/>
+          </a:fillRef>
+          <a:effectRef idx="2">
+            <a:schemeClr val="accent1"/>
+          </a:effectRef>
+          <a:fontRef idx="minor">
+            <a:schemeClr val="lt1"/>
+          </a:fontRef>
+        </p:style>
+        <p:txBody>
+          <a:bodyPr rtlCol="0" anchor="ctr"/>
+          <a:lstStyle/>
+          <a:p>
+            <a:pPr algn="ctr"/>
+            <a:r>
+              <a:rPr lang="en-US" sz="1000" b="1" dirty="0" smtClean="0">
+                <a:solidFill>
+                  <a:schemeClr val="tx1"/>
+                </a:solidFill>
+                <a:latin typeface="Helvetica"/>
+                <a:cs typeface="Helvetica"/>
+              </a:rPr>
+              <a:t>coarse root biomass</a:t>
+            </a:r>
+            <a:endParaRPr lang="en-US" sz="1000" b="1" dirty="0">
+              <a:solidFill>
+                <a:schemeClr val="tx1"/>
+              </a:solidFill>
+              <a:latin typeface="Helvetica"/>
+              <a:cs typeface="Helvetica"/>
+            </a:endParaRPr>
+          </a:p>
+        </p:txBody>
+      </p:sp>
+      <p:sp>
+        <p:nvSpPr>
+          <p:cNvPr id="67" name="Rectangle 66"/>
+          <p:cNvSpPr/>
+          <p:nvPr/>
+        </p:nvSpPr>
+        <p:spPr>
+          <a:xfrm>
+            <a:off x="5469413" y="6147858"/>
+            <a:ext cx="1242695" cy="507805"/>
+          </a:xfrm>
+          <a:prstGeom prst="rect">
+            <a:avLst/>
+          </a:prstGeom>
+          <a:solidFill>
+            <a:schemeClr val="bg2"/>
+          </a:solidFill>
+          <a:ln>
+            <a:solidFill>
+              <a:schemeClr val="tx1"/>
+            </a:solidFill>
+          </a:ln>
+        </p:spPr>
+        <p:style>
+          <a:lnRef idx="1">
+            <a:schemeClr val="accent1"/>
+          </a:lnRef>
+          <a:fillRef idx="3">
+            <a:schemeClr val="accent1"/>
+          </a:fillRef>
+          <a:effectRef idx="2">
+            <a:schemeClr val="accent1"/>
+          </a:effectRef>
+          <a:fontRef idx="minor">
+            <a:schemeClr val="lt1"/>
+          </a:fontRef>
+        </p:style>
+        <p:txBody>
+          <a:bodyPr rtlCol="0" anchor="ctr"/>
+          <a:lstStyle/>
+          <a:p>
+            <a:pPr algn="ctr"/>
+            <a:r>
+              <a:rPr lang="en-US" sz="1000" b="1" dirty="0" smtClean="0">
+                <a:solidFill>
+                  <a:schemeClr val="tx1"/>
+                </a:solidFill>
+                <a:latin typeface="Helvetica"/>
+                <a:cs typeface="Helvetica"/>
+              </a:rPr>
+              <a:t>down dead wood</a:t>
+            </a:r>
+            <a:endParaRPr lang="en-US" sz="1000" b="1" dirty="0">
+              <a:solidFill>
+                <a:schemeClr val="tx1"/>
+              </a:solidFill>
+              <a:latin typeface="Helvetica"/>
+              <a:cs typeface="Helvetica"/>
+            </a:endParaRPr>
+          </a:p>
+        </p:txBody>
+      </p:sp>
+      <p:sp>
+        <p:nvSpPr>
+          <p:cNvPr id="68" name="Rectangle 67"/>
+          <p:cNvSpPr/>
+          <p:nvPr/>
+        </p:nvSpPr>
+        <p:spPr>
+          <a:xfrm>
+            <a:off x="5498004" y="4369344"/>
+            <a:ext cx="1338444" cy="507805"/>
+          </a:xfrm>
+          <a:prstGeom prst="rect">
+            <a:avLst/>
+          </a:prstGeom>
+          <a:solidFill>
+            <a:schemeClr val="bg2"/>
+          </a:solidFill>
+          <a:ln>
+            <a:solidFill>
+              <a:schemeClr val="tx1"/>
+            </a:solidFill>
+          </a:ln>
+        </p:spPr>
+        <p:style>
+          <a:lnRef idx="1">
+            <a:schemeClr val="accent1"/>
+          </a:lnRef>
+          <a:fillRef idx="3">
+            <a:schemeClr val="accent1"/>
+          </a:fillRef>
+          <a:effectRef idx="2">
+            <a:schemeClr val="accent1"/>
+          </a:effectRef>
+          <a:fontRef idx="minor">
+            <a:schemeClr val="lt1"/>
+          </a:fontRef>
+        </p:style>
+        <p:txBody>
+          <a:bodyPr rtlCol="0" anchor="ctr"/>
+          <a:lstStyle/>
+          <a:p>
+            <a:pPr algn="ctr"/>
+            <a:r>
+              <a:rPr lang="en-US" sz="1000" b="1" dirty="0" smtClean="0">
+                <a:solidFill>
+                  <a:schemeClr val="tx1"/>
+                </a:solidFill>
+                <a:latin typeface="Helvetica"/>
+                <a:cs typeface="Helvetica"/>
+              </a:rPr>
+              <a:t>standing dead wood</a:t>
+            </a:r>
+            <a:endParaRPr lang="en-US" sz="1000" b="1" dirty="0">
+              <a:solidFill>
+                <a:schemeClr val="tx1"/>
+              </a:solidFill>
+              <a:latin typeface="Helvetica"/>
+              <a:cs typeface="Helvetica"/>
+            </a:endParaRPr>
+          </a:p>
+        </p:txBody>
+      </p:sp>
+      <p:sp>
+        <p:nvSpPr>
+          <p:cNvPr id="69" name="Rectangle 68"/>
+          <p:cNvSpPr/>
+          <p:nvPr/>
+        </p:nvSpPr>
+        <p:spPr>
+          <a:xfrm>
+            <a:off x="7041694" y="3571423"/>
+            <a:ext cx="1339280" cy="520658"/>
+          </a:xfrm>
+          <a:prstGeom prst="rect">
+            <a:avLst/>
+          </a:prstGeom>
+          <a:solidFill>
+            <a:schemeClr val="bg2"/>
+          </a:solidFill>
+          <a:ln>
+            <a:solidFill>
+              <a:srgbClr val="4A452A"/>
+            </a:solidFill>
+          </a:ln>
+        </p:spPr>
+        <p:style>
+          <a:lnRef idx="1">
+            <a:schemeClr val="accent1"/>
+          </a:lnRef>
+          <a:fillRef idx="3">
+            <a:schemeClr val="accent1"/>
+          </a:fillRef>
+          <a:effectRef idx="2">
+            <a:schemeClr val="accent1"/>
+          </a:effectRef>
+          <a:fontRef idx="minor">
+            <a:schemeClr val="lt1"/>
+          </a:fontRef>
+        </p:style>
+        <p:txBody>
+          <a:bodyPr rtlCol="0" anchor="ctr"/>
+          <a:lstStyle/>
+          <a:p>
+            <a:pPr algn="ctr"/>
+            <a:r>
+              <a:rPr lang="en-US" sz="1000" b="1" smtClean="0">
+                <a:solidFill>
+                  <a:schemeClr val="tx1"/>
+                </a:solidFill>
+                <a:latin typeface="Helvetica"/>
+                <a:cs typeface="Helvetica"/>
+              </a:rPr>
+              <a:t>woody ag biomass</a:t>
+            </a:r>
+            <a:endParaRPr lang="en-US" sz="1000" b="1" dirty="0">
+              <a:solidFill>
+                <a:schemeClr val="tx1"/>
+              </a:solidFill>
+              <a:latin typeface="Helvetica"/>
+              <a:cs typeface="Helvetica"/>
+            </a:endParaRPr>
+          </a:p>
+          <a:p>
+            <a:pPr algn="ctr"/>
+            <a:r>
+              <a:rPr lang="en-US" sz="1000" dirty="0">
+                <a:solidFill>
+                  <a:schemeClr val="tx1"/>
+                </a:solidFill>
+                <a:latin typeface="Helvetica"/>
+                <a:cs typeface="Helvetica"/>
+              </a:rPr>
+              <a:t>4.2 ± 1.3 </a:t>
+            </a:r>
+          </a:p>
+          <a:p>
+            <a:pPr algn="ctr"/>
+            <a:r>
+              <a:rPr lang="en-US" sz="1000" dirty="0">
+                <a:solidFill>
+                  <a:schemeClr val="tx1"/>
+                </a:solidFill>
+                <a:latin typeface="Helvetica"/>
+                <a:cs typeface="Helvetica"/>
+              </a:rPr>
+              <a:t>(18/14/5)</a:t>
+            </a:r>
+          </a:p>
+        </p:txBody>
+      </p:sp>
+      <p:sp>
+        <p:nvSpPr>
+          <p:cNvPr id="70" name="Down Arrow 69"/>
+          <p:cNvSpPr/>
+          <p:nvPr/>
+        </p:nvSpPr>
+        <p:spPr>
+          <a:xfrm rot="18346085">
+            <a:off x="2966314" y="3195024"/>
+            <a:ext cx="193397" cy="796985"/>
+          </a:xfrm>
+          <a:prstGeom prst="downArrow">
+            <a:avLst/>
+          </a:prstGeom>
+          <a:solidFill>
+            <a:schemeClr val="accent3"/>
+          </a:solidFill>
+          <a:ln>
+            <a:solidFill>
+              <a:srgbClr val="4A452A"/>
+            </a:solidFill>
+          </a:ln>
+        </p:spPr>
+        <p:style>
+          <a:lnRef idx="1">
+            <a:schemeClr val="accent1"/>
+          </a:lnRef>
+          <a:fillRef idx="3">
+            <a:schemeClr val="accent1"/>
+          </a:fillRef>
+          <a:effectRef idx="2">
+            <a:schemeClr val="accent1"/>
+          </a:effectRef>
+          <a:fontRef idx="minor">
+            <a:schemeClr val="lt1"/>
+          </a:fontRef>
+        </p:style>
+        <p:txBody>
+          <a:bodyPr rtlCol="0" anchor="ctr"/>
+          <a:lstStyle/>
+          <a:p>
+            <a:pPr algn="ctr"/>
+            <a:endParaRPr lang="en-US"/>
+          </a:p>
+        </p:txBody>
+      </p:sp>
+      <p:sp>
+        <p:nvSpPr>
+          <p:cNvPr id="71" name="Rectangle 70"/>
+          <p:cNvSpPr/>
+          <p:nvPr/>
+        </p:nvSpPr>
+        <p:spPr>
+          <a:xfrm>
+            <a:off x="2007079" y="2807377"/>
+            <a:ext cx="748123" cy="153888"/>
+          </a:xfrm>
+          <a:prstGeom prst="rect">
+            <a:avLst/>
+          </a:prstGeom>
+          <a:solidFill>
+            <a:schemeClr val="bg1">
+              <a:alpha val="50000"/>
+            </a:schemeClr>
+          </a:solidFill>
+        </p:spPr>
+        <p:txBody>
+          <a:bodyPr wrap="square" lIns="0" tIns="0" rIns="0" bIns="0">
+            <a:spAutoFit/>
+          </a:bodyPr>
+          <a:lstStyle/>
+          <a:p>
+            <a:pPr algn="ctr"/>
+            <a:r>
+              <a:rPr lang="en-US" sz="1000" b="1" dirty="0" err="1" smtClean="0">
+                <a:latin typeface="Helvetica"/>
+                <a:cs typeface="Helvetica"/>
+              </a:rPr>
+              <a:t>ANPP</a:t>
+            </a:r>
+            <a:r>
+              <a:rPr lang="en-US" sz="1000" b="1" baseline="-25000" dirty="0" err="1" smtClean="0">
+                <a:latin typeface="Helvetica"/>
+                <a:cs typeface="Helvetica"/>
+              </a:rPr>
+              <a:t>woody</a:t>
+            </a:r>
+            <a:endParaRPr lang="en-US" sz="1000" dirty="0">
+              <a:latin typeface="Helvetica"/>
+              <a:cs typeface="Helvetica"/>
+            </a:endParaRPr>
+          </a:p>
+        </p:txBody>
+      </p:sp>
+      <p:cxnSp>
+        <p:nvCxnSpPr>
+          <p:cNvPr id="75" name="Elbow Connector 74"/>
+          <p:cNvCxnSpPr>
+            <a:stCxn id="31" idx="3"/>
+            <a:endCxn id="54" idx="0"/>
+          </p:cNvCxnSpPr>
+          <p:nvPr/>
+        </p:nvCxnSpPr>
+        <p:spPr>
+          <a:xfrm>
+            <a:off x="8941405" y="2883447"/>
+            <a:ext cx="360878" cy="1059860"/>
+          </a:xfrm>
+          <a:prstGeom prst="bentConnector2">
+            <a:avLst/>
+          </a:prstGeom>
+          <a:ln>
+            <a:solidFill>
+              <a:schemeClr val="tx1"/>
+            </a:solidFill>
+          </a:ln>
+        </p:spPr>
+        <p:style>
+          <a:lnRef idx="1">
+            <a:schemeClr val="accent1"/>
+          </a:lnRef>
+          <a:fillRef idx="0">
+            <a:schemeClr val="accent1"/>
+          </a:fillRef>
+          <a:effectRef idx="0">
+            <a:schemeClr val="accent1"/>
+          </a:effectRef>
+          <a:fontRef idx="minor">
+            <a:schemeClr val="tx1"/>
+          </a:fontRef>
+        </p:style>
+      </p:cxnSp>
+      <p:cxnSp>
+        <p:nvCxnSpPr>
+          <p:cNvPr id="77" name="Elbow Connector 76"/>
+          <p:cNvCxnSpPr>
+            <a:stCxn id="54" idx="2"/>
+            <a:endCxn id="12" idx="0"/>
+          </p:cNvCxnSpPr>
+          <p:nvPr/>
+        </p:nvCxnSpPr>
+        <p:spPr>
+          <a:xfrm rot="5400000">
+            <a:off x="7988355" y="4756117"/>
+            <a:ext cx="1558874" cy="1068982"/>
+          </a:xfrm>
+          <a:prstGeom prst="bentConnector3">
+            <a:avLst>
+              <a:gd name="adj1" fmla="val 50000"/>
+            </a:avLst>
+          </a:prstGeom>
+          <a:ln>
+            <a:solidFill>
+              <a:schemeClr val="tx1"/>
+            </a:solidFill>
+          </a:ln>
+        </p:spPr>
+        <p:style>
+          <a:lnRef idx="1">
+            <a:schemeClr val="accent1"/>
+          </a:lnRef>
+          <a:fillRef idx="0">
+            <a:schemeClr val="accent1"/>
+          </a:fillRef>
+          <a:effectRef idx="0">
+            <a:schemeClr val="accent1"/>
+          </a:effectRef>
+          <a:fontRef idx="minor">
+            <a:schemeClr val="tx1"/>
+          </a:fontRef>
+        </p:style>
+      </p:cxnSp>
+      <p:sp>
+        <p:nvSpPr>
+          <p:cNvPr id="123" name="Down Arrow 122"/>
+          <p:cNvSpPr/>
+          <p:nvPr/>
+        </p:nvSpPr>
+        <p:spPr>
+          <a:xfrm rot="19529667" flipH="1">
+            <a:off x="4120997" y="3622412"/>
+            <a:ext cx="261452" cy="2974859"/>
+          </a:xfrm>
+          <a:prstGeom prst="downArrow">
+            <a:avLst/>
+          </a:prstGeom>
+          <a:solidFill>
+            <a:schemeClr val="accent3"/>
+          </a:solidFill>
+          <a:ln>
+            <a:solidFill>
+              <a:schemeClr val="tx1"/>
+            </a:solidFill>
+          </a:ln>
+        </p:spPr>
+        <p:style>
+          <a:lnRef idx="1">
+            <a:schemeClr val="accent1"/>
+          </a:lnRef>
+          <a:fillRef idx="3">
+            <a:schemeClr val="accent1"/>
+          </a:fillRef>
+          <a:effectRef idx="2">
+            <a:schemeClr val="accent1"/>
+          </a:effectRef>
+          <a:fontRef idx="minor">
+            <a:schemeClr val="lt1"/>
+          </a:fontRef>
+        </p:style>
+        <p:txBody>
+          <a:bodyPr rtlCol="0" anchor="ctr"/>
+          <a:lstStyle/>
+          <a:p>
+            <a:pPr algn="ctr"/>
+            <a:endParaRPr lang="en-US"/>
+          </a:p>
+        </p:txBody>
+      </p:sp>
+      <p:cxnSp>
+        <p:nvCxnSpPr>
+          <p:cNvPr id="4" name="Elbow Connector 3"/>
+          <p:cNvCxnSpPr>
+            <a:stCxn id="30" idx="3"/>
+            <a:endCxn id="31" idx="0"/>
+          </p:cNvCxnSpPr>
+          <p:nvPr/>
+        </p:nvCxnSpPr>
+        <p:spPr>
+          <a:xfrm>
+            <a:off x="8152424" y="2154856"/>
+            <a:ext cx="236532" cy="387509"/>
+          </a:xfrm>
+          <a:prstGeom prst="bentConnector2">
+            <a:avLst/>
+          </a:prstGeom>
+          <a:ln>
+            <a:solidFill>
+              <a:schemeClr val="tx1"/>
+            </a:solidFill>
+          </a:ln>
+        </p:spPr>
+        <p:style>
+          <a:lnRef idx="1">
+            <a:schemeClr val="accent1"/>
+          </a:lnRef>
+          <a:fillRef idx="0">
+            <a:schemeClr val="accent1"/>
+          </a:fillRef>
+          <a:effectRef idx="0">
+            <a:schemeClr val="accent1"/>
+          </a:effectRef>
+          <a:fontRef idx="minor">
+            <a:schemeClr val="tx1"/>
+          </a:fontRef>
+        </p:style>
+      </p:cxnSp>
+      <p:cxnSp>
+        <p:nvCxnSpPr>
+          <p:cNvPr id="9" name="Elbow Connector 8"/>
+          <p:cNvCxnSpPr>
+            <a:stCxn id="69" idx="3"/>
+            <a:endCxn id="31" idx="2"/>
+          </p:cNvCxnSpPr>
+          <p:nvPr/>
+        </p:nvCxnSpPr>
+        <p:spPr>
+          <a:xfrm flipV="1">
+            <a:off x="8380974" y="3224529"/>
+            <a:ext cx="7982" cy="607223"/>
+          </a:xfrm>
+          <a:prstGeom prst="bentConnector2">
+            <a:avLst/>
+          </a:prstGeom>
+          <a:ln>
+            <a:solidFill>
+              <a:schemeClr val="tx1"/>
+            </a:solidFill>
+          </a:ln>
+        </p:spPr>
+        <p:style>
+          <a:lnRef idx="1">
+            <a:schemeClr val="accent1"/>
+          </a:lnRef>
+          <a:fillRef idx="0">
+            <a:schemeClr val="accent1"/>
+          </a:fillRef>
+          <a:effectRef idx="0">
+            <a:schemeClr val="accent1"/>
+          </a:effectRef>
+          <a:fontRef idx="minor">
+            <a:schemeClr val="tx1"/>
+          </a:fontRef>
+        </p:style>
+      </p:cxnSp>
+      <p:cxnSp>
+        <p:nvCxnSpPr>
+          <p:cNvPr id="43" name="Elbow Connector 42"/>
+          <p:cNvCxnSpPr>
+            <a:stCxn id="68" idx="3"/>
+            <a:endCxn id="13" idx="0"/>
+          </p:cNvCxnSpPr>
+          <p:nvPr/>
+        </p:nvCxnSpPr>
+        <p:spPr>
+          <a:xfrm>
+            <a:off x="6836448" y="4623247"/>
+            <a:ext cx="53657" cy="529745"/>
+          </a:xfrm>
+          <a:prstGeom prst="bentConnector2">
+            <a:avLst/>
+          </a:prstGeom>
+          <a:ln>
+            <a:solidFill>
+              <a:schemeClr val="tx1"/>
+            </a:solidFill>
+          </a:ln>
+        </p:spPr>
+        <p:style>
+          <a:lnRef idx="1">
+            <a:schemeClr val="accent1"/>
+          </a:lnRef>
+          <a:fillRef idx="0">
+            <a:schemeClr val="accent1"/>
+          </a:fillRef>
+          <a:effectRef idx="0">
+            <a:schemeClr val="accent1"/>
+          </a:effectRef>
+          <a:fontRef idx="minor">
+            <a:schemeClr val="tx1"/>
+          </a:fontRef>
+        </p:style>
+      </p:cxnSp>
+      <p:cxnSp>
+        <p:nvCxnSpPr>
+          <p:cNvPr id="45" name="Elbow Connector 44"/>
+          <p:cNvCxnSpPr>
+            <a:stCxn id="67" idx="3"/>
+            <a:endCxn id="13" idx="2"/>
+          </p:cNvCxnSpPr>
+          <p:nvPr/>
+        </p:nvCxnSpPr>
+        <p:spPr>
+          <a:xfrm flipV="1">
+            <a:off x="6712108" y="5660797"/>
+            <a:ext cx="177997" cy="740964"/>
+          </a:xfrm>
+          <a:prstGeom prst="bentConnector2">
+            <a:avLst/>
+          </a:prstGeom>
+          <a:ln>
+            <a:solidFill>
+              <a:schemeClr val="tx1"/>
+            </a:solidFill>
+          </a:ln>
+        </p:spPr>
+        <p:style>
+          <a:lnRef idx="1">
+            <a:schemeClr val="accent1"/>
+          </a:lnRef>
+          <a:fillRef idx="0">
+            <a:schemeClr val="accent1"/>
+          </a:fillRef>
+          <a:effectRef idx="0">
+            <a:schemeClr val="accent1"/>
+          </a:effectRef>
+          <a:fontRef idx="minor">
+            <a:schemeClr val="tx1"/>
+          </a:fontRef>
+        </p:style>
+      </p:cxnSp>
+      <p:cxnSp>
+        <p:nvCxnSpPr>
+          <p:cNvPr id="83" name="Elbow Connector 82"/>
+          <p:cNvCxnSpPr>
+            <a:stCxn id="53" idx="0"/>
+            <a:endCxn id="12" idx="3"/>
+          </p:cNvCxnSpPr>
+          <p:nvPr/>
+        </p:nvCxnSpPr>
+        <p:spPr>
+          <a:xfrm rot="16200000" flipV="1">
+            <a:off x="8779944" y="6366285"/>
+            <a:ext cx="387106" cy="300628"/>
+          </a:xfrm>
+          <a:prstGeom prst="bentConnector2">
+            <a:avLst/>
+          </a:prstGeom>
+          <a:ln>
+            <a:solidFill>
+              <a:schemeClr val="tx1"/>
+            </a:solidFill>
+          </a:ln>
+        </p:spPr>
+        <p:style>
+          <a:lnRef idx="1">
+            <a:schemeClr val="accent1"/>
+          </a:lnRef>
+          <a:fillRef idx="0">
+            <a:schemeClr val="accent1"/>
+          </a:fillRef>
+          <a:effectRef idx="0">
+            <a:schemeClr val="accent1"/>
+          </a:effectRef>
+          <a:fontRef idx="minor">
+            <a:schemeClr val="tx1"/>
+          </a:fontRef>
+        </p:style>
+      </p:cxnSp>
+      <p:cxnSp>
+        <p:nvCxnSpPr>
+          <p:cNvPr id="85" name="Elbow Connector 84"/>
+          <p:cNvCxnSpPr>
+            <a:stCxn id="12" idx="1"/>
+          </p:cNvCxnSpPr>
+          <p:nvPr/>
+        </p:nvCxnSpPr>
+        <p:spPr>
+          <a:xfrm rot="10800000" flipV="1">
+            <a:off x="7400144" y="6323046"/>
+            <a:ext cx="243275" cy="392564"/>
+          </a:xfrm>
+          <a:prstGeom prst="bentConnector2">
+            <a:avLst/>
+          </a:prstGeom>
+          <a:ln>
+            <a:solidFill>
+              <a:schemeClr val="tx1"/>
+            </a:solidFill>
+          </a:ln>
+        </p:spPr>
+        <p:style>
+          <a:lnRef idx="1">
+            <a:schemeClr val="accent1"/>
+          </a:lnRef>
+          <a:fillRef idx="0">
+            <a:schemeClr val="accent1"/>
+          </a:fillRef>
+          <a:effectRef idx="0">
+            <a:schemeClr val="accent1"/>
+          </a:effectRef>
+          <a:fontRef idx="minor">
+            <a:schemeClr val="tx1"/>
+          </a:fontRef>
+        </p:style>
+      </p:cxnSp>
+      <p:sp>
+        <p:nvSpPr>
+          <p:cNvPr id="143" name="Down Arrow 142"/>
+          <p:cNvSpPr/>
+          <p:nvPr/>
+        </p:nvSpPr>
+        <p:spPr>
+          <a:xfrm rot="1148444" flipH="1">
+            <a:off x="2704377" y="2845294"/>
+            <a:ext cx="69469" cy="2128586"/>
+          </a:xfrm>
+          <a:prstGeom prst="downArrow">
+            <a:avLst/>
+          </a:prstGeom>
+          <a:solidFill>
+            <a:schemeClr val="accent3"/>
+          </a:solidFill>
+          <a:ln>
+            <a:solidFill>
+              <a:srgbClr val="4A452A"/>
+            </a:solidFill>
+          </a:ln>
+        </p:spPr>
+        <p:style>
+          <a:lnRef idx="1">
+            <a:schemeClr val="accent1"/>
+          </a:lnRef>
+          <a:fillRef idx="3">
+            <a:schemeClr val="accent1"/>
+          </a:fillRef>
+          <a:effectRef idx="2">
+            <a:schemeClr val="accent1"/>
+          </a:effectRef>
+          <a:fontRef idx="minor">
+            <a:schemeClr val="lt1"/>
+          </a:fontRef>
+        </p:style>
+        <p:txBody>
+          <a:bodyPr rtlCol="0" anchor="ctr"/>
+          <a:lstStyle/>
+          <a:p>
+            <a:pPr algn="ctr"/>
+            <a:endParaRPr lang="en-US"/>
+          </a:p>
+        </p:txBody>
+      </p:sp>
+      <p:cxnSp>
+        <p:nvCxnSpPr>
+          <p:cNvPr id="135" name="Straight Arrow Connector 134"/>
+          <p:cNvCxnSpPr/>
+          <p:nvPr/>
+        </p:nvCxnSpPr>
+        <p:spPr>
+          <a:xfrm flipH="1" flipV="1">
+            <a:off x="5655704" y="1929196"/>
+            <a:ext cx="234277" cy="3536968"/>
+          </a:xfrm>
+          <a:prstGeom prst="straightConnector1">
+            <a:avLst/>
+          </a:prstGeom>
+          <a:ln w="19050" cmpd="sng">
+            <a:solidFill>
+              <a:schemeClr val="tx1">
+                <a:lumMod val="50000"/>
+                <a:lumOff val="50000"/>
+              </a:schemeClr>
+            </a:solidFill>
+            <a:prstDash val="dash"/>
+            <a:headEnd type="none"/>
+            <a:tailEnd type="triangle"/>
+          </a:ln>
+        </p:spPr>
+        <p:style>
+          <a:lnRef idx="2">
+            <a:schemeClr val="accent1"/>
+          </a:lnRef>
+          <a:fillRef idx="0">
+            <a:schemeClr val="accent1"/>
+          </a:fillRef>
+          <a:effectRef idx="1">
+            <a:schemeClr val="accent1"/>
+          </a:effectRef>
+          <a:fontRef idx="minor">
+            <a:schemeClr val="tx1"/>
+          </a:fontRef>
+        </p:style>
+      </p:cxnSp>
+      <p:sp>
+        <p:nvSpPr>
+          <p:cNvPr id="140" name="Rectangle 139"/>
+          <p:cNvSpPr/>
+          <p:nvPr/>
+        </p:nvSpPr>
+        <p:spPr>
+          <a:xfrm>
+            <a:off x="5504240" y="1572874"/>
+            <a:ext cx="672998" cy="153888"/>
+          </a:xfrm>
+          <a:prstGeom prst="rect">
+            <a:avLst/>
+          </a:prstGeom>
+          <a:noFill/>
+        </p:spPr>
+        <p:txBody>
+          <a:bodyPr wrap="square" lIns="0" tIns="0" rIns="0" bIns="0">
+            <a:spAutoFit/>
+          </a:bodyPr>
+          <a:lstStyle/>
+          <a:p>
+            <a:pPr algn="ctr"/>
+            <a:r>
+              <a:rPr lang="en-US" sz="1000" b="1" dirty="0" err="1" smtClean="0">
+                <a:latin typeface="Helvetica"/>
+                <a:cs typeface="Helvetica"/>
+              </a:rPr>
+              <a:t>R</a:t>
+            </a:r>
+            <a:r>
+              <a:rPr lang="en-US" sz="1000" b="1" baseline="-25000" dirty="0" err="1" smtClean="0">
+                <a:latin typeface="Helvetica"/>
+                <a:cs typeface="Helvetica"/>
+              </a:rPr>
+              <a:t>het</a:t>
+            </a:r>
+            <a:endParaRPr lang="en-US" sz="1000" b="1" baseline="-25000" dirty="0">
+              <a:latin typeface="Helvetica"/>
+              <a:cs typeface="Helvetica"/>
+            </a:endParaRPr>
+          </a:p>
+        </p:txBody>
+      </p:sp>
+      <p:cxnSp>
+        <p:nvCxnSpPr>
+          <p:cNvPr id="171" name="Straight Arrow Connector 170"/>
+          <p:cNvCxnSpPr/>
+          <p:nvPr/>
+        </p:nvCxnSpPr>
+        <p:spPr>
+          <a:xfrm flipV="1">
+            <a:off x="5581561" y="1507751"/>
+            <a:ext cx="9366" cy="344344"/>
+          </a:xfrm>
+          <a:prstGeom prst="straightConnector1">
+            <a:avLst/>
+          </a:prstGeom>
+          <a:ln w="19050" cmpd="sng">
+            <a:solidFill>
+              <a:schemeClr val="tx1">
+                <a:lumMod val="50000"/>
+                <a:lumOff val="50000"/>
+              </a:schemeClr>
+            </a:solidFill>
+            <a:prstDash val="dash"/>
+            <a:headEnd type="none"/>
+            <a:tailEnd type="triangle"/>
+          </a:ln>
+        </p:spPr>
+        <p:style>
+          <a:lnRef idx="2">
+            <a:schemeClr val="accent1"/>
+          </a:lnRef>
+          <a:fillRef idx="0">
+            <a:schemeClr val="accent1"/>
+          </a:fillRef>
+          <a:effectRef idx="1">
+            <a:schemeClr val="accent1"/>
+          </a:effectRef>
+          <a:fontRef idx="minor">
+            <a:schemeClr val="tx1"/>
+          </a:fontRef>
+        </p:style>
+      </p:cxnSp>
+      <p:sp>
+        <p:nvSpPr>
+          <p:cNvPr id="78" name="Rectangle 77"/>
+          <p:cNvSpPr/>
+          <p:nvPr/>
+        </p:nvSpPr>
+        <p:spPr>
+          <a:xfrm>
+            <a:off x="5254428" y="4048482"/>
+            <a:ext cx="672998" cy="153888"/>
+          </a:xfrm>
+          <a:prstGeom prst="rect">
+            <a:avLst/>
+          </a:prstGeom>
+          <a:noFill/>
+        </p:spPr>
+        <p:txBody>
+          <a:bodyPr wrap="square" lIns="0" tIns="0" rIns="0" bIns="0">
+            <a:spAutoFit/>
+          </a:bodyPr>
+          <a:lstStyle/>
+          <a:p>
+            <a:pPr algn="ctr"/>
+            <a:r>
+              <a:rPr lang="en-US" sz="1000" b="1" dirty="0" err="1" smtClean="0">
+                <a:latin typeface="Helvetica"/>
+                <a:cs typeface="Helvetica"/>
+              </a:rPr>
+              <a:t>R</a:t>
+            </a:r>
+            <a:r>
+              <a:rPr lang="en-US" sz="1000" b="1" baseline="-25000" dirty="0" err="1" smtClean="0">
+                <a:latin typeface="Helvetica"/>
+                <a:cs typeface="Helvetica"/>
+              </a:rPr>
+              <a:t>cwd</a:t>
+            </a:r>
+            <a:endParaRPr lang="en-US" sz="1000" b="1" baseline="-25000" dirty="0">
+              <a:latin typeface="Helvetica"/>
+              <a:cs typeface="Helvetica"/>
+            </a:endParaRPr>
+          </a:p>
+        </p:txBody>
+      </p:sp>
+      <p:sp>
+        <p:nvSpPr>
+          <p:cNvPr id="79" name="Rectangle 78"/>
+          <p:cNvSpPr/>
+          <p:nvPr/>
+        </p:nvSpPr>
+        <p:spPr>
+          <a:xfrm>
+            <a:off x="5629592" y="3004380"/>
+            <a:ext cx="672998" cy="153888"/>
+          </a:xfrm>
+          <a:prstGeom prst="rect">
+            <a:avLst/>
+          </a:prstGeom>
+          <a:noFill/>
+        </p:spPr>
+        <p:txBody>
+          <a:bodyPr wrap="square" lIns="0" tIns="0" rIns="0" bIns="0">
+            <a:spAutoFit/>
+          </a:bodyPr>
+          <a:lstStyle/>
+          <a:p>
+            <a:pPr algn="ctr"/>
+            <a:r>
+              <a:rPr lang="en-US" sz="1000" b="1" dirty="0" smtClean="0">
+                <a:latin typeface="Helvetica"/>
+                <a:cs typeface="Helvetica"/>
+              </a:rPr>
+              <a:t>R</a:t>
+            </a:r>
+            <a:r>
+              <a:rPr lang="en-US" sz="1000" b="1" baseline="-25000" dirty="0" smtClean="0">
+                <a:latin typeface="Helvetica"/>
+                <a:cs typeface="Helvetica"/>
+              </a:rPr>
+              <a:t>ag-het</a:t>
+            </a:r>
+            <a:endParaRPr lang="en-US" sz="1000" b="1" baseline="-25000" dirty="0">
+              <a:latin typeface="Helvetica"/>
+              <a:cs typeface="Helvetica"/>
+            </a:endParaRPr>
+          </a:p>
+        </p:txBody>
+      </p:sp>
+      <p:sp>
+        <p:nvSpPr>
+          <p:cNvPr id="16" name="Rectangle 15"/>
+          <p:cNvSpPr/>
+          <p:nvPr/>
+        </p:nvSpPr>
+        <p:spPr>
+          <a:xfrm>
+            <a:off x="1576446" y="4015381"/>
+            <a:ext cx="748123" cy="461665"/>
+          </a:xfrm>
+          <a:prstGeom prst="rect">
+            <a:avLst/>
+          </a:prstGeom>
+          <a:solidFill>
+            <a:schemeClr val="bg1">
+              <a:alpha val="50000"/>
+            </a:schemeClr>
+          </a:solidFill>
+        </p:spPr>
+        <p:txBody>
+          <a:bodyPr wrap="square" lIns="0" tIns="0" rIns="0" bIns="0">
+            <a:spAutoFit/>
+          </a:bodyPr>
+          <a:lstStyle/>
+          <a:p>
+            <a:pPr algn="ctr"/>
+            <a:r>
+              <a:rPr lang="en-US" sz="1000" b="1" dirty="0" err="1">
+                <a:latin typeface="Helvetica"/>
+                <a:cs typeface="Helvetica"/>
+              </a:rPr>
+              <a:t>ANPP</a:t>
+            </a:r>
+            <a:r>
+              <a:rPr lang="en-US" sz="1000" b="1" baseline="-25000" dirty="0" err="1">
+                <a:latin typeface="Helvetica"/>
+                <a:cs typeface="Helvetica"/>
+              </a:rPr>
+              <a:t>foliage</a:t>
+            </a:r>
+            <a:endParaRPr lang="en-US" sz="1000" b="1" baseline="-25000" dirty="0">
+              <a:latin typeface="Helvetica"/>
+              <a:cs typeface="Helvetica"/>
+            </a:endParaRPr>
+          </a:p>
+          <a:p>
+            <a:pPr algn="ctr"/>
+            <a:r>
+              <a:rPr lang="en-US" sz="1000" dirty="0">
+                <a:latin typeface="Helvetica"/>
+                <a:cs typeface="Helvetica"/>
+              </a:rPr>
+              <a:t>3.0 ± 1.2 (43/38/18)</a:t>
+            </a:r>
+          </a:p>
+        </p:txBody>
+      </p:sp>
+    </p:spTree>
+    <p:extLst>
+      <p:ext uri="{BB962C8B-B14F-4D97-AF65-F5344CB8AC3E}">
+        <p14:creationId xmlns:p14="http://schemas.microsoft.com/office/powerpoint/2010/main" val="1439612082"/>
+      </p:ext>
+    </p:extLst>
+  </p:cSld>
+  <p:clrMapOvr>
+    <a:masterClrMapping/>
+  </p:clrMapOvr>
+</p:sld>
+</file>
+
+<file path=ppt/slides/slide3.xml><?xml version="1.0" encoding="utf-8"?>
 <p:sld xmlns:a="http://schemas.openxmlformats.org/drawingml/2006/main" xmlns:r="http://schemas.openxmlformats.org/officeDocument/2006/relationships" xmlns:p="http://schemas.openxmlformats.org/presentationml/2006/main">
   <p:cSld>
     <p:spTree>

</xml_diff>